<commit_message>
Cập nhật slide báo cáo
Yêu cầu 6->13,  chính tả phân tích sự tác động.
</commit_message>
<xml_diff>
--- a/BaiTap2/BT01_BT2_Slide.pptx
+++ b/BaiTap2/BT01_BT2_Slide.pptx
@@ -5,10 +5,10 @@
     <p:sldMasterId id="2147483855" r:id="rId1"/>
   </p:sldMasterIdLst>
   <p:notesMasterIdLst>
-    <p:notesMasterId r:id="rId30"/>
+    <p:notesMasterId r:id="rId47"/>
   </p:notesMasterIdLst>
   <p:handoutMasterIdLst>
-    <p:handoutMasterId r:id="rId31"/>
+    <p:handoutMasterId r:id="rId48"/>
   </p:handoutMasterIdLst>
   <p:sldIdLst>
     <p:sldId id="256" r:id="rId2"/>
@@ -38,7 +38,24 @@
     <p:sldId id="308" r:id="rId26"/>
     <p:sldId id="309" r:id="rId27"/>
     <p:sldId id="310" r:id="rId28"/>
-    <p:sldId id="278" r:id="rId29"/>
+    <p:sldId id="311" r:id="rId29"/>
+    <p:sldId id="312" r:id="rId30"/>
+    <p:sldId id="313" r:id="rId31"/>
+    <p:sldId id="314" r:id="rId32"/>
+    <p:sldId id="315" r:id="rId33"/>
+    <p:sldId id="316" r:id="rId34"/>
+    <p:sldId id="317" r:id="rId35"/>
+    <p:sldId id="318" r:id="rId36"/>
+    <p:sldId id="319" r:id="rId37"/>
+    <p:sldId id="320" r:id="rId38"/>
+    <p:sldId id="321" r:id="rId39"/>
+    <p:sldId id="322" r:id="rId40"/>
+    <p:sldId id="323" r:id="rId41"/>
+    <p:sldId id="324" r:id="rId42"/>
+    <p:sldId id="325" r:id="rId43"/>
+    <p:sldId id="327" r:id="rId44"/>
+    <p:sldId id="326" r:id="rId45"/>
+    <p:sldId id="278" r:id="rId46"/>
   </p:sldIdLst>
   <p:sldSz cx="9144000" cy="6858000" type="screen4x3"/>
   <p:notesSz cx="6858000" cy="9144000"/>
@@ -174,7 +191,6 @@
   </mc:AlternateContent>
   <c:chart>
     <c:title>
-      <c:layout/>
       <c:overlay val="0"/>
       <c:spPr>
         <a:noFill/>
@@ -298,11 +314,11 @@
           <c:showPercent val="0"/>
           <c:showBubbleSize val="0"/>
         </c:dLbls>
-        <c:axId val="545479600"/>
-        <c:axId val="545481168"/>
+        <c:axId val="267414416"/>
+        <c:axId val="267408144"/>
       </c:radarChart>
       <c:catAx>
-        <c:axId val="545479600"/>
+        <c:axId val="267414416"/>
         <c:scaling>
           <c:orientation val="minMax"/>
         </c:scaling>
@@ -345,7 +361,7 @@
             <a:endParaRPr lang="en-US"/>
           </a:p>
         </c:txPr>
-        <c:crossAx val="545481168"/>
+        <c:crossAx val="267408144"/>
         <c:crosses val="autoZero"/>
         <c:auto val="1"/>
         <c:lblAlgn val="ctr"/>
@@ -353,7 +369,7 @@
         <c:noMultiLvlLbl val="0"/>
       </c:catAx>
       <c:valAx>
-        <c:axId val="545481168"/>
+        <c:axId val="267408144"/>
         <c:scaling>
           <c:orientation val="minMax"/>
         </c:scaling>
@@ -404,7 +420,7 @@
             <a:endParaRPr lang="en-US"/>
           </a:p>
         </c:txPr>
-        <c:crossAx val="545479600"/>
+        <c:crossAx val="267414416"/>
         <c:crosses val="autoZero"/>
         <c:crossBetween val="between"/>
       </c:valAx>
@@ -458,7 +474,6 @@
   </mc:AlternateContent>
   <c:chart>
     <c:title>
-      <c:layout/>
       <c:overlay val="0"/>
       <c:spPr>
         <a:noFill/>
@@ -582,11 +597,11 @@
           <c:showPercent val="0"/>
           <c:showBubbleSize val="0"/>
         </c:dLbls>
-        <c:axId val="363935128"/>
-        <c:axId val="363931600"/>
+        <c:axId val="217762880"/>
+        <c:axId val="217763272"/>
       </c:radarChart>
       <c:catAx>
-        <c:axId val="363935128"/>
+        <c:axId val="217762880"/>
         <c:scaling>
           <c:orientation val="minMax"/>
         </c:scaling>
@@ -629,7 +644,7 @@
             <a:endParaRPr lang="en-US"/>
           </a:p>
         </c:txPr>
-        <c:crossAx val="363931600"/>
+        <c:crossAx val="217763272"/>
         <c:crosses val="autoZero"/>
         <c:auto val="1"/>
         <c:lblAlgn val="ctr"/>
@@ -637,7 +652,7 @@
         <c:noMultiLvlLbl val="0"/>
       </c:catAx>
       <c:valAx>
-        <c:axId val="363931600"/>
+        <c:axId val="217763272"/>
         <c:scaling>
           <c:orientation val="minMax"/>
         </c:scaling>
@@ -688,7 +703,7 @@
             <a:endParaRPr lang="en-US"/>
           </a:p>
         </c:txPr>
-        <c:crossAx val="363935128"/>
+        <c:crossAx val="217762880"/>
         <c:crosses val="autoZero"/>
         <c:crossBetween val="between"/>
       </c:valAx>
@@ -742,7 +757,6 @@
   </mc:AlternateContent>
   <c:chart>
     <c:title>
-      <c:layout/>
       <c:overlay val="0"/>
       <c:spPr>
         <a:noFill/>
@@ -866,11 +880,11 @@
           <c:showPercent val="0"/>
           <c:showBubbleSize val="0"/>
         </c:dLbls>
-        <c:axId val="545479992"/>
-        <c:axId val="545476072"/>
+        <c:axId val="217759352"/>
+        <c:axId val="217763664"/>
       </c:radarChart>
       <c:catAx>
-        <c:axId val="545479992"/>
+        <c:axId val="217759352"/>
         <c:scaling>
           <c:orientation val="minMax"/>
         </c:scaling>
@@ -913,7 +927,7 @@
             <a:endParaRPr lang="en-US"/>
           </a:p>
         </c:txPr>
-        <c:crossAx val="545476072"/>
+        <c:crossAx val="217763664"/>
         <c:crosses val="autoZero"/>
         <c:auto val="1"/>
         <c:lblAlgn val="ctr"/>
@@ -921,7 +935,7 @@
         <c:noMultiLvlLbl val="0"/>
       </c:catAx>
       <c:valAx>
-        <c:axId val="545476072"/>
+        <c:axId val="217763664"/>
         <c:scaling>
           <c:orientation val="minMax"/>
         </c:scaling>
@@ -972,7 +986,7 @@
             <a:endParaRPr lang="en-US"/>
           </a:p>
         </c:txPr>
-        <c:crossAx val="545479992"/>
+        <c:crossAx val="217759352"/>
         <c:crosses val="autoZero"/>
         <c:crossBetween val="between"/>
       </c:valAx>
@@ -1026,7 +1040,6 @@
   </mc:AlternateContent>
   <c:chart>
     <c:title>
-      <c:layout/>
       <c:overlay val="0"/>
       <c:spPr>
         <a:noFill/>
@@ -1150,11 +1163,11 @@
           <c:showPercent val="0"/>
           <c:showBubbleSize val="0"/>
         </c:dLbls>
-        <c:axId val="545472544"/>
-        <c:axId val="545482736"/>
+        <c:axId val="217760528"/>
+        <c:axId val="217764448"/>
       </c:radarChart>
       <c:catAx>
-        <c:axId val="545472544"/>
+        <c:axId val="217760528"/>
         <c:scaling>
           <c:orientation val="minMax"/>
         </c:scaling>
@@ -1197,7 +1210,7 @@
             <a:endParaRPr lang="en-US"/>
           </a:p>
         </c:txPr>
-        <c:crossAx val="545482736"/>
+        <c:crossAx val="217764448"/>
         <c:crosses val="autoZero"/>
         <c:auto val="1"/>
         <c:lblAlgn val="ctr"/>
@@ -1205,7 +1218,7 @@
         <c:noMultiLvlLbl val="0"/>
       </c:catAx>
       <c:valAx>
-        <c:axId val="545482736"/>
+        <c:axId val="217764448"/>
         <c:scaling>
           <c:orientation val="minMax"/>
         </c:scaling>
@@ -1256,7 +1269,7 @@
             <a:endParaRPr lang="en-US"/>
           </a:p>
         </c:txPr>
-        <c:crossAx val="545472544"/>
+        <c:crossAx val="217760528"/>
         <c:crosses val="autoZero"/>
         <c:crossBetween val="between"/>
       </c:valAx>
@@ -4286,6 +4299,13 @@
         </dgm:presLayoutVars>
       </dgm:prSet>
       <dgm:spPr/>
+      <dgm:t>
+        <a:bodyPr/>
+        <a:lstStyle/>
+        <a:p>
+          <a:endParaRPr lang="en-US"/>
+        </a:p>
+      </dgm:t>
     </dgm:pt>
     <dgm:pt modelId="{391554B6-BC90-4DD9-B35F-6B15578B4D08}" type="pres">
       <dgm:prSet presAssocID="{2F88B9DD-B566-4B6A-B565-2033BF7FCCFC}" presName="hierFlow" presStyleCnt="0"/>
@@ -4312,6 +4332,13 @@
         </dgm:presLayoutVars>
       </dgm:prSet>
       <dgm:spPr/>
+      <dgm:t>
+        <a:bodyPr/>
+        <a:lstStyle/>
+        <a:p>
+          <a:endParaRPr lang="en-US"/>
+        </a:p>
+      </dgm:t>
     </dgm:pt>
     <dgm:pt modelId="{80C872C0-F8F2-43EA-BD39-AF87B2DB416D}" type="pres">
       <dgm:prSet presAssocID="{66B129AF-869F-4717-B17D-4EEE063615BF}" presName="hierChild2" presStyleCnt="0"/>
@@ -4320,6 +4347,13 @@
     <dgm:pt modelId="{C0733242-7F5E-4583-B014-99CAE59565A2}" type="pres">
       <dgm:prSet presAssocID="{1BA408A6-5F25-4AEB-9DE2-CE9CFC7E5B71}" presName="Name19" presStyleLbl="parChTrans1D2" presStyleIdx="0" presStyleCnt="3"/>
       <dgm:spPr/>
+      <dgm:t>
+        <a:bodyPr/>
+        <a:lstStyle/>
+        <a:p>
+          <a:endParaRPr lang="en-US"/>
+        </a:p>
+      </dgm:t>
     </dgm:pt>
     <dgm:pt modelId="{00370F7A-E1C2-49D1-B069-CB466E1C5199}" type="pres">
       <dgm:prSet presAssocID="{A3F4B639-3C25-41D9-BAF6-E95C1BF754D5}" presName="Name21" presStyleCnt="0"/>
@@ -4343,6 +4377,13 @@
     <dgm:pt modelId="{D7D31D14-1E93-433B-855D-5711188FD657}" type="pres">
       <dgm:prSet presAssocID="{51D9D0DB-910B-43D6-A78B-2FAD4B91A4ED}" presName="Name19" presStyleLbl="parChTrans1D2" presStyleIdx="1" presStyleCnt="3"/>
       <dgm:spPr/>
+      <dgm:t>
+        <a:bodyPr/>
+        <a:lstStyle/>
+        <a:p>
+          <a:endParaRPr lang="en-US"/>
+        </a:p>
+      </dgm:t>
     </dgm:pt>
     <dgm:pt modelId="{832A601B-E152-4721-BE21-B236E287094A}" type="pres">
       <dgm:prSet presAssocID="{56724027-9426-44CC-832A-389CFC5CEB30}" presName="Name21" presStyleCnt="0"/>
@@ -4366,6 +4407,13 @@
     <dgm:pt modelId="{41CAAA96-5A2A-40AD-AC34-F06BDDDD64F8}" type="pres">
       <dgm:prSet presAssocID="{31FDC96C-EAE8-410E-96DA-E0DD0F5F7586}" presName="Name19" presStyleLbl="parChTrans1D2" presStyleIdx="2" presStyleCnt="3"/>
       <dgm:spPr/>
+      <dgm:t>
+        <a:bodyPr/>
+        <a:lstStyle/>
+        <a:p>
+          <a:endParaRPr lang="en-US"/>
+        </a:p>
+      </dgm:t>
     </dgm:pt>
     <dgm:pt modelId="{497644A0-FD27-42F6-840C-4C922C2E080D}" type="pres">
       <dgm:prSet presAssocID="{30EDA5EE-7C55-4A70-B036-5E4D0243605B}" presName="Name21" presStyleCnt="0"/>
@@ -4392,18 +4440,18 @@
     </dgm:pt>
   </dgm:ptLst>
   <dgm:cxnLst>
+    <dgm:cxn modelId="{B7A67F9F-13D0-457F-B37E-50ABD03AF59D}" type="presOf" srcId="{56724027-9426-44CC-832A-389CFC5CEB30}" destId="{33BC30DF-0E04-4186-A8A8-2A7FCD834C74}" srcOrd="0" destOrd="0" presId="urn:microsoft.com/office/officeart/2005/8/layout/hierarchy6"/>
+    <dgm:cxn modelId="{DD68F401-4935-4D81-87A3-801DAFD3A0EA}" type="presOf" srcId="{2F88B9DD-B566-4B6A-B565-2033BF7FCCFC}" destId="{1117637E-72AB-4F47-A2AA-63409DF92B1E}" srcOrd="0" destOrd="0" presId="urn:microsoft.com/office/officeart/2005/8/layout/hierarchy6"/>
     <dgm:cxn modelId="{3F73C4BC-119C-431E-ACB0-C5364864770B}" type="presOf" srcId="{66B129AF-869F-4717-B17D-4EEE063615BF}" destId="{260FB3EC-1BBC-4443-8786-54B16FFBC457}" srcOrd="0" destOrd="0" presId="urn:microsoft.com/office/officeart/2005/8/layout/hierarchy6"/>
+    <dgm:cxn modelId="{FC2E94A1-E68A-4BB2-8006-DB6E81BE37F5}" type="presOf" srcId="{30EDA5EE-7C55-4A70-B036-5E4D0243605B}" destId="{B01D8D52-D5BC-4BFC-917F-3C51556413FD}" srcOrd="0" destOrd="0" presId="urn:microsoft.com/office/officeart/2005/8/layout/hierarchy6"/>
+    <dgm:cxn modelId="{39D1BB5E-FC32-4CDD-B58D-2936A2400BBB}" type="presOf" srcId="{1BA408A6-5F25-4AEB-9DE2-CE9CFC7E5B71}" destId="{C0733242-7F5E-4583-B014-99CAE59565A2}" srcOrd="0" destOrd="0" presId="urn:microsoft.com/office/officeart/2005/8/layout/hierarchy6"/>
+    <dgm:cxn modelId="{8A8463E6-3E7B-466A-AA90-3BBDD27A8BA7}" srcId="{2F88B9DD-B566-4B6A-B565-2033BF7FCCFC}" destId="{66B129AF-869F-4717-B17D-4EEE063615BF}" srcOrd="0" destOrd="0" parTransId="{5111BFE0-56C9-42EB-B487-B4DB5DD99D98}" sibTransId="{A2E133B8-88C8-41ED-9337-BD7590EDCEC8}"/>
+    <dgm:cxn modelId="{1808165F-A0EF-4ED5-BA96-81F889632FFB}" srcId="{66B129AF-869F-4717-B17D-4EEE063615BF}" destId="{30EDA5EE-7C55-4A70-B036-5E4D0243605B}" srcOrd="2" destOrd="0" parTransId="{31FDC96C-EAE8-410E-96DA-E0DD0F5F7586}" sibTransId="{87AFFDEF-904B-4263-BF81-9DACBFDF6985}"/>
+    <dgm:cxn modelId="{D3DDBDDF-ADE7-48E4-BAAA-E3DC1946A46C}" type="presOf" srcId="{31FDC96C-EAE8-410E-96DA-E0DD0F5F7586}" destId="{41CAAA96-5A2A-40AD-AC34-F06BDDDD64F8}" srcOrd="0" destOrd="0" presId="urn:microsoft.com/office/officeart/2005/8/layout/hierarchy6"/>
+    <dgm:cxn modelId="{FA72365B-F0CC-4D3F-9D1A-1E5FC05DCE53}" type="presOf" srcId="{51D9D0DB-910B-43D6-A78B-2FAD4B91A4ED}" destId="{D7D31D14-1E93-433B-855D-5711188FD657}" srcOrd="0" destOrd="0" presId="urn:microsoft.com/office/officeart/2005/8/layout/hierarchy6"/>
     <dgm:cxn modelId="{C8B86C50-C1E9-440F-BB4C-43B1DAA25B5B}" type="presOf" srcId="{A3F4B639-3C25-41D9-BAF6-E95C1BF754D5}" destId="{0A1C99F2-761D-4B3F-B48B-E37412348E84}" srcOrd="0" destOrd="0" presId="urn:microsoft.com/office/officeart/2005/8/layout/hierarchy6"/>
-    <dgm:cxn modelId="{1808165F-A0EF-4ED5-BA96-81F889632FFB}" srcId="{66B129AF-869F-4717-B17D-4EEE063615BF}" destId="{30EDA5EE-7C55-4A70-B036-5E4D0243605B}" srcOrd="2" destOrd="0" parTransId="{31FDC96C-EAE8-410E-96DA-E0DD0F5F7586}" sibTransId="{87AFFDEF-904B-4263-BF81-9DACBFDF6985}"/>
     <dgm:cxn modelId="{0D4FA545-FFF8-4E0D-86B7-0A082A85258B}" srcId="{66B129AF-869F-4717-B17D-4EEE063615BF}" destId="{56724027-9426-44CC-832A-389CFC5CEB30}" srcOrd="1" destOrd="0" parTransId="{51D9D0DB-910B-43D6-A78B-2FAD4B91A4ED}" sibTransId="{EC4335F2-FE33-4720-9C2B-9C2EF2EF9AA3}"/>
-    <dgm:cxn modelId="{DD68F401-4935-4D81-87A3-801DAFD3A0EA}" type="presOf" srcId="{2F88B9DD-B566-4B6A-B565-2033BF7FCCFC}" destId="{1117637E-72AB-4F47-A2AA-63409DF92B1E}" srcOrd="0" destOrd="0" presId="urn:microsoft.com/office/officeart/2005/8/layout/hierarchy6"/>
-    <dgm:cxn modelId="{FA72365B-F0CC-4D3F-9D1A-1E5FC05DCE53}" type="presOf" srcId="{51D9D0DB-910B-43D6-A78B-2FAD4B91A4ED}" destId="{D7D31D14-1E93-433B-855D-5711188FD657}" srcOrd="0" destOrd="0" presId="urn:microsoft.com/office/officeart/2005/8/layout/hierarchy6"/>
-    <dgm:cxn modelId="{D3DDBDDF-ADE7-48E4-BAAA-E3DC1946A46C}" type="presOf" srcId="{31FDC96C-EAE8-410E-96DA-E0DD0F5F7586}" destId="{41CAAA96-5A2A-40AD-AC34-F06BDDDD64F8}" srcOrd="0" destOrd="0" presId="urn:microsoft.com/office/officeart/2005/8/layout/hierarchy6"/>
     <dgm:cxn modelId="{086C148C-B4AD-4E5E-A745-B3C71EF6511A}" srcId="{66B129AF-869F-4717-B17D-4EEE063615BF}" destId="{A3F4B639-3C25-41D9-BAF6-E95C1BF754D5}" srcOrd="0" destOrd="0" parTransId="{1BA408A6-5F25-4AEB-9DE2-CE9CFC7E5B71}" sibTransId="{7044F766-C69E-42C1-9E5A-91BD8BAB7AB2}"/>
-    <dgm:cxn modelId="{8A8463E6-3E7B-466A-AA90-3BBDD27A8BA7}" srcId="{2F88B9DD-B566-4B6A-B565-2033BF7FCCFC}" destId="{66B129AF-869F-4717-B17D-4EEE063615BF}" srcOrd="0" destOrd="0" parTransId="{5111BFE0-56C9-42EB-B487-B4DB5DD99D98}" sibTransId="{A2E133B8-88C8-41ED-9337-BD7590EDCEC8}"/>
-    <dgm:cxn modelId="{39D1BB5E-FC32-4CDD-B58D-2936A2400BBB}" type="presOf" srcId="{1BA408A6-5F25-4AEB-9DE2-CE9CFC7E5B71}" destId="{C0733242-7F5E-4583-B014-99CAE59565A2}" srcOrd="0" destOrd="0" presId="urn:microsoft.com/office/officeart/2005/8/layout/hierarchy6"/>
-    <dgm:cxn modelId="{FC2E94A1-E68A-4BB2-8006-DB6E81BE37F5}" type="presOf" srcId="{30EDA5EE-7C55-4A70-B036-5E4D0243605B}" destId="{B01D8D52-D5BC-4BFC-917F-3C51556413FD}" srcOrd="0" destOrd="0" presId="urn:microsoft.com/office/officeart/2005/8/layout/hierarchy6"/>
-    <dgm:cxn modelId="{B7A67F9F-13D0-457F-B37E-50ABD03AF59D}" type="presOf" srcId="{56724027-9426-44CC-832A-389CFC5CEB30}" destId="{33BC30DF-0E04-4186-A8A8-2A7FCD834C74}" srcOrd="0" destOrd="0" presId="urn:microsoft.com/office/officeart/2005/8/layout/hierarchy6"/>
     <dgm:cxn modelId="{339F6869-31C7-486C-BC43-79A255D185FC}" type="presParOf" srcId="{1117637E-72AB-4F47-A2AA-63409DF92B1E}" destId="{391554B6-BC90-4DD9-B35F-6B15578B4D08}" srcOrd="0" destOrd="0" presId="urn:microsoft.com/office/officeart/2005/8/layout/hierarchy6"/>
     <dgm:cxn modelId="{87A0F3B1-270B-4E2C-A4E7-B2C113F09AD8}" type="presParOf" srcId="{391554B6-BC90-4DD9-B35F-6B15578B4D08}" destId="{549C33DC-7A4E-47E9-868A-B7F4ABE69F1F}" srcOrd="0" destOrd="0" presId="urn:microsoft.com/office/officeart/2005/8/layout/hierarchy6"/>
     <dgm:cxn modelId="{8DA0D49A-389D-4D0C-AEC6-D0FB026CFC4B}" type="presParOf" srcId="{549C33DC-7A4E-47E9-868A-B7F4ABE69F1F}" destId="{303A68C2-B0B2-4239-9C51-AB71D994404D}" srcOrd="0" destOrd="0" presId="urn:microsoft.com/office/officeart/2005/8/layout/hierarchy6"/>
@@ -21432,11 +21480,7 @@
             </a:r>
             <a:r>
               <a:rPr lang="en-US" sz="1800"/>
-              <a:t>file excel xuất ra chưa ghi rõ nội dung trong tên file mà chỉ mới ghi chung chung như: ThongKe, </a:t>
-            </a:r>
-            <a:r>
-              <a:rPr lang="en-US" sz="1800"/>
-              <a:t>BaoCao</a:t>
+              <a:t>file excel xuất ra chưa ghi rõ nội dung trong tên file mà chỉ mới ghi chung chung như: ThongKe, BaoCao</a:t>
             </a:r>
             <a:r>
               <a:rPr lang="en-US" sz="1800" smtClean="0"/>
@@ -21659,11 +21703,7 @@
             </a:pPr>
             <a:r>
               <a:rPr lang="en-US" b="1"/>
-              <a:t>Yêu cầu </a:t>
-            </a:r>
-            <a:r>
-              <a:rPr lang="en-US" b="1"/>
-              <a:t>thay </a:t>
+              <a:t>Yêu cầu thay </a:t>
             </a:r>
             <a:r>
               <a:rPr lang="en-US" b="1" smtClean="0"/>
@@ -21683,11 +21723,7 @@
           <a:p>
             <a:r>
               <a:rPr lang="en-US"/>
-              <a:t>ThongKe_TranVanThoi_HangSanXuat.xls là file thống kê các máy biến áp của đơn vị Trần Văn Thơi theo hãng sản </a:t>
-            </a:r>
-            <a:r>
-              <a:rPr lang="en-US"/>
-              <a:t>xuất</a:t>
+              <a:t>ThongKe_TranVanThoi_HangSanXuat.xls là file thống kê các máy biến áp của đơn vị Trần Văn Thơi theo hãng sản xuất</a:t>
             </a:r>
             <a:r>
               <a:rPr lang="en-US" smtClean="0"/>
@@ -21887,11 +21923,7 @@
             </a:pPr>
             <a:r>
               <a:rPr lang="en-US" sz="1800" b="1"/>
-              <a:t>Loại yêu cầu </a:t>
-            </a:r>
-            <a:r>
-              <a:rPr lang="en-US" sz="1800" b="1"/>
-              <a:t>thay </a:t>
+              <a:t>Loại yêu cầu thay </a:t>
             </a:r>
             <a:r>
               <a:rPr lang="en-US" sz="1800" b="1" smtClean="0"/>
@@ -21905,11 +21937,7 @@
             </a:r>
             <a:r>
               <a:rPr lang="en-US" sz="1800"/>
-              <a:t>trì hoàn thiện. Do chức năng xuất file excel hiện hành đã làm việc đúng chức năng, tuy nhiên có thể hoàn thiện thêm phần thay đổi tên để giúp cho người dùng dễ quản lý hơn, thay vì phải tự đổi </a:t>
-            </a:r>
-            <a:r>
-              <a:rPr lang="en-US" sz="1800"/>
-              <a:t>tên</a:t>
+              <a:t>trì hoàn thiện. Do chức năng xuất file excel hiện hành đã làm việc đúng chức năng, tuy nhiên có thể hoàn thiện thêm phần thay đổi tên để giúp cho người dùng dễ quản lý hơn, thay vì phải tự đổi tên</a:t>
             </a:r>
             <a:r>
               <a:rPr lang="en-US" sz="1800" smtClean="0"/>
@@ -21994,7 +22022,6 @@
               <a:rPr lang="en-US"/>
               <a:t>Yêu cầu 1</a:t>
             </a:r>
-            <a:endParaRPr lang="en-US"/>
           </a:p>
         </p:txBody>
       </p:sp>
@@ -22041,11 +22068,7 @@
             </a:pPr>
             <a:r>
               <a:rPr lang="en-US" b="1"/>
-              <a:t>Các </a:t>
-            </a:r>
-            <a:r>
-              <a:rPr lang="en-US" b="1"/>
-              <a:t>giải </a:t>
+              <a:t>Các giải </a:t>
             </a:r>
             <a:r>
               <a:rPr lang="en-US" b="1" smtClean="0"/>
@@ -22056,23 +22079,15 @@
           <a:p>
             <a:r>
               <a:rPr lang="en-US"/>
-              <a:t>Giải </a:t>
+              <a:t>Giải pháp </a:t>
+            </a:r>
+            <a:r>
+              <a:rPr lang="en-US" smtClean="0"/>
+              <a:t>1: Thay </a:t>
             </a:r>
             <a:r>
               <a:rPr lang="en-US"/>
-              <a:t>pháp </a:t>
-            </a:r>
-            <a:r>
-              <a:rPr lang="en-US" smtClean="0"/>
-              <a:t>1: Thay </a:t>
-            </a:r>
-            <a:r>
-              <a:rPr lang="en-US"/>
-              <a:t>đổi controller để có thể truyền nội dung đang muốn xuất báo cáo qua cho view. Cập nhật lại các file view để có thể nhận thông tin từ controller và xuất file có tên tương ứng. Nhân lực: 1 người, thành thạo kỹ năng xuất file excel từ php. Công cụ sử dụng: Notepad++. Dùng để chỉnh sửa các file nguồn. Thơi gian thực hiện: 1 </a:t>
-            </a:r>
-            <a:r>
-              <a:rPr lang="en-US"/>
-              <a:t>ngày</a:t>
+              <a:t>đổi controller để có thể truyền nội dung đang muốn xuất báo cáo qua cho view. Cập nhật lại các file view để có thể nhận thông tin từ controller và xuất file có tên tương ứng. Nhân lực: 1 người, thành thạo kỹ năng xuất file excel từ php. Công cụ sử dụng: Notepad++. Dùng để chỉnh sửa các file nguồn. Thơi gian thực hiện: 1 ngày</a:t>
             </a:r>
             <a:r>
               <a:rPr lang="en-US" smtClean="0"/>
@@ -22220,13 +22235,8 @@
             </a:r>
             <a:r>
               <a:rPr lang="en-US"/>
-              <a:t>: Chức năng cập nhật, phần combo box cho phép xem các máy biến áp theo đơn vị, khi người dùng chọn Xem, thì nội dung trang được tải lại, đồng thời nội dung của combox bị reset lại giá trị “Phòng KH-KT Công ty Điện Lực Cà Mau</a:t>
-            </a:r>
-            <a:r>
-              <a:rPr lang="en-US"/>
-              <a:t>”. </a:t>
-            </a:r>
-            <a:endParaRPr lang="en-US"/>
+              <a:t>: Chức năng cập nhật, phần combo box cho phép xem các máy biến áp theo đơn vị, khi người dùng chọn Xem, thì nội dung trang được tải lại, đồng thời nội dung của combox bị reset lại giá trị “Phòng KH-KT Công ty Điện Lực Cà Mau”. </a:t>
+            </a:r>
           </a:p>
         </p:txBody>
       </p:sp>
@@ -22367,7 +22377,6 @@
               <a:rPr lang="en-US"/>
               <a:t>: Bảo trì hoàn thiện. Do chức năng xem máy biến áp theo đơn vị đã thực hiện đúng chức năng. Tuy nhiên còn gây nhầm lẫn cho người dùng và mất thời gian load lại nguyên trang khi dữ liệu lớn.</a:t>
             </a:r>
-            <a:endParaRPr lang="en-US"/>
           </a:p>
         </p:txBody>
       </p:sp>
@@ -22469,11 +22478,7 @@
             </a:r>
             <a:r>
               <a:rPr lang="en-US" sz="1600"/>
-              <a:t>: Cao, do người sử dụng hệ thống khi tiếp xúc nhiều với hệ thống sẽ rất dễ bị nhầm </a:t>
-            </a:r>
-            <a:r>
-              <a:rPr lang="en-US" sz="1600"/>
-              <a:t>lẫn</a:t>
+              <a:t>: Cao, do người sử dụng hệ thống khi tiếp xúc nhiều với hệ thống sẽ rất dễ bị nhầm lẫn</a:t>
             </a:r>
             <a:r>
               <a:rPr lang="en-US" sz="1600" smtClean="0"/>
@@ -22498,11 +22503,7 @@
           <a:p>
             <a:r>
               <a:rPr lang="en-US" sz="1600"/>
-              <a:t>Tài liệu: cập </a:t>
-            </a:r>
-            <a:r>
-              <a:rPr lang="en-US" sz="1600"/>
-              <a:t>nhật </a:t>
+              <a:t>Tài liệu: cập nhật </a:t>
             </a:r>
             <a:r>
               <a:rPr lang="en-US" sz="1600" smtClean="0"/>
@@ -22510,11 +22511,7 @@
             </a:r>
             <a:r>
               <a:rPr lang="en-US" sz="1600"/>
-              <a:t>tài liệu thiết kế liên quan đến kỹ </a:t>
-            </a:r>
-            <a:r>
-              <a:rPr lang="en-US" sz="1600"/>
-              <a:t>thuật </a:t>
+              <a:t>tài liệu thiết kế liên quan đến kỹ thuật </a:t>
             </a:r>
             <a:r>
               <a:rPr lang="en-US" sz="1600" smtClean="0"/>
@@ -22567,11 +22564,7 @@
             <a:pPr lvl="1"/>
             <a:r>
               <a:rPr lang="en-US" sz="1400"/>
-              <a:t>Thời gian: 1 </a:t>
-            </a:r>
-            <a:r>
-              <a:rPr lang="en-US" sz="1400"/>
-              <a:t>ngày</a:t>
+              <a:t>Thời gian: 1 ngày</a:t>
             </a:r>
             <a:r>
               <a:rPr lang="en-US" sz="1400" smtClean="0"/>
@@ -22597,11 +22590,7 @@
             </a:r>
             <a:r>
               <a:rPr lang="en-US" sz="1600"/>
-              <a:t>giải pháp 1 là giải pháp để giải quyết vấn đề vì giải pháp này không cần lưu nhiều biến, thành viên có kỹ năng về ajax không cần huấn luyện </a:t>
-            </a:r>
-            <a:r>
-              <a:rPr lang="en-US" sz="1600"/>
-              <a:t>nhiều</a:t>
+              <a:t>giải pháp 1 là giải pháp để giải quyết vấn đề vì giải pháp này không cần lưu nhiều biến, thành viên có kỹ năng về ajax không cần huấn luyện nhiều</a:t>
             </a:r>
             <a:r>
               <a:rPr lang="en-US" sz="1600" smtClean="0"/>
@@ -22745,11 +22734,7 @@
             </a:r>
             <a:r>
               <a:rPr lang="en-US"/>
-              <a:t>:  Thiết kế lại giao diện cho đẹp hơn và dễ sử dụng </a:t>
-            </a:r>
-            <a:r>
-              <a:rPr lang="en-US"/>
-              <a:t>hơn</a:t>
+              <a:t>:  Thiết kế lại giao diện cho đẹp hơn và dễ sử dụng hơn</a:t>
             </a:r>
             <a:r>
               <a:rPr lang="en-US" smtClean="0"/>
@@ -22766,11 +22751,7 @@
             </a:r>
             <a:r>
               <a:rPr lang="en-US"/>
-              <a:t>: Bảo trì hoàn thiện. Do hệ thống hiện tại đã có giao diện sử dụng được, nhưng chưa được đẹp và tiện cho người sử </a:t>
-            </a:r>
-            <a:r>
-              <a:rPr lang="en-US"/>
-              <a:t>dụng</a:t>
+              <a:t>: Bảo trì hoàn thiện. Do hệ thống hiện tại đã có giao diện sử dụng được, nhưng chưa được đẹp và tiện cho người sử dụng</a:t>
             </a:r>
             <a:r>
               <a:rPr lang="en-US" smtClean="0"/>
@@ -22787,11 +22768,7 @@
             </a:r>
             <a:r>
               <a:rPr lang="en-US"/>
-              <a:t>: Cao, do sử dụng hệ thống thì tính thẩm mỹ và tiện dụng cũng góp phần làm nên thành công của một sản </a:t>
-            </a:r>
-            <a:r>
-              <a:rPr lang="en-US"/>
-              <a:t>phẩm</a:t>
+              <a:t>: Cao, do sử dụng hệ thống thì tính thẩm mỹ và tiện dụng cũng góp phần làm nên thành công của một sản phẩm</a:t>
             </a:r>
             <a:r>
               <a:rPr lang="en-US" smtClean="0"/>
@@ -22918,11 +22895,7 @@
             </a:pPr>
             <a:r>
               <a:rPr lang="en-US" b="1"/>
-              <a:t>Các </a:t>
-            </a:r>
-            <a:r>
-              <a:rPr lang="en-US" b="1"/>
-              <a:t>giải </a:t>
+              <a:t>Các giải </a:t>
             </a:r>
             <a:r>
               <a:rPr lang="en-US" b="1" smtClean="0"/>
@@ -22967,11 +22940,7 @@
             <a:pPr lvl="1"/>
             <a:r>
               <a:rPr lang="en-US"/>
-              <a:t>Cần 1 người thành thạo về sử dụng CSS. Thời gian: 1 </a:t>
-            </a:r>
-            <a:r>
-              <a:rPr lang="en-US"/>
-              <a:t>tuần</a:t>
+              <a:t>Cần 1 người thành thạo về sử dụng CSS. Thời gian: 1 tuần</a:t>
             </a:r>
             <a:r>
               <a:rPr lang="en-US" smtClean="0"/>
@@ -22985,11 +22954,7 @@
             </a:pPr>
             <a:r>
               <a:rPr lang="en-US" sz="2400" b="1"/>
-              <a:t>Đề xuất giải pháp </a:t>
-            </a:r>
-            <a:r>
-              <a:rPr lang="en-US" sz="2400" b="1"/>
-              <a:t>tốt </a:t>
+              <a:t>Đề xuất giải pháp tốt </a:t>
             </a:r>
             <a:r>
               <a:rPr lang="en-US" sz="2400" b="1" smtClean="0"/>
@@ -23000,11 +22965,7 @@
           <a:p>
             <a:r>
               <a:rPr lang="en-US" sz="2400"/>
-              <a:t>Chọn giải pháp 1 là giải pháp để giải quyết vấn đề vì giải pháp này nhanh, hiệu quả. Có thành viên thành thạo về </a:t>
-            </a:r>
-            <a:r>
-              <a:rPr lang="en-US" sz="2400"/>
-              <a:t>bootstrap</a:t>
+              <a:t>Chọn giải pháp 1 là giải pháp để giải quyết vấn đề vì giải pháp này nhanh, hiệu quả. Có thành viên thành thạo về bootstrap</a:t>
             </a:r>
             <a:r>
               <a:rPr lang="en-US" sz="2400" smtClean="0"/>
@@ -23153,11 +23114,7 @@
           <a:p>
             <a:r>
               <a:rPr lang="en-US"/>
-              <a:t>Và mỗi loại tìm kiếm phải chuyển hướng sang trang khác mới tìm kiếm theo tiêu chí khác </a:t>
-            </a:r>
-            <a:r>
-              <a:rPr lang="en-US"/>
-              <a:t>được</a:t>
+              <a:t>Và mỗi loại tìm kiếm phải chuyển hướng sang trang khác mới tìm kiếm theo tiêu chí khác được</a:t>
             </a:r>
             <a:r>
               <a:rPr lang="en-US" smtClean="0"/>
@@ -23182,11 +23139,7 @@
             </a:r>
             <a:r>
               <a:rPr lang="en-US"/>
-              <a:t>kế lại chức năng tìm kiếm sao cho sử dụng 1 trang và tìm kiếm theo tất cả tiêu chí. Sử dụng Ajax để tải lại phần kết quả mà không tải lại toàn bộ </a:t>
-            </a:r>
-            <a:r>
-              <a:rPr lang="en-US"/>
-              <a:t>trang</a:t>
+              <a:t>kế lại chức năng tìm kiếm sao cho sử dụng 1 trang và tìm kiếm theo tất cả tiêu chí. Sử dụng Ajax để tải lại phần kết quả mà không tải lại toàn bộ trang</a:t>
             </a:r>
             <a:r>
               <a:rPr lang="en-US" smtClean="0"/>
@@ -23203,11 +23156,7 @@
             </a:r>
             <a:r>
               <a:rPr lang="en-US"/>
-              <a:t>: Bảo trì hoàn thiện. Do hệ thống hiện tại đã có chức năng tìm kiếm. Tuy nhiên chức năng này chưa hoạt động hiệu quả và còn rườm rà, phức </a:t>
-            </a:r>
-            <a:r>
-              <a:rPr lang="en-US"/>
-              <a:t>tạp</a:t>
+              <a:t>: Bảo trì hoàn thiện. Do hệ thống hiện tại đã có chức năng tìm kiếm. Tuy nhiên chức năng này chưa hoạt động hiệu quả và còn rườm rà, phức tạp</a:t>
             </a:r>
             <a:r>
               <a:rPr lang="en-US" smtClean="0"/>
@@ -23315,7 +23264,7 @@
         <p:spPr/>
         <p:txBody>
           <a:bodyPr>
-            <a:normAutofit/>
+            <a:normAutofit fontScale="77500" lnSpcReduction="20000"/>
           </a:bodyPr>
           <a:lstStyle/>
           <a:p>
@@ -23336,9 +23285,108 @@
           <a:p>
             <a:r>
               <a:rPr lang="en-US"/>
-              <a:t>Tài liệu: cập nhật tài liệu thiết kế mã nguồn, thiết kế giao diện.</a:t>
-            </a:r>
-            <a:endParaRPr lang="en-US" smtClean="0"/>
+              <a:t>Tài liệu: cập nhật tài liệu thiết kế mã </a:t>
+            </a:r>
+            <a:r>
+              <a:rPr lang="en-US" smtClean="0"/>
+              <a:t>nguồn</a:t>
+            </a:r>
+            <a:r>
+              <a:rPr lang="en-US"/>
+              <a:t>, thiết kế giao diện</a:t>
+            </a:r>
+            <a:r>
+              <a:rPr lang="en-US" smtClean="0"/>
+              <a:t>.</a:t>
+            </a:r>
+          </a:p>
+          <a:p>
+            <a:pPr marL="0" indent="0">
+              <a:buNone/>
+            </a:pPr>
+            <a:r>
+              <a:rPr lang="en-US" b="1"/>
+              <a:t>Các giải pháp: </a:t>
+            </a:r>
+          </a:p>
+          <a:p>
+            <a:r>
+              <a:rPr lang="en-US"/>
+              <a:t>Giải pháp 1:</a:t>
+            </a:r>
+          </a:p>
+          <a:p>
+            <a:r>
+              <a:rPr lang="en-US"/>
+              <a:t>Viết mới hoàn toàn chức năng tìm </a:t>
+            </a:r>
+            <a:r>
+              <a:rPr lang="en-US"/>
+              <a:t>kiếm</a:t>
+            </a:r>
+            <a:r>
+              <a:rPr lang="en-US" smtClean="0"/>
+              <a:t>.</a:t>
+            </a:r>
+          </a:p>
+          <a:p>
+            <a:r>
+              <a:rPr lang="en-US" smtClean="0"/>
+              <a:t>Cần 1 người thành thạo về CodeIgniter. Thời gian: 5 ngày.</a:t>
+            </a:r>
+          </a:p>
+          <a:p>
+            <a:r>
+              <a:rPr lang="en-US" smtClean="0"/>
+              <a:t>Giải pháp 2:</a:t>
+            </a:r>
+          </a:p>
+          <a:p>
+            <a:r>
+              <a:rPr lang="en-US" smtClean="0"/>
+              <a:t>Sử dụng lại các module riêng rẽ và hợp nhất lại thành 1 module tìm kiếm theo nhiều tiêu chí.</a:t>
+            </a:r>
+          </a:p>
+          <a:p>
+            <a:r>
+              <a:rPr lang="en-US" smtClean="0"/>
+              <a:t>Cần 1 người thành thạo về CodeIgniter. Thời gian: 1 ngày.</a:t>
+            </a:r>
+          </a:p>
+          <a:p>
+            <a:pPr marL="0" indent="0">
+              <a:buNone/>
+            </a:pPr>
+            <a:r>
+              <a:rPr lang="en-US" b="1" smtClean="0"/>
+              <a:t>Đề xuất giải pháp tốt nhất: </a:t>
+            </a:r>
+            <a:r>
+              <a:rPr lang="en-US" smtClean="0"/>
+              <a:t>Chọn giải pháp 2 là giải pháp để giải quyết vấn đề vì giải pháp này nhanh, hiệu quả, an toàn và thống nhất do thông tin được lưu trữ tại 1 nguồn duy nhất. </a:t>
+            </a:r>
+          </a:p>
+          <a:p>
+            <a:pPr marL="0" indent="0">
+              <a:buNone/>
+            </a:pPr>
+            <a:r>
+              <a:rPr lang="en-US" b="1" smtClean="0"/>
+              <a:t>Quyết định</a:t>
+            </a:r>
+            <a:r>
+              <a:rPr lang="en-US" smtClean="0"/>
+              <a:t> </a:t>
+            </a:r>
+            <a:r>
+              <a:rPr lang="en-US" smtClean="0">
+                <a:solidFill>
+                  <a:srgbClr val="00B050"/>
+                </a:solidFill>
+              </a:rPr>
+              <a:t>Chấp nhận</a:t>
+            </a:r>
+            <a:endParaRPr lang="en-US"/>
           </a:p>
         </p:txBody>
       </p:sp>
@@ -23393,12 +23441,12 @@
       </p:grpSpPr>
       <p:sp>
         <p:nvSpPr>
-          <p:cNvPr id="5" name="Title 4"/>
+          <p:cNvPr id="2" name="Title 1"/>
           <p:cNvSpPr>
             <a:spLocks noGrp="1"/>
           </p:cNvSpPr>
           <p:nvPr>
-            <p:ph type="ctrTitle"/>
+            <p:ph type="title"/>
           </p:nvPr>
         </p:nvSpPr>
         <p:spPr/>
@@ -23408,7 +23456,11 @@
           <a:p>
             <a:r>
               <a:rPr lang="en-US" smtClean="0"/>
-              <a:t>Cám ơn!</a:t>
+              <a:t>Yêu cầu </a:t>
+            </a:r>
+            <a:r>
+              <a:rPr lang="en-US" smtClean="0"/>
+              <a:t>5</a:t>
             </a:r>
             <a:endParaRPr lang="en-US"/>
           </a:p>
@@ -23416,12 +23468,191 @@
       </p:sp>
       <p:sp>
         <p:nvSpPr>
-          <p:cNvPr id="6" name="Subtitle 5"/>
+          <p:cNvPr id="3" name="Content Placeholder 2"/>
           <p:cNvSpPr>
             <a:spLocks noGrp="1"/>
           </p:cNvSpPr>
           <p:nvPr>
-            <p:ph type="subTitle" idx="1"/>
+            <p:ph idx="1"/>
+          </p:nvPr>
+        </p:nvSpPr>
+        <p:spPr/>
+        <p:txBody>
+          <a:bodyPr>
+            <a:normAutofit/>
+          </a:bodyPr>
+          <a:lstStyle/>
+          <a:p>
+            <a:pPr marL="0" indent="0">
+              <a:buNone/>
+            </a:pPr>
+            <a:r>
+              <a:rPr lang="en-US" b="1"/>
+              <a:t>Hiện trạng</a:t>
+            </a:r>
+            <a:r>
+              <a:rPr lang="en-US"/>
+              <a:t>: Website hiện tại giao diện chưa thích ứng được với màn hình của thiết bị di động và </a:t>
+            </a:r>
+            <a:r>
+              <a:rPr lang="en-US"/>
+              <a:t>máy </a:t>
+            </a:r>
+            <a:r>
+              <a:rPr lang="en-US" smtClean="0"/>
+              <a:t>tính </a:t>
+            </a:r>
+            <a:r>
+              <a:rPr lang="en-US"/>
+              <a:t>bảng</a:t>
+            </a:r>
+            <a:r>
+              <a:rPr lang="en-US" smtClean="0"/>
+              <a:t>.</a:t>
+            </a:r>
+          </a:p>
+          <a:p>
+            <a:pPr marL="0" indent="0">
+              <a:buNone/>
+            </a:pPr>
+            <a:r>
+              <a:rPr lang="en-US" b="1"/>
+              <a:t>Yêu cầu thay đổi</a:t>
+            </a:r>
+            <a:r>
+              <a:rPr lang="en-US"/>
+              <a:t>: </a:t>
+            </a:r>
+            <a:r>
+              <a:rPr lang="en-US" smtClean="0"/>
+              <a:t>Thiết </a:t>
+            </a:r>
+            <a:r>
+              <a:rPr lang="en-US"/>
+              <a:t>kế thêm 1 phiên bản giao diện của hệ thống trên điện thoại di động và máy tính </a:t>
+            </a:r>
+            <a:r>
+              <a:rPr lang="en-US"/>
+              <a:t>bảng</a:t>
+            </a:r>
+            <a:r>
+              <a:rPr lang="en-US" smtClean="0"/>
+              <a:t>.</a:t>
+            </a:r>
+          </a:p>
+          <a:p>
+            <a:pPr marL="0" indent="0">
+              <a:buNone/>
+            </a:pPr>
+            <a:r>
+              <a:rPr lang="en-US" b="1"/>
+              <a:t>Loại yêu cầu thay đổi</a:t>
+            </a:r>
+            <a:r>
+              <a:rPr lang="en-US"/>
+              <a:t>: Bảo trì hoàn thiện. Do hệ thống hiện tại chưa có giao diện để thích ứng với các </a:t>
+            </a:r>
+            <a:r>
+              <a:rPr lang="en-US"/>
+              <a:t>thiết </a:t>
+            </a:r>
+            <a:r>
+              <a:rPr lang="en-US" smtClean="0"/>
+              <a:t>bị </a:t>
+            </a:r>
+            <a:r>
+              <a:rPr lang="en-US"/>
+              <a:t>di </a:t>
+            </a:r>
+            <a:r>
+              <a:rPr lang="en-US"/>
+              <a:t>động</a:t>
+            </a:r>
+            <a:r>
+              <a:rPr lang="en-US" smtClean="0"/>
+              <a:t>.</a:t>
+            </a:r>
+          </a:p>
+          <a:p>
+            <a:pPr marL="0" indent="0">
+              <a:buNone/>
+            </a:pPr>
+            <a:r>
+              <a:rPr lang="en-US" b="1"/>
+              <a:t>Mức ưu tiên  </a:t>
+            </a:r>
+            <a:r>
+              <a:rPr lang="en-US"/>
+              <a:t>Cao. Do chức năng này sẽ đem lại lợi ích rất lớn cho người dùng về mặt quản lý máy biến áp. Khi chỉ cần vào các thiết bị di động là có thể quản lý hệ thống dễ </a:t>
+            </a:r>
+            <a:r>
+              <a:rPr lang="en-US"/>
+              <a:t>dàng</a:t>
+            </a:r>
+            <a:r>
+              <a:rPr lang="en-US" smtClean="0"/>
+              <a:t>.</a:t>
+            </a:r>
+          </a:p>
+        </p:txBody>
+      </p:sp>
+    </p:spTree>
+    <p:extLst>
+      <p:ext uri="{BB962C8B-B14F-4D97-AF65-F5344CB8AC3E}">
+        <p14:creationId xmlns:p14="http://schemas.microsoft.com/office/powerpoint/2010/main" val="3410606164"/>
+      </p:ext>
+    </p:extLst>
+  </p:cSld>
+  <p:clrMapOvr>
+    <a:masterClrMapping/>
+  </p:clrMapOvr>
+  <mc:AlternateContent xmlns:mc="http://schemas.openxmlformats.org/markup-compatibility/2006" xmlns:p14="http://schemas.microsoft.com/office/powerpoint/2010/main">
+    <mc:Choice Requires="p14">
+      <p:transition spd="med" p14:dur="700">
+        <p:fade/>
+      </p:transition>
+    </mc:Choice>
+    <mc:Fallback xmlns="">
+      <p:transition spd="med">
+        <p:fade/>
+      </p:transition>
+    </mc:Fallback>
+  </mc:AlternateContent>
+  <p:timing>
+    <p:tnLst>
+      <p:par>
+        <p:cTn id="1" dur="indefinite" restart="never" nodeType="tmRoot"/>
+      </p:par>
+    </p:tnLst>
+  </p:timing>
+</p:sld>
+</file>
+
+<file path=ppt/slides/slide29.xml><?xml version="1.0" encoding="utf-8"?>
+<p:sld xmlns:a="http://schemas.openxmlformats.org/drawingml/2006/main" xmlns:r="http://schemas.openxmlformats.org/officeDocument/2006/relationships" xmlns:p="http://schemas.openxmlformats.org/presentationml/2006/main">
+  <p:cSld>
+    <p:spTree>
+      <p:nvGrpSpPr>
+        <p:cNvPr id="1" name=""/>
+        <p:cNvGrpSpPr/>
+        <p:nvPr/>
+      </p:nvGrpSpPr>
+      <p:grpSpPr>
+        <a:xfrm>
+          <a:off x="0" y="0"/>
+          <a:ext cx="0" cy="0"/>
+          <a:chOff x="0" y="0"/>
+          <a:chExt cx="0" cy="0"/>
+        </a:xfrm>
+      </p:grpSpPr>
+      <p:sp>
+        <p:nvSpPr>
+          <p:cNvPr id="2" name="Title 1"/>
+          <p:cNvSpPr>
+            <a:spLocks noGrp="1"/>
+          </p:cNvSpPr>
+          <p:nvPr>
+            <p:ph type="title"/>
           </p:nvPr>
         </p:nvSpPr>
         <p:spPr/>
@@ -23429,6 +23660,140 @@
           <a:bodyPr/>
           <a:lstStyle/>
           <a:p>
+            <a:r>
+              <a:rPr lang="en-US" smtClean="0"/>
+              <a:t>Yêu cầu </a:t>
+            </a:r>
+            <a:r>
+              <a:rPr lang="en-US" smtClean="0"/>
+              <a:t>5</a:t>
+            </a:r>
+            <a:endParaRPr lang="en-US"/>
+          </a:p>
+        </p:txBody>
+      </p:sp>
+      <p:sp>
+        <p:nvSpPr>
+          <p:cNvPr id="3" name="Content Placeholder 2"/>
+          <p:cNvSpPr>
+            <a:spLocks noGrp="1"/>
+          </p:cNvSpPr>
+          <p:nvPr>
+            <p:ph idx="1"/>
+          </p:nvPr>
+        </p:nvSpPr>
+        <p:spPr/>
+        <p:txBody>
+          <a:bodyPr>
+            <a:normAutofit lnSpcReduction="10000"/>
+          </a:bodyPr>
+          <a:lstStyle/>
+          <a:p>
+            <a:pPr marL="0" indent="0">
+              <a:buNone/>
+            </a:pPr>
+            <a:r>
+              <a:rPr lang="en-US" b="1"/>
+              <a:t>Các thành phần bị ảnh hưởng </a:t>
+            </a:r>
+          </a:p>
+          <a:p>
+            <a:r>
+              <a:rPr lang="en-US"/>
+              <a:t>Chương trình: các file CSS liên quan đến giao diện để thích ứng với giao diện trên các thiết bị di động.</a:t>
+            </a:r>
+          </a:p>
+          <a:p>
+            <a:r>
+              <a:rPr lang="en-US"/>
+              <a:t>Tài liệu: cập nhật tài liệu thiết </a:t>
+            </a:r>
+            <a:r>
+              <a:rPr lang="en-US"/>
+              <a:t>kế </a:t>
+            </a:r>
+            <a:r>
+              <a:rPr lang="en-US" smtClean="0"/>
+              <a:t>giao </a:t>
+            </a:r>
+          </a:p>
+          <a:p>
+            <a:pPr marL="0" indent="0">
+              <a:buNone/>
+            </a:pPr>
+            <a:r>
+              <a:rPr lang="en-US" b="1"/>
+              <a:t>Các giải pháp: </a:t>
+            </a:r>
+          </a:p>
+          <a:p>
+            <a:r>
+              <a:rPr lang="en-US"/>
+              <a:t>Giải pháp 1:</a:t>
+            </a:r>
+          </a:p>
+          <a:p>
+            <a:pPr lvl="1"/>
+            <a:r>
+              <a:rPr lang="en-US"/>
+              <a:t>Viết mới hoàn toàn giao diện.</a:t>
+            </a:r>
+          </a:p>
+          <a:p>
+            <a:pPr lvl="1"/>
+            <a:r>
+              <a:rPr lang="en-US"/>
+              <a:t>Cần 1 người thành thạo về CSS. Thời gian: 5 ngày.</a:t>
+            </a:r>
+          </a:p>
+          <a:p>
+            <a:r>
+              <a:rPr lang="en-US"/>
+              <a:t>Giải pháp 2:</a:t>
+            </a:r>
+          </a:p>
+          <a:p>
+            <a:pPr lvl="1"/>
+            <a:r>
+              <a:rPr lang="en-US"/>
+              <a:t>Sử dụng Boostrap kết hợp với viết file less compile ra CSS để giao diện có thể thích ứng với thiết bị di động.</a:t>
+            </a:r>
+          </a:p>
+          <a:p>
+            <a:pPr lvl="1"/>
+            <a:r>
+              <a:rPr lang="en-US"/>
+              <a:t>Cần 1 người thành thạo về Bootstrap và Less. Thời gian: 1 </a:t>
+            </a:r>
+            <a:r>
+              <a:rPr lang="en-US"/>
+              <a:t>ngày</a:t>
+            </a:r>
+            <a:r>
+              <a:rPr lang="en-US" smtClean="0"/>
+              <a:t>.</a:t>
+            </a:r>
+          </a:p>
+          <a:p>
+            <a:pPr marL="0" indent="0">
+              <a:buNone/>
+            </a:pPr>
+            <a:r>
+              <a:rPr lang="en-US" b="1" smtClean="0"/>
+              <a:t>Quyết định</a:t>
+            </a:r>
+            <a:r>
+              <a:rPr lang="en-US" smtClean="0"/>
+              <a:t> </a:t>
+            </a:r>
+            <a:r>
+              <a:rPr lang="en-US" smtClean="0">
+                <a:solidFill>
+                  <a:srgbClr val="00B050"/>
+                </a:solidFill>
+              </a:rPr>
+              <a:t>Chấp nhận</a:t>
+            </a:r>
             <a:endParaRPr lang="en-US"/>
           </a:p>
         </p:txBody>
@@ -23436,7 +23801,7 @@
     </p:spTree>
     <p:extLst>
       <p:ext uri="{BB962C8B-B14F-4D97-AF65-F5344CB8AC3E}">
-        <p14:creationId xmlns:p14="http://schemas.microsoft.com/office/powerpoint/2010/main" val="773050870"/>
+        <p14:creationId xmlns:p14="http://schemas.microsoft.com/office/powerpoint/2010/main" val="3410606164"/>
       </p:ext>
     </p:extLst>
   </p:cSld>
@@ -23565,6 +23930,2290 @@
 </p:sld>
 </file>
 
+<file path=ppt/slides/slide30.xml><?xml version="1.0" encoding="utf-8"?>
+<p:sld xmlns:a="http://schemas.openxmlformats.org/drawingml/2006/main" xmlns:r="http://schemas.openxmlformats.org/officeDocument/2006/relationships" xmlns:p="http://schemas.openxmlformats.org/presentationml/2006/main">
+  <p:cSld>
+    <p:spTree>
+      <p:nvGrpSpPr>
+        <p:cNvPr id="1" name=""/>
+        <p:cNvGrpSpPr/>
+        <p:nvPr/>
+      </p:nvGrpSpPr>
+      <p:grpSpPr>
+        <a:xfrm>
+          <a:off x="0" y="0"/>
+          <a:ext cx="0" cy="0"/>
+          <a:chOff x="0" y="0"/>
+          <a:chExt cx="0" cy="0"/>
+        </a:xfrm>
+      </p:grpSpPr>
+      <p:sp>
+        <p:nvSpPr>
+          <p:cNvPr id="2" name="Title 1"/>
+          <p:cNvSpPr>
+            <a:spLocks noGrp="1"/>
+          </p:cNvSpPr>
+          <p:nvPr>
+            <p:ph type="title"/>
+          </p:nvPr>
+        </p:nvSpPr>
+        <p:spPr/>
+        <p:txBody>
+          <a:bodyPr/>
+          <a:lstStyle/>
+          <a:p>
+            <a:r>
+              <a:rPr lang="en-US" smtClean="0"/>
+              <a:t>Yêu cầu </a:t>
+            </a:r>
+            <a:r>
+              <a:rPr lang="en-US"/>
+              <a:t>6</a:t>
+            </a:r>
+            <a:endParaRPr lang="en-US"/>
+          </a:p>
+        </p:txBody>
+      </p:sp>
+      <p:sp>
+        <p:nvSpPr>
+          <p:cNvPr id="3" name="Content Placeholder 2"/>
+          <p:cNvSpPr>
+            <a:spLocks noGrp="1"/>
+          </p:cNvSpPr>
+          <p:nvPr>
+            <p:ph idx="1"/>
+          </p:nvPr>
+        </p:nvSpPr>
+        <p:spPr/>
+        <p:txBody>
+          <a:bodyPr>
+            <a:normAutofit fontScale="92500"/>
+          </a:bodyPr>
+          <a:lstStyle/>
+          <a:p>
+            <a:pPr marL="0" indent="0">
+              <a:buNone/>
+            </a:pPr>
+            <a:r>
+              <a:rPr lang="en-US" b="1"/>
+              <a:t>Hiện trạng</a:t>
+            </a:r>
+            <a:r>
+              <a:rPr lang="en-US"/>
+              <a:t>: code chưa được chú thích rõ ràng.</a:t>
+            </a:r>
+            <a:endParaRPr lang="en-US" smtClean="0"/>
+          </a:p>
+          <a:p>
+            <a:pPr marL="0" indent="0">
+              <a:buNone/>
+            </a:pPr>
+            <a:r>
+              <a:rPr lang="en-US" b="1"/>
+              <a:t>Yêu cầu thay đổi</a:t>
+            </a:r>
+            <a:r>
+              <a:rPr lang="en-US"/>
+              <a:t>: ứng với từng hàm cần có ích nhât 1 dòng chú </a:t>
+            </a:r>
+            <a:r>
+              <a:rPr lang="en-US"/>
+              <a:t>thích</a:t>
+            </a:r>
+            <a:r>
+              <a:rPr lang="en-US" smtClean="0"/>
+              <a:t>.</a:t>
+            </a:r>
+          </a:p>
+          <a:p>
+            <a:pPr marL="0" indent="0">
+              <a:buNone/>
+            </a:pPr>
+            <a:r>
+              <a:rPr lang="en-US" b="1"/>
+              <a:t>Loại yêu cầu thay đổi</a:t>
+            </a:r>
+            <a:r>
+              <a:rPr lang="en-US"/>
+              <a:t>: Bảo trì dự phòng. Hệ thống có code chưa được chú thích rõ ràng, nên cần được chú thích rõ ràng hơn, giúp cho người phát triển hệ thống sau có thể hiểu được code nhanh chóng và dễ </a:t>
+            </a:r>
+            <a:r>
+              <a:rPr lang="en-US"/>
+              <a:t>dàng</a:t>
+            </a:r>
+            <a:r>
+              <a:rPr lang="en-US" smtClean="0"/>
+              <a:t>.</a:t>
+            </a:r>
+          </a:p>
+          <a:p>
+            <a:pPr marL="0" indent="0">
+              <a:buNone/>
+            </a:pPr>
+            <a:r>
+              <a:rPr lang="en-US" b="1"/>
+              <a:t>Mức ưu tiên</a:t>
+            </a:r>
+            <a:r>
+              <a:rPr lang="en-US"/>
+              <a:t>: Cao. Vì code có rõ ràng thì việc đọc và hiểu được chương trình mới thực sự dễ dàng.</a:t>
+            </a:r>
+            <a:endParaRPr lang="en-US" smtClean="0"/>
+          </a:p>
+          <a:p>
+            <a:pPr marL="0" indent="0">
+              <a:buNone/>
+            </a:pPr>
+            <a:r>
+              <a:rPr lang="en-US" b="1"/>
+              <a:t>Các giải pháp: </a:t>
+            </a:r>
+          </a:p>
+          <a:p>
+            <a:r>
+              <a:rPr lang="en-US"/>
+              <a:t>Giải pháp 1: ứng với từng dòng code thì chú thích ứng với một dòng comment code.</a:t>
+            </a:r>
+          </a:p>
+          <a:p>
+            <a:r>
+              <a:rPr lang="en-US"/>
+              <a:t>Giải pháp 2: ứng vói từng hàm thì có một dòng chú thích.</a:t>
+            </a:r>
+          </a:p>
+          <a:p>
+            <a:pPr marL="0" indent="0">
+              <a:buNone/>
+            </a:pPr>
+            <a:r>
+              <a:rPr lang="en-US" b="1"/>
+              <a:t>Đề xuất giải pháp tốt nhất</a:t>
+            </a:r>
+            <a:r>
+              <a:rPr lang="en-US"/>
+              <a:t>: Giải pháp 2</a:t>
+            </a:r>
+          </a:p>
+          <a:p>
+            <a:pPr marL="0" indent="0">
+              <a:buNone/>
+            </a:pPr>
+            <a:r>
+              <a:rPr lang="en-US" b="1"/>
+              <a:t>Quyết định</a:t>
+            </a:r>
+            <a:r>
+              <a:rPr lang="en-US"/>
+              <a:t> </a:t>
+            </a:r>
+            <a:r>
+              <a:rPr lang="en-US">
+                <a:solidFill>
+                  <a:srgbClr val="00B050"/>
+                </a:solidFill>
+              </a:rPr>
+              <a:t>Chấp nhận</a:t>
+            </a:r>
+            <a:endParaRPr lang="en-US"/>
+          </a:p>
+        </p:txBody>
+      </p:sp>
+    </p:spTree>
+    <p:extLst>
+      <p:ext uri="{BB962C8B-B14F-4D97-AF65-F5344CB8AC3E}">
+        <p14:creationId xmlns:p14="http://schemas.microsoft.com/office/powerpoint/2010/main" val="695044786"/>
+      </p:ext>
+    </p:extLst>
+  </p:cSld>
+  <p:clrMapOvr>
+    <a:masterClrMapping/>
+  </p:clrMapOvr>
+  <mc:AlternateContent xmlns:mc="http://schemas.openxmlformats.org/markup-compatibility/2006" xmlns:p14="http://schemas.microsoft.com/office/powerpoint/2010/main">
+    <mc:Choice Requires="p14">
+      <p:transition spd="med" p14:dur="700">
+        <p:fade/>
+      </p:transition>
+    </mc:Choice>
+    <mc:Fallback xmlns="">
+      <p:transition spd="med">
+        <p:fade/>
+      </p:transition>
+    </mc:Fallback>
+  </mc:AlternateContent>
+  <p:timing>
+    <p:tnLst>
+      <p:par>
+        <p:cTn id="1" dur="indefinite" restart="never" nodeType="tmRoot"/>
+      </p:par>
+    </p:tnLst>
+  </p:timing>
+</p:sld>
+</file>
+
+<file path=ppt/slides/slide31.xml><?xml version="1.0" encoding="utf-8"?>
+<p:sld xmlns:a="http://schemas.openxmlformats.org/drawingml/2006/main" xmlns:r="http://schemas.openxmlformats.org/officeDocument/2006/relationships" xmlns:p="http://schemas.openxmlformats.org/presentationml/2006/main">
+  <p:cSld>
+    <p:spTree>
+      <p:nvGrpSpPr>
+        <p:cNvPr id="1" name=""/>
+        <p:cNvGrpSpPr/>
+        <p:nvPr/>
+      </p:nvGrpSpPr>
+      <p:grpSpPr>
+        <a:xfrm>
+          <a:off x="0" y="0"/>
+          <a:ext cx="0" cy="0"/>
+          <a:chOff x="0" y="0"/>
+          <a:chExt cx="0" cy="0"/>
+        </a:xfrm>
+      </p:grpSpPr>
+      <p:sp>
+        <p:nvSpPr>
+          <p:cNvPr id="2" name="Title 1"/>
+          <p:cNvSpPr>
+            <a:spLocks noGrp="1"/>
+          </p:cNvSpPr>
+          <p:nvPr>
+            <p:ph type="title"/>
+          </p:nvPr>
+        </p:nvSpPr>
+        <p:spPr/>
+        <p:txBody>
+          <a:bodyPr/>
+          <a:lstStyle/>
+          <a:p>
+            <a:r>
+              <a:rPr lang="en-US" smtClean="0"/>
+              <a:t>Yêu cầu </a:t>
+            </a:r>
+            <a:r>
+              <a:rPr lang="en-US" smtClean="0"/>
+              <a:t>7</a:t>
+            </a:r>
+            <a:endParaRPr lang="en-US"/>
+          </a:p>
+        </p:txBody>
+      </p:sp>
+      <p:sp>
+        <p:nvSpPr>
+          <p:cNvPr id="3" name="Content Placeholder 2"/>
+          <p:cNvSpPr>
+            <a:spLocks noGrp="1"/>
+          </p:cNvSpPr>
+          <p:nvPr>
+            <p:ph idx="1"/>
+          </p:nvPr>
+        </p:nvSpPr>
+        <p:spPr/>
+        <p:txBody>
+          <a:bodyPr>
+            <a:normAutofit fontScale="92500" lnSpcReduction="10000"/>
+          </a:bodyPr>
+          <a:lstStyle/>
+          <a:p>
+            <a:pPr marL="0" indent="0">
+              <a:buNone/>
+            </a:pPr>
+            <a:r>
+              <a:rPr lang="en-US" b="1"/>
+              <a:t>Hiện trạng</a:t>
+            </a:r>
+            <a:r>
+              <a:rPr lang="en-US"/>
+              <a:t>: tài liệu đặc tả có một số chức năng chưa đúng với yêu cầu khách hàng. </a:t>
+            </a:r>
+          </a:p>
+          <a:p>
+            <a:pPr lvl="0"/>
+            <a:r>
+              <a:rPr lang="en-US"/>
+              <a:t>Chức năng tìm kiếm “Làm sao thể hiện được chỉ cần bấm máy 15kVA là hiện ra tất cả các MBA có công suất 15kVA của tất cả các đơn vị”, nhưng thực tế không tìm kiếm được kết quả nào,… </a:t>
+            </a:r>
+          </a:p>
+          <a:p>
+            <a:pPr lvl="0"/>
+            <a:r>
+              <a:rPr lang="en-US"/>
+              <a:t>Yêu cầu “01 MBA có thể di chuyển đến nhiều nơi làm sao biết được trước đây nó nằm ở đâu nào và hiện nay đang nằm ở đâu” trên thực tế chưa có chưc năng đáp ứng yêu cầu này.</a:t>
+            </a:r>
+          </a:p>
+          <a:p>
+            <a:pPr marL="0" indent="0">
+              <a:buNone/>
+            </a:pPr>
+            <a:r>
+              <a:rPr lang="en-US" b="1"/>
+              <a:t>Yêu cầu thay đổi</a:t>
+            </a:r>
+            <a:r>
+              <a:rPr lang="en-US"/>
+              <a:t>: cập nhật lại tài liệu đặc tả và phần mềm để phù hợp với yêu cầu của khách </a:t>
+            </a:r>
+            <a:r>
+              <a:rPr lang="en-US"/>
+              <a:t>hàng</a:t>
+            </a:r>
+            <a:r>
+              <a:rPr lang="en-US" smtClean="0"/>
+              <a:t>.</a:t>
+            </a:r>
+          </a:p>
+          <a:p>
+            <a:pPr marL="0" indent="0">
+              <a:buNone/>
+            </a:pPr>
+            <a:r>
+              <a:rPr lang="en-US" b="1"/>
+              <a:t>Loại yêu cầu thay đổi</a:t>
+            </a:r>
+            <a:r>
+              <a:rPr lang="en-US"/>
+              <a:t>: Bảo trì dự phòng. Tài liệu đặc tả các phần mô tả chức năng chưa đáp ứng được với yêu cầu khách hàng, cần được chỉnh sửa lại một cách kỹ càng về mặt ràng buộc dữ liệu, bước xử </a:t>
+            </a:r>
+            <a:r>
+              <a:rPr lang="en-US"/>
+              <a:t>lý</a:t>
+            </a:r>
+            <a:r>
+              <a:rPr lang="en-US" smtClean="0"/>
+              <a:t>.</a:t>
+            </a:r>
+          </a:p>
+          <a:p>
+            <a:pPr marL="0" indent="0">
+              <a:buNone/>
+            </a:pPr>
+            <a:r>
+              <a:rPr lang="en-US" b="1"/>
+              <a:t>Mức ưu tiên</a:t>
+            </a:r>
+            <a:r>
+              <a:rPr lang="en-US"/>
+              <a:t>: Cao. Vì là mục tiêu của hệ thống cần được hoàn thành, tài liệu đặc tả cần được viết đúng với nhứng yêu cầu </a:t>
+            </a:r>
+            <a:r>
+              <a:rPr lang="en-US"/>
+              <a:t>khách </a:t>
+            </a:r>
+            <a:r>
+              <a:rPr lang="en-US" smtClean="0"/>
+              <a:t>hang</a:t>
+            </a:r>
+          </a:p>
+        </p:txBody>
+      </p:sp>
+    </p:spTree>
+    <p:extLst>
+      <p:ext uri="{BB962C8B-B14F-4D97-AF65-F5344CB8AC3E}">
+        <p14:creationId xmlns:p14="http://schemas.microsoft.com/office/powerpoint/2010/main" val="2302774536"/>
+      </p:ext>
+    </p:extLst>
+  </p:cSld>
+  <p:clrMapOvr>
+    <a:masterClrMapping/>
+  </p:clrMapOvr>
+  <mc:AlternateContent xmlns:mc="http://schemas.openxmlformats.org/markup-compatibility/2006" xmlns:p14="http://schemas.microsoft.com/office/powerpoint/2010/main">
+    <mc:Choice Requires="p14">
+      <p:transition spd="med" p14:dur="700">
+        <p:fade/>
+      </p:transition>
+    </mc:Choice>
+    <mc:Fallback xmlns="">
+      <p:transition spd="med">
+        <p:fade/>
+      </p:transition>
+    </mc:Fallback>
+  </mc:AlternateContent>
+  <p:timing>
+    <p:tnLst>
+      <p:par>
+        <p:cTn id="1" dur="indefinite" restart="never" nodeType="tmRoot"/>
+      </p:par>
+    </p:tnLst>
+  </p:timing>
+</p:sld>
+</file>
+
+<file path=ppt/slides/slide32.xml><?xml version="1.0" encoding="utf-8"?>
+<p:sld xmlns:a="http://schemas.openxmlformats.org/drawingml/2006/main" xmlns:r="http://schemas.openxmlformats.org/officeDocument/2006/relationships" xmlns:p="http://schemas.openxmlformats.org/presentationml/2006/main">
+  <p:cSld>
+    <p:spTree>
+      <p:nvGrpSpPr>
+        <p:cNvPr id="1" name=""/>
+        <p:cNvGrpSpPr/>
+        <p:nvPr/>
+      </p:nvGrpSpPr>
+      <p:grpSpPr>
+        <a:xfrm>
+          <a:off x="0" y="0"/>
+          <a:ext cx="0" cy="0"/>
+          <a:chOff x="0" y="0"/>
+          <a:chExt cx="0" cy="0"/>
+        </a:xfrm>
+      </p:grpSpPr>
+      <p:sp>
+        <p:nvSpPr>
+          <p:cNvPr id="2" name="Title 1"/>
+          <p:cNvSpPr>
+            <a:spLocks noGrp="1"/>
+          </p:cNvSpPr>
+          <p:nvPr>
+            <p:ph type="title"/>
+          </p:nvPr>
+        </p:nvSpPr>
+        <p:spPr/>
+        <p:txBody>
+          <a:bodyPr/>
+          <a:lstStyle/>
+          <a:p>
+            <a:r>
+              <a:rPr lang="en-US" smtClean="0"/>
+              <a:t>Yêu cầu </a:t>
+            </a:r>
+            <a:r>
+              <a:rPr lang="en-US" smtClean="0"/>
+              <a:t>7</a:t>
+            </a:r>
+            <a:endParaRPr lang="en-US"/>
+          </a:p>
+        </p:txBody>
+      </p:sp>
+      <p:sp>
+        <p:nvSpPr>
+          <p:cNvPr id="3" name="Content Placeholder 2"/>
+          <p:cNvSpPr>
+            <a:spLocks noGrp="1"/>
+          </p:cNvSpPr>
+          <p:nvPr>
+            <p:ph idx="1"/>
+          </p:nvPr>
+        </p:nvSpPr>
+        <p:spPr/>
+        <p:txBody>
+          <a:bodyPr>
+            <a:normAutofit/>
+          </a:bodyPr>
+          <a:lstStyle/>
+          <a:p>
+            <a:pPr marL="0" indent="0">
+              <a:buNone/>
+            </a:pPr>
+            <a:r>
+              <a:rPr lang="en-US" b="1" smtClean="0"/>
+              <a:t>Các </a:t>
+            </a:r>
+            <a:r>
+              <a:rPr lang="en-US" b="1"/>
+              <a:t>thành phần bị </a:t>
+            </a:r>
+            <a:r>
+              <a:rPr lang="en-US" b="1"/>
+              <a:t>ảnh </a:t>
+            </a:r>
+            <a:r>
+              <a:rPr lang="en-US" b="1" smtClean="0"/>
+              <a:t>hưởng: </a:t>
+            </a:r>
+            <a:r>
+              <a:rPr lang="en-US" smtClean="0"/>
+              <a:t>Tài </a:t>
+            </a:r>
+            <a:r>
+              <a:rPr lang="en-US"/>
+              <a:t>liệu: tài liệu đặc tả, tài liệu </a:t>
+            </a:r>
+            <a:r>
+              <a:rPr lang="en-US"/>
+              <a:t>thiết </a:t>
+            </a:r>
+            <a:r>
+              <a:rPr lang="en-US" smtClean="0"/>
+              <a:t>kế.</a:t>
+            </a:r>
+          </a:p>
+          <a:p>
+            <a:pPr marL="0" indent="0">
+              <a:buNone/>
+            </a:pPr>
+            <a:r>
+              <a:rPr lang="en-US" b="1"/>
+              <a:t>Các giải pháp:</a:t>
+            </a:r>
+          </a:p>
+          <a:p>
+            <a:r>
+              <a:rPr lang="en-US"/>
+              <a:t>Giải pháp 1: cập nhập hoàn thành tài liệu đặc tả rồi mới đến cập nhật tài liêu thiết kế</a:t>
+            </a:r>
+          </a:p>
+          <a:p>
+            <a:r>
+              <a:rPr lang="en-US"/>
+              <a:t>Giải pháp 2: cập nhập song song cả 2 tài liệu đặc tả, tài liêu </a:t>
+            </a:r>
+            <a:r>
+              <a:rPr lang="en-US"/>
+              <a:t>thiết </a:t>
+            </a:r>
+            <a:r>
+              <a:rPr lang="en-US" smtClean="0"/>
+              <a:t>kế.</a:t>
+            </a:r>
+          </a:p>
+          <a:p>
+            <a:pPr marL="0" indent="0">
+              <a:buNone/>
+            </a:pPr>
+            <a:r>
+              <a:rPr lang="en-US" b="1"/>
+              <a:t>Đề xuất giải pháp tốt nhất</a:t>
+            </a:r>
+            <a:r>
+              <a:rPr lang="en-US" i="1"/>
+              <a:t>:</a:t>
+            </a:r>
+            <a:r>
+              <a:rPr lang="en-US"/>
+              <a:t> </a:t>
+            </a:r>
+            <a:r>
+              <a:rPr lang="en-US" smtClean="0"/>
+              <a:t>Giải </a:t>
+            </a:r>
+            <a:r>
+              <a:rPr lang="en-US"/>
+              <a:t>pháp </a:t>
+            </a:r>
+            <a:r>
+              <a:rPr lang="en-US" smtClean="0"/>
+              <a:t>2.</a:t>
+            </a:r>
+            <a:endParaRPr lang="en-US"/>
+          </a:p>
+          <a:p>
+            <a:pPr marL="0" indent="0">
+              <a:buNone/>
+            </a:pPr>
+            <a:r>
+              <a:rPr lang="en-US" b="1"/>
+              <a:t>Quyết định</a:t>
+            </a:r>
+            <a:r>
+              <a:rPr lang="en-US"/>
+              <a:t> </a:t>
+            </a:r>
+            <a:r>
+              <a:rPr lang="en-US">
+                <a:solidFill>
+                  <a:srgbClr val="00B050"/>
+                </a:solidFill>
+              </a:rPr>
+              <a:t>Chấp </a:t>
+            </a:r>
+            <a:r>
+              <a:rPr lang="en-US" smtClean="0">
+                <a:solidFill>
+                  <a:srgbClr val="00B050"/>
+                </a:solidFill>
+              </a:rPr>
+              <a:t>nhận</a:t>
+            </a:r>
+            <a:endParaRPr lang="en-US"/>
+          </a:p>
+          <a:p>
+            <a:pPr marL="0" indent="0">
+              <a:buNone/>
+            </a:pPr>
+            <a:endParaRPr lang="en-US" smtClean="0"/>
+          </a:p>
+        </p:txBody>
+      </p:sp>
+    </p:spTree>
+    <p:extLst>
+      <p:ext uri="{BB962C8B-B14F-4D97-AF65-F5344CB8AC3E}">
+        <p14:creationId xmlns:p14="http://schemas.microsoft.com/office/powerpoint/2010/main" val="2302774536"/>
+      </p:ext>
+    </p:extLst>
+  </p:cSld>
+  <p:clrMapOvr>
+    <a:masterClrMapping/>
+  </p:clrMapOvr>
+  <mc:AlternateContent xmlns:mc="http://schemas.openxmlformats.org/markup-compatibility/2006" xmlns:p14="http://schemas.microsoft.com/office/powerpoint/2010/main">
+    <mc:Choice Requires="p14">
+      <p:transition spd="med" p14:dur="700">
+        <p:fade/>
+      </p:transition>
+    </mc:Choice>
+    <mc:Fallback xmlns="">
+      <p:transition spd="med">
+        <p:fade/>
+      </p:transition>
+    </mc:Fallback>
+  </mc:AlternateContent>
+  <p:timing>
+    <p:tnLst>
+      <p:par>
+        <p:cTn id="1" dur="indefinite" restart="never" nodeType="tmRoot"/>
+      </p:par>
+    </p:tnLst>
+  </p:timing>
+</p:sld>
+</file>
+
+<file path=ppt/slides/slide33.xml><?xml version="1.0" encoding="utf-8"?>
+<p:sld xmlns:a="http://schemas.openxmlformats.org/drawingml/2006/main" xmlns:r="http://schemas.openxmlformats.org/officeDocument/2006/relationships" xmlns:p="http://schemas.openxmlformats.org/presentationml/2006/main">
+  <p:cSld>
+    <p:spTree>
+      <p:nvGrpSpPr>
+        <p:cNvPr id="1" name=""/>
+        <p:cNvGrpSpPr/>
+        <p:nvPr/>
+      </p:nvGrpSpPr>
+      <p:grpSpPr>
+        <a:xfrm>
+          <a:off x="0" y="0"/>
+          <a:ext cx="0" cy="0"/>
+          <a:chOff x="0" y="0"/>
+          <a:chExt cx="0" cy="0"/>
+        </a:xfrm>
+      </p:grpSpPr>
+      <p:sp>
+        <p:nvSpPr>
+          <p:cNvPr id="2" name="Title 1"/>
+          <p:cNvSpPr>
+            <a:spLocks noGrp="1"/>
+          </p:cNvSpPr>
+          <p:nvPr>
+            <p:ph type="title"/>
+          </p:nvPr>
+        </p:nvSpPr>
+        <p:spPr/>
+        <p:txBody>
+          <a:bodyPr/>
+          <a:lstStyle/>
+          <a:p>
+            <a:r>
+              <a:rPr lang="en-US" smtClean="0"/>
+              <a:t>Yêu cầu </a:t>
+            </a:r>
+            <a:r>
+              <a:rPr lang="en-US" smtClean="0"/>
+              <a:t>8</a:t>
+            </a:r>
+            <a:endParaRPr lang="en-US"/>
+          </a:p>
+        </p:txBody>
+      </p:sp>
+      <p:sp>
+        <p:nvSpPr>
+          <p:cNvPr id="3" name="Content Placeholder 2"/>
+          <p:cNvSpPr>
+            <a:spLocks noGrp="1"/>
+          </p:cNvSpPr>
+          <p:nvPr>
+            <p:ph idx="1"/>
+          </p:nvPr>
+        </p:nvSpPr>
+        <p:spPr/>
+        <p:txBody>
+          <a:bodyPr>
+            <a:normAutofit/>
+          </a:bodyPr>
+          <a:lstStyle/>
+          <a:p>
+            <a:pPr marL="0" indent="0">
+              <a:buNone/>
+            </a:pPr>
+            <a:r>
+              <a:rPr lang="en-US" b="1"/>
+              <a:t>Hiện trạng</a:t>
+            </a:r>
+            <a:r>
+              <a:rPr lang="en-US"/>
+              <a:t>: tên hàm cần được đặt lại, thống nhất một ngôn ngữ, không thể vừa tiếng anh, vừ tiếng việt</a:t>
+            </a:r>
+            <a:r>
+              <a:rPr lang="en-US"/>
+              <a:t>. </a:t>
+            </a:r>
+            <a:endParaRPr lang="en-US" smtClean="0"/>
+          </a:p>
+          <a:p>
+            <a:pPr marL="0" indent="0">
+              <a:buNone/>
+            </a:pPr>
+            <a:endParaRPr lang="en-US"/>
+          </a:p>
+          <a:p>
+            <a:pPr marL="0" indent="0">
+              <a:buNone/>
+            </a:pPr>
+            <a:endParaRPr lang="en-US" smtClean="0"/>
+          </a:p>
+          <a:p>
+            <a:pPr marL="0" indent="0">
+              <a:buNone/>
+            </a:pPr>
+            <a:endParaRPr lang="en-US"/>
+          </a:p>
+          <a:p>
+            <a:pPr marL="0" indent="0">
+              <a:buNone/>
+            </a:pPr>
+            <a:endParaRPr lang="en-US" smtClean="0"/>
+          </a:p>
+          <a:p>
+            <a:pPr marL="0" indent="0">
+              <a:buNone/>
+            </a:pPr>
+            <a:r>
+              <a:rPr lang="en-US" b="1" smtClean="0"/>
+              <a:t>Yêu cầu thay đổi</a:t>
+            </a:r>
+            <a:r>
+              <a:rPr lang="en-US" smtClean="0"/>
+              <a:t>: sửa lại cấu trúc chương trình, đổi tên hàm.</a:t>
+            </a:r>
+          </a:p>
+          <a:p>
+            <a:pPr marL="0" indent="0">
+              <a:buNone/>
+            </a:pPr>
+            <a:r>
+              <a:rPr lang="en-US" b="1" smtClean="0"/>
+              <a:t>Loại yêu cầu thay đổi</a:t>
+            </a:r>
+            <a:r>
+              <a:rPr lang="en-US" smtClean="0"/>
+              <a:t>: Bảo trì dự phòng. Đổi lại tên hàm giúp đồng bộ code theo một ngôn ngữ một thống nhất là tiếng anh. Giúp việc đọc code trở nên dễ dàng hơn.</a:t>
+            </a:r>
+          </a:p>
+        </p:txBody>
+      </p:sp>
+      <p:pic>
+        <p:nvPicPr>
+          <p:cNvPr id="4" name="Picture 3"/>
+          <p:cNvPicPr/>
+          <p:nvPr/>
+        </p:nvPicPr>
+        <p:blipFill>
+          <a:blip r:embed="rId2">
+            <a:extLst>
+              <a:ext uri="{28A0092B-C50C-407E-A947-70E740481C1C}">
+                <a14:useLocalDpi xmlns:a14="http://schemas.microsoft.com/office/drawing/2010/main" val="0"/>
+              </a:ext>
+            </a:extLst>
+          </a:blip>
+          <a:stretch>
+            <a:fillRect/>
+          </a:stretch>
+        </p:blipFill>
+        <p:spPr>
+          <a:xfrm>
+            <a:off x="2150534" y="2514600"/>
+            <a:ext cx="4842933" cy="1371600"/>
+          </a:xfrm>
+          <a:prstGeom prst="rect">
+            <a:avLst/>
+          </a:prstGeom>
+        </p:spPr>
+      </p:pic>
+    </p:spTree>
+    <p:extLst>
+      <p:ext uri="{BB962C8B-B14F-4D97-AF65-F5344CB8AC3E}">
+        <p14:creationId xmlns:p14="http://schemas.microsoft.com/office/powerpoint/2010/main" val="1731898207"/>
+      </p:ext>
+    </p:extLst>
+  </p:cSld>
+  <p:clrMapOvr>
+    <a:masterClrMapping/>
+  </p:clrMapOvr>
+  <mc:AlternateContent xmlns:mc="http://schemas.openxmlformats.org/markup-compatibility/2006" xmlns:p14="http://schemas.microsoft.com/office/powerpoint/2010/main">
+    <mc:Choice Requires="p14">
+      <p:transition spd="med" p14:dur="700">
+        <p:fade/>
+      </p:transition>
+    </mc:Choice>
+    <mc:Fallback xmlns="">
+      <p:transition spd="med">
+        <p:fade/>
+      </p:transition>
+    </mc:Fallback>
+  </mc:AlternateContent>
+  <p:timing>
+    <p:tnLst>
+      <p:par>
+        <p:cTn id="1" dur="indefinite" restart="never" nodeType="tmRoot"/>
+      </p:par>
+    </p:tnLst>
+  </p:timing>
+</p:sld>
+</file>
+
+<file path=ppt/slides/slide34.xml><?xml version="1.0" encoding="utf-8"?>
+<p:sld xmlns:a="http://schemas.openxmlformats.org/drawingml/2006/main" xmlns:r="http://schemas.openxmlformats.org/officeDocument/2006/relationships" xmlns:p="http://schemas.openxmlformats.org/presentationml/2006/main">
+  <p:cSld>
+    <p:spTree>
+      <p:nvGrpSpPr>
+        <p:cNvPr id="1" name=""/>
+        <p:cNvGrpSpPr/>
+        <p:nvPr/>
+      </p:nvGrpSpPr>
+      <p:grpSpPr>
+        <a:xfrm>
+          <a:off x="0" y="0"/>
+          <a:ext cx="0" cy="0"/>
+          <a:chOff x="0" y="0"/>
+          <a:chExt cx="0" cy="0"/>
+        </a:xfrm>
+      </p:grpSpPr>
+      <p:sp>
+        <p:nvSpPr>
+          <p:cNvPr id="2" name="Title 1"/>
+          <p:cNvSpPr>
+            <a:spLocks noGrp="1"/>
+          </p:cNvSpPr>
+          <p:nvPr>
+            <p:ph type="title"/>
+          </p:nvPr>
+        </p:nvSpPr>
+        <p:spPr/>
+        <p:txBody>
+          <a:bodyPr/>
+          <a:lstStyle/>
+          <a:p>
+            <a:r>
+              <a:rPr lang="en-US" smtClean="0"/>
+              <a:t>Yêu cầu </a:t>
+            </a:r>
+            <a:r>
+              <a:rPr lang="en-US" smtClean="0"/>
+              <a:t>8</a:t>
+            </a:r>
+            <a:endParaRPr lang="en-US"/>
+          </a:p>
+        </p:txBody>
+      </p:sp>
+      <p:sp>
+        <p:nvSpPr>
+          <p:cNvPr id="3" name="Content Placeholder 2"/>
+          <p:cNvSpPr>
+            <a:spLocks noGrp="1"/>
+          </p:cNvSpPr>
+          <p:nvPr>
+            <p:ph idx="1"/>
+          </p:nvPr>
+        </p:nvSpPr>
+        <p:spPr/>
+        <p:txBody>
+          <a:bodyPr>
+            <a:normAutofit/>
+          </a:bodyPr>
+          <a:lstStyle/>
+          <a:p>
+            <a:pPr marL="0" indent="0">
+              <a:buNone/>
+            </a:pPr>
+            <a:r>
+              <a:rPr lang="en-US" b="1" smtClean="0"/>
+              <a:t>Mức ưu tiên</a:t>
+            </a:r>
+            <a:r>
+              <a:rPr lang="en-US" smtClean="0"/>
+              <a:t>: Trung bình. Vì hệ thống vẫn chạy tốt ở thời điểm hiện tại, cần được chỉnh sửa lại cho thống nhất ngôn ngữ là tiếng anh, khi sửa tên hàm sẽ ảnh hưởng tới đường dẫn của các module tương ứng.</a:t>
+            </a:r>
+          </a:p>
+          <a:p>
+            <a:pPr marL="0" indent="0">
+              <a:buNone/>
+            </a:pPr>
+            <a:r>
+              <a:rPr lang="en-US" b="1" smtClean="0"/>
+              <a:t>Các giải pháp: </a:t>
+            </a:r>
+            <a:r>
+              <a:rPr lang="en-US" smtClean="0"/>
+              <a:t>Giải pháp 1: Thay đổi controller để có thể truyền nội dung đang muốn xuất báo cáo qua cho view. Cập nhật lại các file view để có thể nhận thông tin từ controller và xuất file có tên tương ứng. Nhân lực: 1 người, thành thạo kỹ năng xuất file excel từ php. Công cụ sử dụng: Sublime Text 2. Dùng để chỉnh sửa các file nguồn. Thơi gian thực hiện: 1 ngày.</a:t>
+            </a:r>
+          </a:p>
+          <a:p>
+            <a:pPr marL="0" indent="0">
+              <a:buNone/>
+            </a:pPr>
+            <a:r>
+              <a:rPr lang="en-US" b="1" smtClean="0"/>
+              <a:t>Đề xuất giải pháp tốt nhất</a:t>
+            </a:r>
+            <a:r>
+              <a:rPr lang="en-US" smtClean="0"/>
+              <a:t>: giải pháp 1.</a:t>
+            </a:r>
+          </a:p>
+          <a:p>
+            <a:pPr marL="0" indent="0">
+              <a:buNone/>
+            </a:pPr>
+            <a:r>
+              <a:rPr lang="en-US" b="1" smtClean="0"/>
+              <a:t>Quyết định</a:t>
+            </a:r>
+            <a:r>
+              <a:rPr lang="en-US" smtClean="0">
+                <a:solidFill>
+                  <a:srgbClr val="FF0000"/>
+                </a:solidFill>
+              </a:rPr>
+              <a:t>: Không chấp nhận vì khi cập nhật lại cấu trúc chương trình, sẽ ảnh hưởng tới đường dẫn vời thời gian bảo trì không cho phép.</a:t>
+            </a:r>
+          </a:p>
+        </p:txBody>
+      </p:sp>
+    </p:spTree>
+    <p:extLst>
+      <p:ext uri="{BB962C8B-B14F-4D97-AF65-F5344CB8AC3E}">
+        <p14:creationId xmlns:p14="http://schemas.microsoft.com/office/powerpoint/2010/main" val="1289936260"/>
+      </p:ext>
+    </p:extLst>
+  </p:cSld>
+  <p:clrMapOvr>
+    <a:masterClrMapping/>
+  </p:clrMapOvr>
+  <mc:AlternateContent xmlns:mc="http://schemas.openxmlformats.org/markup-compatibility/2006" xmlns:p14="http://schemas.microsoft.com/office/powerpoint/2010/main">
+    <mc:Choice Requires="p14">
+      <p:transition spd="med" p14:dur="700">
+        <p:fade/>
+      </p:transition>
+    </mc:Choice>
+    <mc:Fallback xmlns="">
+      <p:transition spd="med">
+        <p:fade/>
+      </p:transition>
+    </mc:Fallback>
+  </mc:AlternateContent>
+  <p:timing>
+    <p:tnLst>
+      <p:par>
+        <p:cTn id="1" dur="indefinite" restart="never" nodeType="tmRoot"/>
+      </p:par>
+    </p:tnLst>
+  </p:timing>
+</p:sld>
+</file>
+
+<file path=ppt/slides/slide35.xml><?xml version="1.0" encoding="utf-8"?>
+<p:sld xmlns:a="http://schemas.openxmlformats.org/drawingml/2006/main" xmlns:r="http://schemas.openxmlformats.org/officeDocument/2006/relationships" xmlns:p="http://schemas.openxmlformats.org/presentationml/2006/main">
+  <p:cSld>
+    <p:spTree>
+      <p:nvGrpSpPr>
+        <p:cNvPr id="1" name=""/>
+        <p:cNvGrpSpPr/>
+        <p:nvPr/>
+      </p:nvGrpSpPr>
+      <p:grpSpPr>
+        <a:xfrm>
+          <a:off x="0" y="0"/>
+          <a:ext cx="0" cy="0"/>
+          <a:chOff x="0" y="0"/>
+          <a:chExt cx="0" cy="0"/>
+        </a:xfrm>
+      </p:grpSpPr>
+      <p:sp>
+        <p:nvSpPr>
+          <p:cNvPr id="2" name="Title 1"/>
+          <p:cNvSpPr>
+            <a:spLocks noGrp="1"/>
+          </p:cNvSpPr>
+          <p:nvPr>
+            <p:ph type="title"/>
+          </p:nvPr>
+        </p:nvSpPr>
+        <p:spPr/>
+        <p:txBody>
+          <a:bodyPr/>
+          <a:lstStyle/>
+          <a:p>
+            <a:r>
+              <a:rPr lang="en-US" smtClean="0"/>
+              <a:t>Yêu cầu </a:t>
+            </a:r>
+            <a:r>
+              <a:rPr lang="en-US" smtClean="0"/>
+              <a:t>9</a:t>
+            </a:r>
+            <a:endParaRPr lang="en-US"/>
+          </a:p>
+        </p:txBody>
+      </p:sp>
+      <p:sp>
+        <p:nvSpPr>
+          <p:cNvPr id="5" name="Content Placeholder 4"/>
+          <p:cNvSpPr>
+            <a:spLocks noGrp="1"/>
+          </p:cNvSpPr>
+          <p:nvPr>
+            <p:ph idx="1"/>
+          </p:nvPr>
+        </p:nvSpPr>
+        <p:spPr/>
+        <p:txBody>
+          <a:bodyPr>
+            <a:normAutofit lnSpcReduction="10000"/>
+          </a:bodyPr>
+          <a:lstStyle/>
+          <a:p>
+            <a:pPr marL="0" indent="0">
+              <a:buNone/>
+            </a:pPr>
+            <a:r>
+              <a:rPr lang="en-US" b="1"/>
+              <a:t>Hiện trạng</a:t>
+            </a:r>
+            <a:r>
+              <a:rPr lang="en-US"/>
+              <a:t>: cần một hệ quản trị cơ sở dữ liệu hiên giờ còn nhỏ và chưa bảo mật </a:t>
+            </a:r>
+            <a:r>
+              <a:rPr lang="en-US"/>
+              <a:t>tốt</a:t>
+            </a:r>
+            <a:r>
+              <a:rPr lang="en-US" smtClean="0"/>
+              <a:t>.</a:t>
+            </a:r>
+          </a:p>
+          <a:p>
+            <a:pPr marL="0" indent="0">
+              <a:buNone/>
+            </a:pPr>
+            <a:r>
+              <a:rPr lang="en-US" b="1"/>
+              <a:t>Yêu cầu thay đổi</a:t>
+            </a:r>
+            <a:r>
+              <a:rPr lang="en-US"/>
+              <a:t>: thay đổi cơ </a:t>
+            </a:r>
+            <a:r>
+              <a:rPr lang="en-US"/>
+              <a:t>sở </a:t>
+            </a:r>
+            <a:r>
+              <a:rPr lang="en-US" smtClean="0"/>
+              <a:t>dữ </a:t>
+            </a:r>
+            <a:r>
+              <a:rPr lang="en-US"/>
+              <a:t>liệu lớn hơn và bảo mật tốt </a:t>
+            </a:r>
+            <a:r>
+              <a:rPr lang="en-US"/>
+              <a:t>hơn</a:t>
+            </a:r>
+            <a:r>
+              <a:rPr lang="en-US" smtClean="0"/>
+              <a:t>.</a:t>
+            </a:r>
+          </a:p>
+          <a:p>
+            <a:pPr marL="0" indent="0">
+              <a:buNone/>
+            </a:pPr>
+            <a:r>
+              <a:rPr lang="en-US" b="1"/>
+              <a:t>Loại yêu cầu thay đổi</a:t>
+            </a:r>
+            <a:r>
+              <a:rPr lang="en-US"/>
+              <a:t>: Bảo trì thích ứng. Đổi sang cơ sở dữ liệu lớn hớn, tốt hơn để phục vụ mở rộng sau </a:t>
+            </a:r>
+            <a:r>
+              <a:rPr lang="en-US"/>
+              <a:t>này</a:t>
+            </a:r>
+            <a:r>
+              <a:rPr lang="en-US" smtClean="0"/>
+              <a:t>.</a:t>
+            </a:r>
+          </a:p>
+          <a:p>
+            <a:pPr marL="0" indent="0">
+              <a:buNone/>
+            </a:pPr>
+            <a:r>
+              <a:rPr lang="en-US" b="1"/>
+              <a:t>Mức ưu tiên</a:t>
+            </a:r>
+            <a:r>
+              <a:rPr lang="en-US"/>
+              <a:t>: Cao. Vì giúp hệ thống được bảo mật </a:t>
+            </a:r>
+            <a:r>
+              <a:rPr lang="en-US"/>
+              <a:t>tốt </a:t>
+            </a:r>
+            <a:r>
+              <a:rPr lang="en-US" smtClean="0"/>
+              <a:t>hơn và chịu được dữ liệu lớn hơn khi số lượng các máy biến áp càng lúc càng tăng.</a:t>
+            </a:r>
+          </a:p>
+          <a:p>
+            <a:pPr marL="0" indent="0">
+              <a:buNone/>
+            </a:pPr>
+            <a:r>
+              <a:rPr lang="en-US" b="1"/>
+              <a:t>Các thành phần bị ảnh hưởng </a:t>
+            </a:r>
+          </a:p>
+          <a:p>
+            <a:r>
+              <a:rPr lang="en-US"/>
+              <a:t>Chương trình: các tập tin bị sửa đổi bao gồm: database.php, config.php, năm trong thư mục  </a:t>
+            </a:r>
+            <a:r>
+              <a:rPr lang="en-US"/>
+              <a:t>ciexam2\Application\config</a:t>
+            </a:r>
+            <a:r>
+              <a:rPr lang="en-US" smtClean="0"/>
+              <a:t>.</a:t>
+            </a:r>
+          </a:p>
+          <a:p>
+            <a:r>
+              <a:rPr lang="en-US"/>
+              <a:t>Hệ quản trị csdl, csdl.</a:t>
+            </a:r>
+          </a:p>
+          <a:p>
+            <a:r>
+              <a:rPr lang="en-US"/>
+              <a:t>Cập nhật tài liệu: phần yêu cầu cơ sở dữ liệu, PDM, hướng dẫn cài </a:t>
+            </a:r>
+            <a:r>
+              <a:rPr lang="en-US"/>
+              <a:t>đặt</a:t>
+            </a:r>
+            <a:r>
+              <a:rPr lang="en-US" smtClean="0"/>
+              <a:t>.</a:t>
+            </a:r>
+            <a:endParaRPr lang="en-US"/>
+          </a:p>
+        </p:txBody>
+      </p:sp>
+    </p:spTree>
+    <p:extLst>
+      <p:ext uri="{BB962C8B-B14F-4D97-AF65-F5344CB8AC3E}">
+        <p14:creationId xmlns:p14="http://schemas.microsoft.com/office/powerpoint/2010/main" val="1655626605"/>
+      </p:ext>
+    </p:extLst>
+  </p:cSld>
+  <p:clrMapOvr>
+    <a:masterClrMapping/>
+  </p:clrMapOvr>
+  <mc:AlternateContent xmlns:mc="http://schemas.openxmlformats.org/markup-compatibility/2006" xmlns:p14="http://schemas.microsoft.com/office/powerpoint/2010/main">
+    <mc:Choice Requires="p14">
+      <p:transition spd="med" p14:dur="700">
+        <p:fade/>
+      </p:transition>
+    </mc:Choice>
+    <mc:Fallback xmlns="">
+      <p:transition spd="med">
+        <p:fade/>
+      </p:transition>
+    </mc:Fallback>
+  </mc:AlternateContent>
+  <p:timing>
+    <p:tnLst>
+      <p:par>
+        <p:cTn id="1" dur="indefinite" restart="never" nodeType="tmRoot"/>
+      </p:par>
+    </p:tnLst>
+  </p:timing>
+</p:sld>
+</file>
+
+<file path=ppt/slides/slide36.xml><?xml version="1.0" encoding="utf-8"?>
+<p:sld xmlns:a="http://schemas.openxmlformats.org/drawingml/2006/main" xmlns:r="http://schemas.openxmlformats.org/officeDocument/2006/relationships" xmlns:p="http://schemas.openxmlformats.org/presentationml/2006/main">
+  <p:cSld>
+    <p:spTree>
+      <p:nvGrpSpPr>
+        <p:cNvPr id="1" name=""/>
+        <p:cNvGrpSpPr/>
+        <p:nvPr/>
+      </p:nvGrpSpPr>
+      <p:grpSpPr>
+        <a:xfrm>
+          <a:off x="0" y="0"/>
+          <a:ext cx="0" cy="0"/>
+          <a:chOff x="0" y="0"/>
+          <a:chExt cx="0" cy="0"/>
+        </a:xfrm>
+      </p:grpSpPr>
+      <p:sp>
+        <p:nvSpPr>
+          <p:cNvPr id="2" name="Title 1"/>
+          <p:cNvSpPr>
+            <a:spLocks noGrp="1"/>
+          </p:cNvSpPr>
+          <p:nvPr>
+            <p:ph type="title"/>
+          </p:nvPr>
+        </p:nvSpPr>
+        <p:spPr/>
+        <p:txBody>
+          <a:bodyPr/>
+          <a:lstStyle/>
+          <a:p>
+            <a:r>
+              <a:rPr lang="en-US" smtClean="0"/>
+              <a:t>Yêu cầu </a:t>
+            </a:r>
+            <a:r>
+              <a:rPr lang="en-US" smtClean="0"/>
+              <a:t>9</a:t>
+            </a:r>
+            <a:endParaRPr lang="en-US"/>
+          </a:p>
+        </p:txBody>
+      </p:sp>
+      <p:sp>
+        <p:nvSpPr>
+          <p:cNvPr id="5" name="Content Placeholder 4"/>
+          <p:cNvSpPr>
+            <a:spLocks noGrp="1"/>
+          </p:cNvSpPr>
+          <p:nvPr>
+            <p:ph idx="1"/>
+          </p:nvPr>
+        </p:nvSpPr>
+        <p:spPr/>
+        <p:txBody>
+          <a:bodyPr>
+            <a:normAutofit/>
+          </a:bodyPr>
+          <a:lstStyle/>
+          <a:p>
+            <a:pPr marL="0" indent="0">
+              <a:buNone/>
+            </a:pPr>
+            <a:r>
+              <a:rPr lang="en-US" b="1" smtClean="0"/>
+              <a:t>Các </a:t>
+            </a:r>
+            <a:r>
+              <a:rPr lang="en-US" b="1"/>
+              <a:t>giải pháp: </a:t>
+            </a:r>
+          </a:p>
+          <a:p>
+            <a:r>
+              <a:rPr lang="en-US"/>
+              <a:t>Giải pháp 1: chuyển đổi tất cả dữ liệu hệ thống MySQL sang dữ liệu SQL Server. Cài đặt và chỉnh sửa một số cấu hình trong chương trình xampp.</a:t>
+            </a:r>
+          </a:p>
+          <a:p>
+            <a:r>
+              <a:rPr lang="en-US"/>
+              <a:t>Giải pháp 2: chuyển đổi tất cả dữ liệu hệ thống MySQL sang dữ liệu Oracle. Cài đặt lại chương trình wampp và chỉnh sửa các thông số cấu hình để kết nối đến </a:t>
+            </a:r>
+            <a:r>
+              <a:rPr lang="en-US"/>
+              <a:t>Oracle</a:t>
+            </a:r>
+            <a:r>
+              <a:rPr lang="en-US" smtClean="0"/>
+              <a:t>.</a:t>
+            </a:r>
+          </a:p>
+          <a:p>
+            <a:pPr marL="0" indent="0">
+              <a:buNone/>
+            </a:pPr>
+            <a:r>
+              <a:rPr lang="en-US" b="1"/>
+              <a:t>Đề xuất giải pháp tốt </a:t>
+            </a:r>
+            <a:r>
+              <a:rPr lang="en-US" b="1"/>
+              <a:t>nhất </a:t>
+            </a:r>
+            <a:r>
+              <a:rPr lang="en-US" b="1" smtClean="0"/>
+              <a:t>:</a:t>
+            </a:r>
+            <a:r>
+              <a:rPr lang="en-US" smtClean="0"/>
+              <a:t>Giải </a:t>
+            </a:r>
+            <a:r>
+              <a:rPr lang="en-US"/>
+              <a:t>pháp 1 do SQL Server tương thích tốt hơn với CodeIgniter và chi phí rẻ hơn so với </a:t>
+            </a:r>
+            <a:r>
+              <a:rPr lang="en-US"/>
+              <a:t>Oracle</a:t>
+            </a:r>
+            <a:r>
+              <a:rPr lang="en-US" smtClean="0"/>
+              <a:t>.</a:t>
+            </a:r>
+          </a:p>
+          <a:p>
+            <a:pPr marL="0" indent="0">
+              <a:buNone/>
+            </a:pPr>
+            <a:r>
+              <a:rPr lang="en-US" b="1"/>
+              <a:t>Quyết định</a:t>
+            </a:r>
+            <a:r>
+              <a:rPr lang="en-US"/>
+              <a:t> </a:t>
+            </a:r>
+            <a:r>
+              <a:rPr lang="en-US">
+                <a:solidFill>
+                  <a:srgbClr val="00B050"/>
+                </a:solidFill>
+              </a:rPr>
+              <a:t>Chấp </a:t>
+            </a:r>
+            <a:r>
+              <a:rPr lang="en-US" smtClean="0">
+                <a:solidFill>
+                  <a:srgbClr val="00B050"/>
+                </a:solidFill>
+              </a:rPr>
+              <a:t>nhận</a:t>
+            </a:r>
+            <a:endParaRPr lang="en-US"/>
+          </a:p>
+        </p:txBody>
+      </p:sp>
+    </p:spTree>
+    <p:extLst>
+      <p:ext uri="{BB962C8B-B14F-4D97-AF65-F5344CB8AC3E}">
+        <p14:creationId xmlns:p14="http://schemas.microsoft.com/office/powerpoint/2010/main" val="1655626605"/>
+      </p:ext>
+    </p:extLst>
+  </p:cSld>
+  <p:clrMapOvr>
+    <a:masterClrMapping/>
+  </p:clrMapOvr>
+  <mc:AlternateContent xmlns:mc="http://schemas.openxmlformats.org/markup-compatibility/2006" xmlns:p14="http://schemas.microsoft.com/office/powerpoint/2010/main">
+    <mc:Choice Requires="p14">
+      <p:transition spd="med" p14:dur="700">
+        <p:fade/>
+      </p:transition>
+    </mc:Choice>
+    <mc:Fallback xmlns="">
+      <p:transition spd="med">
+        <p:fade/>
+      </p:transition>
+    </mc:Fallback>
+  </mc:AlternateContent>
+  <p:timing>
+    <p:tnLst>
+      <p:par>
+        <p:cTn id="1" dur="indefinite" restart="never" nodeType="tmRoot"/>
+      </p:par>
+    </p:tnLst>
+  </p:timing>
+</p:sld>
+</file>
+
+<file path=ppt/slides/slide37.xml><?xml version="1.0" encoding="utf-8"?>
+<p:sld xmlns:a="http://schemas.openxmlformats.org/drawingml/2006/main" xmlns:r="http://schemas.openxmlformats.org/officeDocument/2006/relationships" xmlns:p="http://schemas.openxmlformats.org/presentationml/2006/main">
+  <p:cSld>
+    <p:spTree>
+      <p:nvGrpSpPr>
+        <p:cNvPr id="1" name=""/>
+        <p:cNvGrpSpPr/>
+        <p:nvPr/>
+      </p:nvGrpSpPr>
+      <p:grpSpPr>
+        <a:xfrm>
+          <a:off x="0" y="0"/>
+          <a:ext cx="0" cy="0"/>
+          <a:chOff x="0" y="0"/>
+          <a:chExt cx="0" cy="0"/>
+        </a:xfrm>
+      </p:grpSpPr>
+      <p:sp>
+        <p:nvSpPr>
+          <p:cNvPr id="2" name="Title 1"/>
+          <p:cNvSpPr>
+            <a:spLocks noGrp="1"/>
+          </p:cNvSpPr>
+          <p:nvPr>
+            <p:ph type="title"/>
+          </p:nvPr>
+        </p:nvSpPr>
+        <p:spPr/>
+        <p:txBody>
+          <a:bodyPr/>
+          <a:lstStyle/>
+          <a:p>
+            <a:r>
+              <a:rPr lang="en-US" smtClean="0"/>
+              <a:t>Yêu cầu 10</a:t>
+            </a:r>
+            <a:endParaRPr lang="en-US"/>
+          </a:p>
+        </p:txBody>
+      </p:sp>
+      <p:sp>
+        <p:nvSpPr>
+          <p:cNvPr id="4" name="Content Placeholder 3"/>
+          <p:cNvSpPr>
+            <a:spLocks noGrp="1"/>
+          </p:cNvSpPr>
+          <p:nvPr>
+            <p:ph idx="1"/>
+          </p:nvPr>
+        </p:nvSpPr>
+        <p:spPr/>
+        <p:txBody>
+          <a:bodyPr/>
+          <a:lstStyle/>
+          <a:p>
+            <a:pPr marL="0" indent="0">
+              <a:buNone/>
+            </a:pPr>
+            <a:r>
+              <a:rPr lang="en-US" b="1"/>
+              <a:t>Hiện trạng</a:t>
+            </a:r>
+            <a:r>
+              <a:rPr lang="en-US"/>
+              <a:t>:  Các thông báo chưa được chuyển qua tiếng việt 100%, vẫn còn một số thông  báo là tiếng </a:t>
+            </a:r>
+            <a:r>
+              <a:rPr lang="en-US"/>
+              <a:t>anh</a:t>
+            </a:r>
+            <a:r>
+              <a:rPr lang="en-US" smtClean="0"/>
+              <a:t>.</a:t>
+            </a:r>
+          </a:p>
+          <a:p>
+            <a:pPr marL="0" indent="0">
+              <a:buNone/>
+            </a:pPr>
+            <a:endParaRPr lang="en-US"/>
+          </a:p>
+          <a:p>
+            <a:pPr marL="0" indent="0">
+              <a:buNone/>
+            </a:pPr>
+            <a:endParaRPr lang="en-US" smtClean="0"/>
+          </a:p>
+          <a:p>
+            <a:pPr marL="0" indent="0">
+              <a:buNone/>
+            </a:pPr>
+            <a:endParaRPr lang="en-US"/>
+          </a:p>
+          <a:p>
+            <a:endParaRPr lang="en-US" smtClean="0"/>
+          </a:p>
+          <a:p>
+            <a:pPr marL="0" indent="0">
+              <a:buNone/>
+            </a:pPr>
+            <a:r>
+              <a:rPr lang="en-US" b="1" smtClean="0"/>
+              <a:t>Yêu </a:t>
+            </a:r>
+            <a:r>
+              <a:rPr lang="en-US" b="1"/>
+              <a:t>cầu thay đổi</a:t>
+            </a:r>
+            <a:r>
+              <a:rPr lang="en-US"/>
+              <a:t>:  Chuyển các thông báo sang tiếng việt. Để cho thống nhất ngôn ngữ</a:t>
+            </a:r>
+          </a:p>
+          <a:p>
+            <a:pPr marL="0" indent="0">
+              <a:buNone/>
+            </a:pPr>
+            <a:r>
+              <a:rPr lang="en-US" b="1"/>
+              <a:t>Loại yêu cầu thay đổi</a:t>
+            </a:r>
+            <a:r>
+              <a:rPr lang="en-US"/>
+              <a:t>: Bảo trì hiệu chỉnh. Do các thông báo vẫn còn là tiếng Anh chưa thuần Việt đồng nhất ngôn </a:t>
+            </a:r>
+            <a:r>
+              <a:rPr lang="en-US"/>
+              <a:t>ngữ</a:t>
+            </a:r>
+            <a:r>
+              <a:rPr lang="en-US" smtClean="0"/>
+              <a:t>.</a:t>
+            </a:r>
+          </a:p>
+          <a:p>
+            <a:pPr marL="0" indent="0">
+              <a:buNone/>
+            </a:pPr>
+            <a:r>
+              <a:rPr lang="en-US" b="1"/>
+              <a:t>Mức ưu tiên</a:t>
+            </a:r>
+            <a:r>
+              <a:rPr lang="en-US"/>
+              <a:t>: Cao.</a:t>
+            </a:r>
+            <a:endParaRPr lang="en-US"/>
+          </a:p>
+        </p:txBody>
+      </p:sp>
+      <p:pic>
+        <p:nvPicPr>
+          <p:cNvPr id="6" name="Picture 5"/>
+          <p:cNvPicPr/>
+          <p:nvPr/>
+        </p:nvPicPr>
+        <p:blipFill>
+          <a:blip r:embed="rId2">
+            <a:extLst>
+              <a:ext uri="{28A0092B-C50C-407E-A947-70E740481C1C}">
+                <a14:useLocalDpi xmlns:a14="http://schemas.microsoft.com/office/drawing/2010/main" val="0"/>
+              </a:ext>
+            </a:extLst>
+          </a:blip>
+          <a:stretch>
+            <a:fillRect/>
+          </a:stretch>
+        </p:blipFill>
+        <p:spPr>
+          <a:xfrm>
+            <a:off x="2514600" y="2590800"/>
+            <a:ext cx="3876261" cy="1485900"/>
+          </a:xfrm>
+          <a:prstGeom prst="rect">
+            <a:avLst/>
+          </a:prstGeom>
+        </p:spPr>
+      </p:pic>
+    </p:spTree>
+    <p:extLst>
+      <p:ext uri="{BB962C8B-B14F-4D97-AF65-F5344CB8AC3E}">
+        <p14:creationId xmlns:p14="http://schemas.microsoft.com/office/powerpoint/2010/main" val="4216203963"/>
+      </p:ext>
+    </p:extLst>
+  </p:cSld>
+  <p:clrMapOvr>
+    <a:masterClrMapping/>
+  </p:clrMapOvr>
+  <mc:AlternateContent xmlns:mc="http://schemas.openxmlformats.org/markup-compatibility/2006" xmlns:p14="http://schemas.microsoft.com/office/powerpoint/2010/main">
+    <mc:Choice Requires="p14">
+      <p:transition spd="med" p14:dur="700">
+        <p:fade/>
+      </p:transition>
+    </mc:Choice>
+    <mc:Fallback xmlns="">
+      <p:transition spd="med">
+        <p:fade/>
+      </p:transition>
+    </mc:Fallback>
+  </mc:AlternateContent>
+  <p:timing>
+    <p:tnLst>
+      <p:par>
+        <p:cTn id="1" dur="indefinite" restart="never" nodeType="tmRoot"/>
+      </p:par>
+    </p:tnLst>
+  </p:timing>
+</p:sld>
+</file>
+
+<file path=ppt/slides/slide38.xml><?xml version="1.0" encoding="utf-8"?>
+<p:sld xmlns:a="http://schemas.openxmlformats.org/drawingml/2006/main" xmlns:r="http://schemas.openxmlformats.org/officeDocument/2006/relationships" xmlns:p="http://schemas.openxmlformats.org/presentationml/2006/main">
+  <p:cSld>
+    <p:spTree>
+      <p:nvGrpSpPr>
+        <p:cNvPr id="1" name=""/>
+        <p:cNvGrpSpPr/>
+        <p:nvPr/>
+      </p:nvGrpSpPr>
+      <p:grpSpPr>
+        <a:xfrm>
+          <a:off x="0" y="0"/>
+          <a:ext cx="0" cy="0"/>
+          <a:chOff x="0" y="0"/>
+          <a:chExt cx="0" cy="0"/>
+        </a:xfrm>
+      </p:grpSpPr>
+      <p:sp>
+        <p:nvSpPr>
+          <p:cNvPr id="2" name="Title 1"/>
+          <p:cNvSpPr>
+            <a:spLocks noGrp="1"/>
+          </p:cNvSpPr>
+          <p:nvPr>
+            <p:ph type="title"/>
+          </p:nvPr>
+        </p:nvSpPr>
+        <p:spPr/>
+        <p:txBody>
+          <a:bodyPr/>
+          <a:lstStyle/>
+          <a:p>
+            <a:r>
+              <a:rPr lang="en-US" smtClean="0"/>
+              <a:t>Yêu cầu 10</a:t>
+            </a:r>
+            <a:endParaRPr lang="en-US"/>
+          </a:p>
+        </p:txBody>
+      </p:sp>
+      <p:sp>
+        <p:nvSpPr>
+          <p:cNvPr id="5" name="Content Placeholder 4"/>
+          <p:cNvSpPr>
+            <a:spLocks noGrp="1"/>
+          </p:cNvSpPr>
+          <p:nvPr>
+            <p:ph idx="1"/>
+          </p:nvPr>
+        </p:nvSpPr>
+        <p:spPr/>
+        <p:txBody>
+          <a:bodyPr>
+            <a:normAutofit fontScale="85000" lnSpcReduction="20000"/>
+          </a:bodyPr>
+          <a:lstStyle/>
+          <a:p>
+            <a:pPr marL="0" indent="0">
+              <a:buNone/>
+            </a:pPr>
+            <a:r>
+              <a:rPr lang="en-US" b="1"/>
+              <a:t>Các thành phần bị ảnh hưởng : </a:t>
+            </a:r>
+          </a:p>
+          <a:p>
+            <a:r>
+              <a:rPr lang="en-US"/>
+              <a:t>Chương trình: cập nhật lại file controller liên quan đến form validations và model của chức năng quản lý và cập </a:t>
+            </a:r>
+            <a:r>
+              <a:rPr lang="en-US"/>
+              <a:t>nhật</a:t>
+            </a:r>
+            <a:r>
+              <a:rPr lang="en-US" smtClean="0"/>
+              <a:t>.</a:t>
+            </a:r>
+          </a:p>
+          <a:p>
+            <a:pPr marL="0" indent="0">
+              <a:buNone/>
+            </a:pPr>
+            <a:r>
+              <a:rPr lang="en-US" b="1"/>
+              <a:t>Các </a:t>
+            </a:r>
+            <a:r>
+              <a:rPr lang="en-US" b="1"/>
+              <a:t>giải </a:t>
+            </a:r>
+            <a:r>
+              <a:rPr lang="en-US" b="1" smtClean="0"/>
+              <a:t>pháp</a:t>
+            </a:r>
+            <a:endParaRPr lang="en-US" b="1"/>
+          </a:p>
+          <a:p>
+            <a:r>
+              <a:rPr lang="en-US"/>
+              <a:t>Giải pháp 1:</a:t>
+            </a:r>
+          </a:p>
+          <a:p>
+            <a:pPr lvl="1"/>
+            <a:r>
+              <a:rPr lang="en-US"/>
+              <a:t>Sử dụng javascript để kiểm tra và xuất các thông báo bằng tiếng việt.</a:t>
+            </a:r>
+          </a:p>
+          <a:p>
+            <a:pPr lvl="1"/>
+            <a:r>
+              <a:rPr lang="en-US"/>
+              <a:t>Số người: 1-2 người.</a:t>
+            </a:r>
+          </a:p>
+          <a:p>
+            <a:pPr lvl="1"/>
+            <a:r>
+              <a:rPr lang="en-US"/>
+              <a:t>Thời gian: 1-2 tuần.</a:t>
+            </a:r>
+          </a:p>
+          <a:p>
+            <a:pPr lvl="1"/>
+            <a:r>
+              <a:rPr lang="en-US"/>
+              <a:t>Kỹ năng: hiểu rõ và sử dụng được javascript.</a:t>
+            </a:r>
+          </a:p>
+          <a:p>
+            <a:r>
+              <a:rPr lang="en-US"/>
+              <a:t>Giải pháp 2:</a:t>
+            </a:r>
+          </a:p>
+          <a:p>
+            <a:pPr lvl="1"/>
+            <a:r>
+              <a:rPr lang="en-US"/>
+              <a:t>Sử dụng form_validation của codeIgniter hỗ trợ. </a:t>
+            </a:r>
+          </a:p>
+          <a:p>
+            <a:pPr lvl="1"/>
+            <a:r>
+              <a:rPr lang="en-US"/>
+              <a:t>Số người: 1 người.</a:t>
+            </a:r>
+          </a:p>
+          <a:p>
+            <a:pPr lvl="1"/>
+            <a:r>
+              <a:rPr lang="en-US"/>
+              <a:t>Thời gian: 1 tuần.</a:t>
+            </a:r>
+          </a:p>
+          <a:p>
+            <a:pPr lvl="1"/>
+            <a:r>
+              <a:rPr lang="en-US"/>
+              <a:t>Kỹ năng: hiểu rõ được cơ chế hoạt động </a:t>
+            </a:r>
+            <a:r>
+              <a:rPr lang="en-US"/>
+              <a:t>codeIgniter</a:t>
+            </a:r>
+            <a:r>
+              <a:rPr lang="en-US" smtClean="0"/>
+              <a:t>.</a:t>
+            </a:r>
+            <a:endParaRPr lang="en-US"/>
+          </a:p>
+          <a:p>
+            <a:pPr marL="0" indent="0">
+              <a:buNone/>
+            </a:pPr>
+            <a:r>
+              <a:rPr lang="en-US" sz="2400" b="1"/>
+              <a:t>Đề xuất giải pháp </a:t>
+            </a:r>
+            <a:r>
+              <a:rPr lang="en-US" sz="2400" b="1"/>
+              <a:t>tốt </a:t>
+            </a:r>
+            <a:r>
+              <a:rPr lang="en-US" sz="2400" b="1" smtClean="0"/>
+              <a:t>nhất</a:t>
+            </a:r>
+            <a:r>
+              <a:rPr lang="en-US" sz="2800" b="1" smtClean="0"/>
+              <a:t>: </a:t>
+            </a:r>
+            <a:r>
+              <a:rPr lang="en-US" sz="2400" smtClean="0"/>
+              <a:t>Đề </a:t>
+            </a:r>
+            <a:r>
+              <a:rPr lang="en-US" sz="2400"/>
+              <a:t>xuất giải pháp 2 vì CodeIgniter hỗ trợ sẵn sử dụng nhanh chóng và </a:t>
+            </a:r>
+            <a:r>
+              <a:rPr lang="en-US" sz="2400"/>
+              <a:t>dễ </a:t>
+            </a:r>
+            <a:r>
+              <a:rPr lang="en-US" sz="2400" smtClean="0"/>
+              <a:t>dàng.</a:t>
+            </a:r>
+          </a:p>
+          <a:p>
+            <a:pPr marL="0" indent="0">
+              <a:buNone/>
+            </a:pPr>
+            <a:r>
+              <a:rPr lang="en-US" b="1"/>
+              <a:t>Quyết định</a:t>
+            </a:r>
+            <a:r>
+              <a:rPr lang="en-US"/>
+              <a:t> </a:t>
+            </a:r>
+            <a:r>
+              <a:rPr lang="en-US">
+                <a:solidFill>
+                  <a:srgbClr val="00B050"/>
+                </a:solidFill>
+              </a:rPr>
+              <a:t>Chấp </a:t>
+            </a:r>
+            <a:r>
+              <a:rPr lang="en-US" smtClean="0">
+                <a:solidFill>
+                  <a:srgbClr val="00B050"/>
+                </a:solidFill>
+              </a:rPr>
+              <a:t>nhận</a:t>
+            </a:r>
+            <a:endParaRPr lang="en-US"/>
+          </a:p>
+        </p:txBody>
+      </p:sp>
+    </p:spTree>
+    <p:extLst>
+      <p:ext uri="{BB962C8B-B14F-4D97-AF65-F5344CB8AC3E}">
+        <p14:creationId xmlns:p14="http://schemas.microsoft.com/office/powerpoint/2010/main" val="2825392367"/>
+      </p:ext>
+    </p:extLst>
+  </p:cSld>
+  <p:clrMapOvr>
+    <a:masterClrMapping/>
+  </p:clrMapOvr>
+  <mc:AlternateContent xmlns:mc="http://schemas.openxmlformats.org/markup-compatibility/2006" xmlns:p14="http://schemas.microsoft.com/office/powerpoint/2010/main">
+    <mc:Choice Requires="p14">
+      <p:transition spd="med" p14:dur="700">
+        <p:fade/>
+      </p:transition>
+    </mc:Choice>
+    <mc:Fallback xmlns="">
+      <p:transition spd="med">
+        <p:fade/>
+      </p:transition>
+    </mc:Fallback>
+  </mc:AlternateContent>
+  <p:timing>
+    <p:tnLst>
+      <p:par>
+        <p:cTn id="1" dur="indefinite" restart="never" nodeType="tmRoot"/>
+      </p:par>
+    </p:tnLst>
+  </p:timing>
+</p:sld>
+</file>
+
+<file path=ppt/slides/slide39.xml><?xml version="1.0" encoding="utf-8"?>
+<p:sld xmlns:a="http://schemas.openxmlformats.org/drawingml/2006/main" xmlns:r="http://schemas.openxmlformats.org/officeDocument/2006/relationships" xmlns:p="http://schemas.openxmlformats.org/presentationml/2006/main">
+  <p:cSld>
+    <p:spTree>
+      <p:nvGrpSpPr>
+        <p:cNvPr id="1" name=""/>
+        <p:cNvGrpSpPr/>
+        <p:nvPr/>
+      </p:nvGrpSpPr>
+      <p:grpSpPr>
+        <a:xfrm>
+          <a:off x="0" y="0"/>
+          <a:ext cx="0" cy="0"/>
+          <a:chOff x="0" y="0"/>
+          <a:chExt cx="0" cy="0"/>
+        </a:xfrm>
+      </p:grpSpPr>
+      <p:sp>
+        <p:nvSpPr>
+          <p:cNvPr id="2" name="Title 1"/>
+          <p:cNvSpPr>
+            <a:spLocks noGrp="1"/>
+          </p:cNvSpPr>
+          <p:nvPr>
+            <p:ph type="title"/>
+          </p:nvPr>
+        </p:nvSpPr>
+        <p:spPr/>
+        <p:txBody>
+          <a:bodyPr/>
+          <a:lstStyle/>
+          <a:p>
+            <a:r>
+              <a:rPr lang="en-US" smtClean="0"/>
+              <a:t>Yêu cầu 11</a:t>
+            </a:r>
+            <a:endParaRPr lang="en-US"/>
+          </a:p>
+        </p:txBody>
+      </p:sp>
+      <p:sp>
+        <p:nvSpPr>
+          <p:cNvPr id="4" name="Content Placeholder 3"/>
+          <p:cNvSpPr>
+            <a:spLocks noGrp="1"/>
+          </p:cNvSpPr>
+          <p:nvPr>
+            <p:ph idx="1"/>
+          </p:nvPr>
+        </p:nvSpPr>
+        <p:spPr>
+          <a:xfrm>
+            <a:off x="628650" y="1872169"/>
+            <a:ext cx="7886700" cy="2623631"/>
+          </a:xfrm>
+        </p:spPr>
+        <p:txBody>
+          <a:bodyPr/>
+          <a:lstStyle/>
+          <a:p>
+            <a:pPr marL="0" indent="0">
+              <a:buNone/>
+            </a:pPr>
+            <a:r>
+              <a:rPr lang="en-US" b="1"/>
+              <a:t>Hiện trạng</a:t>
+            </a:r>
+            <a:r>
+              <a:rPr lang="en-US"/>
+              <a:t>:  Chức năng quản lý đơn vị khi Thêm vào đơn vị có ‘quyền sử dụng’ là 4 hệ thống vẫn thông báo thêm thành công. Trong tài liệu đặc tả chỉ có 3 quyền. Các ràng buộc khác chưa chính xác và không đầy đủ </a:t>
+            </a:r>
+            <a:r>
+              <a:rPr lang="en-US" b="1"/>
+              <a:t>ví dụ</a:t>
+            </a:r>
+            <a:r>
+              <a:rPr lang="en-US"/>
+              <a:t>: Chưa có ràng buộc tài khoản trùng, quản lý trạm thì tên trạm chưa kiểm tra  </a:t>
+            </a:r>
+            <a:r>
+              <a:rPr lang="en-US"/>
+              <a:t>trùng</a:t>
+            </a:r>
+            <a:r>
+              <a:rPr lang="en-US" smtClean="0"/>
+              <a:t>.</a:t>
+            </a:r>
+          </a:p>
+          <a:p>
+            <a:pPr marL="0" indent="0">
+              <a:buNone/>
+            </a:pPr>
+            <a:endParaRPr lang="en-US"/>
+          </a:p>
+        </p:txBody>
+      </p:sp>
+      <p:pic>
+        <p:nvPicPr>
+          <p:cNvPr id="6" name="Picture 5"/>
+          <p:cNvPicPr/>
+          <p:nvPr/>
+        </p:nvPicPr>
+        <p:blipFill rotWithShape="1">
+          <a:blip r:embed="rId2">
+            <a:extLst>
+              <a:ext uri="{28A0092B-C50C-407E-A947-70E740481C1C}">
+                <a14:useLocalDpi xmlns:a14="http://schemas.microsoft.com/office/drawing/2010/main" val="0"/>
+              </a:ext>
+            </a:extLst>
+          </a:blip>
+          <a:srcRect l="1744" r="1163"/>
+          <a:stretch/>
+        </p:blipFill>
+        <p:spPr bwMode="auto">
+          <a:xfrm>
+            <a:off x="381000" y="3352800"/>
+            <a:ext cx="7982864" cy="990600"/>
+          </a:xfrm>
+          <a:prstGeom prst="rect">
+            <a:avLst/>
+          </a:prstGeom>
+          <a:ln>
+            <a:noFill/>
+          </a:ln>
+          <a:extLst>
+            <a:ext uri="{53640926-AAD7-44D8-BBD7-CCE9431645EC}">
+              <a14:shadowObscured xmlns:a14="http://schemas.microsoft.com/office/drawing/2010/main"/>
+            </a:ext>
+          </a:extLst>
+        </p:spPr>
+      </p:pic>
+      <p:sp>
+        <p:nvSpPr>
+          <p:cNvPr id="8" name="Content Placeholder 3"/>
+          <p:cNvSpPr txBox="1">
+            <a:spLocks/>
+          </p:cNvSpPr>
+          <p:nvPr/>
+        </p:nvSpPr>
+        <p:spPr>
+          <a:xfrm>
+            <a:off x="477164" y="4343401"/>
+            <a:ext cx="7886700" cy="2133600"/>
+          </a:xfrm>
+          <a:prstGeom prst="rect">
+            <a:avLst/>
+          </a:prstGeom>
+        </p:spPr>
+        <p:txBody>
+          <a:bodyPr vert="horz" lIns="91440" tIns="45720" rIns="91440" bIns="45720" rtlCol="0">
+            <a:normAutofit/>
+          </a:bodyPr>
+          <a:lstStyle>
+            <a:lvl1pPr marL="171450" indent="-171450" algn="l" defTabSz="685800" rtl="0" eaLnBrk="1" latinLnBrk="0" hangingPunct="1">
+              <a:lnSpc>
+                <a:spcPct val="90000"/>
+              </a:lnSpc>
+              <a:spcBef>
+                <a:spcPts val="750"/>
+              </a:spcBef>
+              <a:buFont typeface="Arial" panose="020B0604020202020204" pitchFamily="34" charset="0"/>
+              <a:buChar char="•"/>
+              <a:defRPr sz="2100" kern="1200">
+                <a:solidFill>
+                  <a:schemeClr val="tx1"/>
+                </a:solidFill>
+                <a:latin typeface="+mn-lt"/>
+                <a:ea typeface="+mn-ea"/>
+                <a:cs typeface="+mn-cs"/>
+              </a:defRPr>
+            </a:lvl1pPr>
+            <a:lvl2pPr marL="514350" indent="-171450" algn="l" defTabSz="685800" rtl="0" eaLnBrk="1" latinLnBrk="0" hangingPunct="1">
+              <a:lnSpc>
+                <a:spcPct val="90000"/>
+              </a:lnSpc>
+              <a:spcBef>
+                <a:spcPts val="375"/>
+              </a:spcBef>
+              <a:buFont typeface="Arial" panose="020B0604020202020204" pitchFamily="34" charset="0"/>
+              <a:buChar char="•"/>
+              <a:defRPr sz="1800" kern="1200">
+                <a:solidFill>
+                  <a:schemeClr val="tx1"/>
+                </a:solidFill>
+                <a:latin typeface="+mn-lt"/>
+                <a:ea typeface="+mn-ea"/>
+                <a:cs typeface="+mn-cs"/>
+              </a:defRPr>
+            </a:lvl2pPr>
+            <a:lvl3pPr marL="857250" indent="-171450" algn="l" defTabSz="685800" rtl="0" eaLnBrk="1" latinLnBrk="0" hangingPunct="1">
+              <a:lnSpc>
+                <a:spcPct val="90000"/>
+              </a:lnSpc>
+              <a:spcBef>
+                <a:spcPts val="375"/>
+              </a:spcBef>
+              <a:buFont typeface="Arial" panose="020B0604020202020204" pitchFamily="34" charset="0"/>
+              <a:buChar char="•"/>
+              <a:defRPr sz="1500" kern="1200">
+                <a:solidFill>
+                  <a:schemeClr val="tx1"/>
+                </a:solidFill>
+                <a:latin typeface="+mn-lt"/>
+                <a:ea typeface="+mn-ea"/>
+                <a:cs typeface="+mn-cs"/>
+              </a:defRPr>
+            </a:lvl3pPr>
+            <a:lvl4pPr marL="1200150" indent="-171450" algn="l" defTabSz="685800" rtl="0" eaLnBrk="1" latinLnBrk="0" hangingPunct="1">
+              <a:lnSpc>
+                <a:spcPct val="90000"/>
+              </a:lnSpc>
+              <a:spcBef>
+                <a:spcPts val="375"/>
+              </a:spcBef>
+              <a:buFont typeface="Arial" panose="020B0604020202020204" pitchFamily="34" charset="0"/>
+              <a:buChar char="•"/>
+              <a:defRPr sz="1350" kern="1200">
+                <a:solidFill>
+                  <a:schemeClr val="tx1"/>
+                </a:solidFill>
+                <a:latin typeface="+mn-lt"/>
+                <a:ea typeface="+mn-ea"/>
+                <a:cs typeface="+mn-cs"/>
+              </a:defRPr>
+            </a:lvl4pPr>
+            <a:lvl5pPr marL="1543050" indent="-171450" algn="l" defTabSz="685800" rtl="0" eaLnBrk="1" latinLnBrk="0" hangingPunct="1">
+              <a:lnSpc>
+                <a:spcPct val="90000"/>
+              </a:lnSpc>
+              <a:spcBef>
+                <a:spcPts val="375"/>
+              </a:spcBef>
+              <a:buFont typeface="Arial" panose="020B0604020202020204" pitchFamily="34" charset="0"/>
+              <a:buChar char="•"/>
+              <a:defRPr sz="1350" kern="1200">
+                <a:solidFill>
+                  <a:schemeClr val="tx1"/>
+                </a:solidFill>
+                <a:latin typeface="+mn-lt"/>
+                <a:ea typeface="+mn-ea"/>
+                <a:cs typeface="+mn-cs"/>
+              </a:defRPr>
+            </a:lvl5pPr>
+            <a:lvl6pPr marL="1885950" indent="-171450" algn="l" defTabSz="685800" rtl="0" eaLnBrk="1" latinLnBrk="0" hangingPunct="1">
+              <a:lnSpc>
+                <a:spcPct val="90000"/>
+              </a:lnSpc>
+              <a:spcBef>
+                <a:spcPts val="375"/>
+              </a:spcBef>
+              <a:buFont typeface="Arial" panose="020B0604020202020204" pitchFamily="34" charset="0"/>
+              <a:buChar char="•"/>
+              <a:defRPr sz="1350" kern="1200">
+                <a:solidFill>
+                  <a:schemeClr val="tx1"/>
+                </a:solidFill>
+                <a:latin typeface="+mn-lt"/>
+                <a:ea typeface="+mn-ea"/>
+                <a:cs typeface="+mn-cs"/>
+              </a:defRPr>
+            </a:lvl6pPr>
+            <a:lvl7pPr marL="2228850" indent="-171450" algn="l" defTabSz="685800" rtl="0" eaLnBrk="1" latinLnBrk="0" hangingPunct="1">
+              <a:lnSpc>
+                <a:spcPct val="90000"/>
+              </a:lnSpc>
+              <a:spcBef>
+                <a:spcPts val="375"/>
+              </a:spcBef>
+              <a:buFont typeface="Arial" panose="020B0604020202020204" pitchFamily="34" charset="0"/>
+              <a:buChar char="•"/>
+              <a:defRPr sz="1350" kern="1200">
+                <a:solidFill>
+                  <a:schemeClr val="tx1"/>
+                </a:solidFill>
+                <a:latin typeface="+mn-lt"/>
+                <a:ea typeface="+mn-ea"/>
+                <a:cs typeface="+mn-cs"/>
+              </a:defRPr>
+            </a:lvl7pPr>
+            <a:lvl8pPr marL="2571750" indent="-171450" algn="l" defTabSz="685800" rtl="0" eaLnBrk="1" latinLnBrk="0" hangingPunct="1">
+              <a:lnSpc>
+                <a:spcPct val="90000"/>
+              </a:lnSpc>
+              <a:spcBef>
+                <a:spcPts val="375"/>
+              </a:spcBef>
+              <a:buFont typeface="Arial" panose="020B0604020202020204" pitchFamily="34" charset="0"/>
+              <a:buChar char="•"/>
+              <a:defRPr sz="1350" kern="1200">
+                <a:solidFill>
+                  <a:schemeClr val="tx1"/>
+                </a:solidFill>
+                <a:latin typeface="+mn-lt"/>
+                <a:ea typeface="+mn-ea"/>
+                <a:cs typeface="+mn-cs"/>
+              </a:defRPr>
+            </a:lvl8pPr>
+            <a:lvl9pPr marL="2914650" indent="-171450" algn="l" defTabSz="685800" rtl="0" eaLnBrk="1" latinLnBrk="0" hangingPunct="1">
+              <a:lnSpc>
+                <a:spcPct val="90000"/>
+              </a:lnSpc>
+              <a:spcBef>
+                <a:spcPts val="375"/>
+              </a:spcBef>
+              <a:buFont typeface="Arial" panose="020B0604020202020204" pitchFamily="34" charset="0"/>
+              <a:buChar char="•"/>
+              <a:defRPr sz="1350" kern="1200">
+                <a:solidFill>
+                  <a:schemeClr val="tx1"/>
+                </a:solidFill>
+                <a:latin typeface="+mn-lt"/>
+                <a:ea typeface="+mn-ea"/>
+                <a:cs typeface="+mn-cs"/>
+              </a:defRPr>
+            </a:lvl9pPr>
+          </a:lstStyle>
+          <a:p>
+            <a:pPr marL="0" indent="0">
+              <a:buNone/>
+            </a:pPr>
+            <a:r>
+              <a:rPr lang="en-US" b="1"/>
+              <a:t>Yêu cầu thay đổi</a:t>
+            </a:r>
+            <a:r>
+              <a:rPr lang="en-US"/>
+              <a:t>:  Chỉnh sửa và thêm vào các ràng buộc, thông </a:t>
+            </a:r>
+            <a:r>
+              <a:rPr lang="en-US"/>
+              <a:t>báo </a:t>
+            </a:r>
+            <a:r>
+              <a:rPr lang="en-US" smtClean="0"/>
+              <a:t>lỗi</a:t>
+            </a:r>
+          </a:p>
+          <a:p>
+            <a:pPr marL="0" indent="0">
+              <a:buNone/>
+            </a:pPr>
+            <a:r>
+              <a:rPr lang="en-US" b="1"/>
+              <a:t>Loại yêu cầu thay đổi</a:t>
+            </a:r>
+            <a:r>
+              <a:rPr lang="en-US"/>
+              <a:t>: Bảo trì hiệu chỉnh. Do chức năng quản lý đơn vị, Trạm, hãng sản xuất… chưa kiểm tra và ràng buộc chặt chẽ như đề xuất </a:t>
+            </a:r>
+            <a:r>
+              <a:rPr lang="en-US"/>
+              <a:t>yêu </a:t>
+            </a:r>
+            <a:r>
+              <a:rPr lang="en-US" smtClean="0"/>
+              <a:t>cầu.</a:t>
+            </a:r>
+          </a:p>
+          <a:p>
+            <a:pPr marL="0" indent="0">
+              <a:buNone/>
+            </a:pPr>
+            <a:r>
+              <a:rPr lang="en-US" b="1"/>
+              <a:t>Mức ưu tiên: </a:t>
+            </a:r>
+            <a:r>
+              <a:rPr lang="en-US"/>
+              <a:t>Cao. Do lỗi này có thể ảnh hương đến dữ liệu cơ sở của hệ thống.</a:t>
+            </a:r>
+          </a:p>
+        </p:txBody>
+      </p:sp>
+    </p:spTree>
+    <p:extLst>
+      <p:ext uri="{BB962C8B-B14F-4D97-AF65-F5344CB8AC3E}">
+        <p14:creationId xmlns:p14="http://schemas.microsoft.com/office/powerpoint/2010/main" val="884126227"/>
+      </p:ext>
+    </p:extLst>
+  </p:cSld>
+  <p:clrMapOvr>
+    <a:masterClrMapping/>
+  </p:clrMapOvr>
+  <mc:AlternateContent xmlns:mc="http://schemas.openxmlformats.org/markup-compatibility/2006" xmlns:p14="http://schemas.microsoft.com/office/powerpoint/2010/main">
+    <mc:Choice Requires="p14">
+      <p:transition spd="med" p14:dur="700">
+        <p:fade/>
+      </p:transition>
+    </mc:Choice>
+    <mc:Fallback xmlns="">
+      <p:transition spd="med">
+        <p:fade/>
+      </p:transition>
+    </mc:Fallback>
+  </mc:AlternateContent>
+  <p:timing>
+    <p:tnLst>
+      <p:par>
+        <p:cTn id="1" dur="indefinite" restart="never" nodeType="tmRoot"/>
+      </p:par>
+    </p:tnLst>
+  </p:timing>
+</p:sld>
+</file>
+
 <file path=ppt/slides/slide4.xml><?xml version="1.0" encoding="utf-8"?>
 <p:sld xmlns:a="http://schemas.openxmlformats.org/drawingml/2006/main" xmlns:r="http://schemas.openxmlformats.org/officeDocument/2006/relationships" xmlns:p="http://schemas.openxmlformats.org/presentationml/2006/main">
   <p:cSld>
@@ -23657,6 +26306,1487 @@
     <p:extLst>
       <p:ext uri="{BB962C8B-B14F-4D97-AF65-F5344CB8AC3E}">
         <p14:creationId xmlns:p14="http://schemas.microsoft.com/office/powerpoint/2010/main" val="2822875827"/>
+      </p:ext>
+    </p:extLst>
+  </p:cSld>
+  <p:clrMapOvr>
+    <a:masterClrMapping/>
+  </p:clrMapOvr>
+  <mc:AlternateContent xmlns:mc="http://schemas.openxmlformats.org/markup-compatibility/2006" xmlns:p14="http://schemas.microsoft.com/office/powerpoint/2010/main">
+    <mc:Choice Requires="p14">
+      <p:transition spd="med" p14:dur="700">
+        <p:fade/>
+      </p:transition>
+    </mc:Choice>
+    <mc:Fallback xmlns="">
+      <p:transition spd="med">
+        <p:fade/>
+      </p:transition>
+    </mc:Fallback>
+  </mc:AlternateContent>
+  <p:timing>
+    <p:tnLst>
+      <p:par>
+        <p:cTn id="1" dur="indefinite" restart="never" nodeType="tmRoot"/>
+      </p:par>
+    </p:tnLst>
+  </p:timing>
+</p:sld>
+</file>
+
+<file path=ppt/slides/slide40.xml><?xml version="1.0" encoding="utf-8"?>
+<p:sld xmlns:a="http://schemas.openxmlformats.org/drawingml/2006/main" xmlns:r="http://schemas.openxmlformats.org/officeDocument/2006/relationships" xmlns:p="http://schemas.openxmlformats.org/presentationml/2006/main">
+  <p:cSld>
+    <p:spTree>
+      <p:nvGrpSpPr>
+        <p:cNvPr id="1" name=""/>
+        <p:cNvGrpSpPr/>
+        <p:nvPr/>
+      </p:nvGrpSpPr>
+      <p:grpSpPr>
+        <a:xfrm>
+          <a:off x="0" y="0"/>
+          <a:ext cx="0" cy="0"/>
+          <a:chOff x="0" y="0"/>
+          <a:chExt cx="0" cy="0"/>
+        </a:xfrm>
+      </p:grpSpPr>
+      <p:sp>
+        <p:nvSpPr>
+          <p:cNvPr id="2" name="Title 1"/>
+          <p:cNvSpPr>
+            <a:spLocks noGrp="1"/>
+          </p:cNvSpPr>
+          <p:nvPr>
+            <p:ph type="title"/>
+          </p:nvPr>
+        </p:nvSpPr>
+        <p:spPr/>
+        <p:txBody>
+          <a:bodyPr/>
+          <a:lstStyle/>
+          <a:p>
+            <a:r>
+              <a:rPr lang="en-US" smtClean="0"/>
+              <a:t>Yêu cầu 11</a:t>
+            </a:r>
+            <a:endParaRPr lang="en-US"/>
+          </a:p>
+        </p:txBody>
+      </p:sp>
+      <p:sp>
+        <p:nvSpPr>
+          <p:cNvPr id="4" name="Content Placeholder 3"/>
+          <p:cNvSpPr>
+            <a:spLocks noGrp="1"/>
+          </p:cNvSpPr>
+          <p:nvPr>
+            <p:ph idx="1"/>
+          </p:nvPr>
+        </p:nvSpPr>
+        <p:spPr>
+          <a:xfrm>
+            <a:off x="628650" y="1872168"/>
+            <a:ext cx="7886700" cy="4452432"/>
+          </a:xfrm>
+        </p:spPr>
+        <p:txBody>
+          <a:bodyPr>
+            <a:normAutofit fontScale="85000" lnSpcReduction="20000"/>
+          </a:bodyPr>
+          <a:lstStyle/>
+          <a:p>
+            <a:pPr marL="0" indent="0">
+              <a:buNone/>
+            </a:pPr>
+            <a:r>
+              <a:rPr lang="en-US" b="1"/>
+              <a:t>Các thành phần bị </a:t>
+            </a:r>
+            <a:r>
+              <a:rPr lang="en-US" b="1"/>
+              <a:t>ảnh </a:t>
+            </a:r>
+            <a:r>
+              <a:rPr lang="en-US" b="1" smtClean="0"/>
+              <a:t>hưởng</a:t>
+            </a:r>
+            <a:endParaRPr lang="en-US" b="1"/>
+          </a:p>
+          <a:p>
+            <a:r>
+              <a:rPr lang="en-US"/>
+              <a:t>Chương trình: cập nhật lại file controller, model, view  của chức năng quản lý đơn vị.</a:t>
+            </a:r>
+          </a:p>
+          <a:p>
+            <a:r>
+              <a:rPr lang="en-US"/>
+              <a:t>Tài liệu: Các thành phần giao diện của chức năng quản lý đơn </a:t>
+            </a:r>
+            <a:r>
+              <a:rPr lang="en-US"/>
+              <a:t>vị</a:t>
+            </a:r>
+            <a:r>
+              <a:rPr lang="en-US" smtClean="0"/>
+              <a:t>.</a:t>
+            </a:r>
+          </a:p>
+          <a:p>
+            <a:pPr marL="0" indent="0">
+              <a:buNone/>
+            </a:pPr>
+            <a:r>
+              <a:rPr lang="en-US" b="1"/>
+              <a:t>Các giải pháp:</a:t>
+            </a:r>
+          </a:p>
+          <a:p>
+            <a:r>
+              <a:rPr lang="en-US"/>
+              <a:t>Giải pháp 1:</a:t>
+            </a:r>
+          </a:p>
+          <a:p>
+            <a:pPr lvl="1"/>
+            <a:r>
+              <a:rPr lang="en-US"/>
+              <a:t>Sử dụng javascript để kiểm tra các ràng buộc.</a:t>
+            </a:r>
+          </a:p>
+          <a:p>
+            <a:pPr lvl="1"/>
+            <a:r>
+              <a:rPr lang="en-US"/>
+              <a:t>Số người: 1-2 người.</a:t>
+            </a:r>
+          </a:p>
+          <a:p>
+            <a:pPr lvl="1"/>
+            <a:r>
+              <a:rPr lang="en-US"/>
+              <a:t>Thời gian: 1-2 tuần.</a:t>
+            </a:r>
+          </a:p>
+          <a:p>
+            <a:pPr lvl="1"/>
+            <a:r>
+              <a:rPr lang="en-US"/>
+              <a:t>Kỹ năng: hiểu rõ và sử dụng được javascript.</a:t>
+            </a:r>
+          </a:p>
+          <a:p>
+            <a:r>
+              <a:rPr lang="en-US"/>
+              <a:t>Giải pháp 2:</a:t>
+            </a:r>
+          </a:p>
+          <a:p>
+            <a:pPr lvl="1"/>
+            <a:r>
+              <a:rPr lang="en-US"/>
+              <a:t>Sử dụng form_validation của codeIgniter hỗ trợ. </a:t>
+            </a:r>
+          </a:p>
+          <a:p>
+            <a:pPr lvl="1"/>
+            <a:r>
+              <a:rPr lang="en-US"/>
+              <a:t>Số người: 1 người.</a:t>
+            </a:r>
+          </a:p>
+          <a:p>
+            <a:pPr lvl="1"/>
+            <a:r>
+              <a:rPr lang="en-US"/>
+              <a:t>Thời gian: 1 tuần.</a:t>
+            </a:r>
+          </a:p>
+          <a:p>
+            <a:pPr lvl="1"/>
+            <a:r>
+              <a:rPr lang="en-US"/>
+              <a:t>Kỹ năng: hiểu rõ được cơ chế hoạt động </a:t>
+            </a:r>
+            <a:r>
+              <a:rPr lang="en-US"/>
+              <a:t>codeIgniter</a:t>
+            </a:r>
+            <a:r>
+              <a:rPr lang="en-US" smtClean="0"/>
+              <a:t>.</a:t>
+            </a:r>
+          </a:p>
+          <a:p>
+            <a:r>
+              <a:rPr lang="en-US" sz="2400" b="1"/>
+              <a:t>Đề xuất giải pháp </a:t>
+            </a:r>
+            <a:r>
+              <a:rPr lang="en-US" sz="2400" b="1"/>
+              <a:t>tốt </a:t>
+            </a:r>
+            <a:r>
+              <a:rPr lang="en-US" sz="2400" b="1" smtClean="0"/>
+              <a:t>nhất: </a:t>
+            </a:r>
+            <a:r>
+              <a:rPr lang="en-US" sz="2400" smtClean="0"/>
+              <a:t>Đề </a:t>
+            </a:r>
+            <a:r>
+              <a:rPr lang="en-US" sz="2400"/>
+              <a:t>xuất giải pháp 2 vì codeIgniter hỗ trợ sẵn sử dụng nhanh chóng và </a:t>
+            </a:r>
+            <a:r>
+              <a:rPr lang="en-US" sz="2400"/>
+              <a:t>dễ </a:t>
+            </a:r>
+            <a:r>
+              <a:rPr lang="en-US" sz="2400" smtClean="0"/>
+              <a:t>dàng</a:t>
+            </a:r>
+          </a:p>
+          <a:p>
+            <a:pPr marL="0" indent="0">
+              <a:buNone/>
+            </a:pPr>
+            <a:r>
+              <a:rPr lang="en-US" b="1"/>
+              <a:t>Quyết định</a:t>
+            </a:r>
+            <a:r>
+              <a:rPr lang="en-US"/>
+              <a:t> </a:t>
+            </a:r>
+            <a:r>
+              <a:rPr lang="en-US">
+                <a:solidFill>
+                  <a:srgbClr val="00B050"/>
+                </a:solidFill>
+              </a:rPr>
+              <a:t>Chấp </a:t>
+            </a:r>
+            <a:r>
+              <a:rPr lang="en-US" smtClean="0">
+                <a:solidFill>
+                  <a:srgbClr val="00B050"/>
+                </a:solidFill>
+              </a:rPr>
+              <a:t>nhận</a:t>
+            </a:r>
+            <a:endParaRPr lang="en-US"/>
+          </a:p>
+        </p:txBody>
+      </p:sp>
+    </p:spTree>
+    <p:extLst>
+      <p:ext uri="{BB962C8B-B14F-4D97-AF65-F5344CB8AC3E}">
+        <p14:creationId xmlns:p14="http://schemas.microsoft.com/office/powerpoint/2010/main" val="2432035070"/>
+      </p:ext>
+    </p:extLst>
+  </p:cSld>
+  <p:clrMapOvr>
+    <a:masterClrMapping/>
+  </p:clrMapOvr>
+  <mc:AlternateContent xmlns:mc="http://schemas.openxmlformats.org/markup-compatibility/2006" xmlns:p14="http://schemas.microsoft.com/office/powerpoint/2010/main">
+    <mc:Choice Requires="p14">
+      <p:transition spd="med" p14:dur="700">
+        <p:fade/>
+      </p:transition>
+    </mc:Choice>
+    <mc:Fallback xmlns="">
+      <p:transition spd="med">
+        <p:fade/>
+      </p:transition>
+    </mc:Fallback>
+  </mc:AlternateContent>
+  <p:timing>
+    <p:tnLst>
+      <p:par>
+        <p:cTn id="1" dur="indefinite" restart="never" nodeType="tmRoot"/>
+      </p:par>
+    </p:tnLst>
+  </p:timing>
+</p:sld>
+</file>
+
+<file path=ppt/slides/slide41.xml><?xml version="1.0" encoding="utf-8"?>
+<p:sld xmlns:a="http://schemas.openxmlformats.org/drawingml/2006/main" xmlns:r="http://schemas.openxmlformats.org/officeDocument/2006/relationships" xmlns:p="http://schemas.openxmlformats.org/presentationml/2006/main">
+  <p:cSld>
+    <p:spTree>
+      <p:nvGrpSpPr>
+        <p:cNvPr id="1" name=""/>
+        <p:cNvGrpSpPr/>
+        <p:nvPr/>
+      </p:nvGrpSpPr>
+      <p:grpSpPr>
+        <a:xfrm>
+          <a:off x="0" y="0"/>
+          <a:ext cx="0" cy="0"/>
+          <a:chOff x="0" y="0"/>
+          <a:chExt cx="0" cy="0"/>
+        </a:xfrm>
+      </p:grpSpPr>
+      <p:sp>
+        <p:nvSpPr>
+          <p:cNvPr id="2" name="Title 1"/>
+          <p:cNvSpPr>
+            <a:spLocks noGrp="1"/>
+          </p:cNvSpPr>
+          <p:nvPr>
+            <p:ph type="title"/>
+          </p:nvPr>
+        </p:nvSpPr>
+        <p:spPr/>
+        <p:txBody>
+          <a:bodyPr/>
+          <a:lstStyle/>
+          <a:p>
+            <a:r>
+              <a:rPr lang="en-US" smtClean="0"/>
+              <a:t>Yêu cầu 12</a:t>
+            </a:r>
+            <a:endParaRPr lang="en-US"/>
+          </a:p>
+        </p:txBody>
+      </p:sp>
+      <p:sp>
+        <p:nvSpPr>
+          <p:cNvPr id="4" name="Content Placeholder 3"/>
+          <p:cNvSpPr>
+            <a:spLocks noGrp="1"/>
+          </p:cNvSpPr>
+          <p:nvPr>
+            <p:ph idx="1"/>
+          </p:nvPr>
+        </p:nvSpPr>
+        <p:spPr>
+          <a:xfrm>
+            <a:off x="628650" y="1872168"/>
+            <a:ext cx="7886700" cy="4452432"/>
+          </a:xfrm>
+        </p:spPr>
+        <p:txBody>
+          <a:bodyPr>
+            <a:normAutofit/>
+          </a:bodyPr>
+          <a:lstStyle/>
+          <a:p>
+            <a:pPr marL="0" indent="0">
+              <a:buNone/>
+            </a:pPr>
+            <a:r>
+              <a:rPr lang="en-US" b="1"/>
+              <a:t>Hiện trạng</a:t>
+            </a:r>
+            <a:r>
+              <a:rPr lang="en-US"/>
+              <a:t>:  Chức năng </a:t>
+            </a:r>
+            <a:r>
+              <a:rPr lang="en-US" b="1"/>
+              <a:t>Quản lý máy biến áp</a:t>
+            </a:r>
+            <a:r>
+              <a:rPr lang="en-US"/>
+              <a:t> chưa kiểm tra và ràng buộc đầy đủ </a:t>
+            </a:r>
+            <a:r>
+              <a:rPr lang="en-US" b="1"/>
+              <a:t>ví dụ: </a:t>
+            </a:r>
+            <a:r>
+              <a:rPr lang="en-US"/>
+              <a:t>chưa kiểm tra mã số tài sản bị trùng, số NO có thể nhập chữ và số lẫn </a:t>
+            </a:r>
+            <a:r>
+              <a:rPr lang="en-US"/>
+              <a:t>lộn</a:t>
+            </a:r>
+            <a:r>
+              <a:rPr lang="en-US" smtClean="0"/>
+              <a:t>.</a:t>
+            </a:r>
+          </a:p>
+          <a:p>
+            <a:pPr marL="0" indent="0">
+              <a:buNone/>
+            </a:pPr>
+            <a:r>
+              <a:rPr lang="en-US" b="1"/>
+              <a:t>Yêu cầu thay đổi</a:t>
+            </a:r>
+            <a:r>
+              <a:rPr lang="en-US"/>
+              <a:t>:  Kiểm tra và ràng buộc các trường trong quản lý máy </a:t>
+            </a:r>
+            <a:r>
+              <a:rPr lang="en-US"/>
+              <a:t>biến </a:t>
+            </a:r>
+            <a:r>
+              <a:rPr lang="en-US" smtClean="0"/>
+              <a:t>áp</a:t>
+            </a:r>
+          </a:p>
+          <a:p>
+            <a:pPr marL="0" indent="0">
+              <a:buNone/>
+            </a:pPr>
+            <a:r>
+              <a:rPr lang="en-US" b="1"/>
+              <a:t>Loại yêu cầu thay đổi</a:t>
+            </a:r>
+            <a:r>
+              <a:rPr lang="en-US"/>
+              <a:t>: Bảo trì hiệu chỉnh. Chức năng cập nhật máy biến áp chưa kiểm tra và ràng buộc như đề xuất </a:t>
+            </a:r>
+            <a:r>
+              <a:rPr lang="en-US"/>
+              <a:t>đã </a:t>
+            </a:r>
+            <a:r>
+              <a:rPr lang="en-US" smtClean="0"/>
+              <a:t>nêu.</a:t>
+            </a:r>
+          </a:p>
+          <a:p>
+            <a:pPr marL="0" indent="0">
+              <a:buNone/>
+            </a:pPr>
+            <a:r>
+              <a:rPr lang="en-US" b="1"/>
+              <a:t>Mức ưu tiên</a:t>
+            </a:r>
+            <a:r>
+              <a:rPr lang="en-US"/>
+              <a:t>: Cao. Do có thể ảnh hưởng đến cơ sở dữ liệu hoặc sai sót </a:t>
+            </a:r>
+            <a:r>
+              <a:rPr lang="en-US"/>
+              <a:t>dữ </a:t>
+            </a:r>
+            <a:r>
+              <a:rPr lang="en-US" smtClean="0"/>
+              <a:t>liệu.</a:t>
+            </a:r>
+          </a:p>
+          <a:p>
+            <a:pPr marL="0" indent="0">
+              <a:buNone/>
+            </a:pPr>
+            <a:r>
+              <a:rPr lang="en-US" b="1"/>
+              <a:t>Các thành phần bị ảnh hưởng:</a:t>
+            </a:r>
+          </a:p>
+          <a:p>
+            <a:r>
+              <a:rPr lang="en-US"/>
+              <a:t>Chương trình: cập nhật lại file controller, model, view  của chức năng cập nhật máy biến </a:t>
+            </a:r>
+            <a:r>
+              <a:rPr lang="en-US"/>
+              <a:t>áp</a:t>
+            </a:r>
+            <a:r>
+              <a:rPr lang="en-US" smtClean="0"/>
+              <a:t>.</a:t>
+            </a:r>
+            <a:endParaRPr lang="en-US"/>
+          </a:p>
+        </p:txBody>
+      </p:sp>
+    </p:spTree>
+    <p:extLst>
+      <p:ext uri="{BB962C8B-B14F-4D97-AF65-F5344CB8AC3E}">
+        <p14:creationId xmlns:p14="http://schemas.microsoft.com/office/powerpoint/2010/main" val="3769887164"/>
+      </p:ext>
+    </p:extLst>
+  </p:cSld>
+  <p:clrMapOvr>
+    <a:masterClrMapping/>
+  </p:clrMapOvr>
+  <mc:AlternateContent xmlns:mc="http://schemas.openxmlformats.org/markup-compatibility/2006" xmlns:p14="http://schemas.microsoft.com/office/powerpoint/2010/main">
+    <mc:Choice Requires="p14">
+      <p:transition spd="med" p14:dur="700">
+        <p:fade/>
+      </p:transition>
+    </mc:Choice>
+    <mc:Fallback xmlns="">
+      <p:transition spd="med">
+        <p:fade/>
+      </p:transition>
+    </mc:Fallback>
+  </mc:AlternateContent>
+  <p:timing>
+    <p:tnLst>
+      <p:par>
+        <p:cTn id="1" dur="indefinite" restart="never" nodeType="tmRoot"/>
+      </p:par>
+    </p:tnLst>
+  </p:timing>
+</p:sld>
+</file>
+
+<file path=ppt/slides/slide42.xml><?xml version="1.0" encoding="utf-8"?>
+<p:sld xmlns:a="http://schemas.openxmlformats.org/drawingml/2006/main" xmlns:r="http://schemas.openxmlformats.org/officeDocument/2006/relationships" xmlns:p="http://schemas.openxmlformats.org/presentationml/2006/main">
+  <p:cSld>
+    <p:spTree>
+      <p:nvGrpSpPr>
+        <p:cNvPr id="1" name=""/>
+        <p:cNvGrpSpPr/>
+        <p:nvPr/>
+      </p:nvGrpSpPr>
+      <p:grpSpPr>
+        <a:xfrm>
+          <a:off x="0" y="0"/>
+          <a:ext cx="0" cy="0"/>
+          <a:chOff x="0" y="0"/>
+          <a:chExt cx="0" cy="0"/>
+        </a:xfrm>
+      </p:grpSpPr>
+      <p:sp>
+        <p:nvSpPr>
+          <p:cNvPr id="2" name="Title 1"/>
+          <p:cNvSpPr>
+            <a:spLocks noGrp="1"/>
+          </p:cNvSpPr>
+          <p:nvPr>
+            <p:ph type="title"/>
+          </p:nvPr>
+        </p:nvSpPr>
+        <p:spPr/>
+        <p:txBody>
+          <a:bodyPr/>
+          <a:lstStyle/>
+          <a:p>
+            <a:r>
+              <a:rPr lang="en-US" smtClean="0"/>
+              <a:t>Yêu cầu 12</a:t>
+            </a:r>
+            <a:endParaRPr lang="en-US"/>
+          </a:p>
+        </p:txBody>
+      </p:sp>
+      <p:sp>
+        <p:nvSpPr>
+          <p:cNvPr id="4" name="Content Placeholder 3"/>
+          <p:cNvSpPr>
+            <a:spLocks noGrp="1"/>
+          </p:cNvSpPr>
+          <p:nvPr>
+            <p:ph idx="1"/>
+          </p:nvPr>
+        </p:nvSpPr>
+        <p:spPr>
+          <a:xfrm>
+            <a:off x="628650" y="1872168"/>
+            <a:ext cx="7886700" cy="4452432"/>
+          </a:xfrm>
+        </p:spPr>
+        <p:txBody>
+          <a:bodyPr>
+            <a:normAutofit lnSpcReduction="10000"/>
+          </a:bodyPr>
+          <a:lstStyle/>
+          <a:p>
+            <a:pPr marL="0" indent="0">
+              <a:buNone/>
+            </a:pPr>
+            <a:r>
+              <a:rPr lang="en-US" b="1" smtClean="0"/>
+              <a:t>Các giải pháp:</a:t>
+            </a:r>
+          </a:p>
+          <a:p>
+            <a:r>
+              <a:rPr lang="en-US" smtClean="0"/>
+              <a:t>Giải </a:t>
+            </a:r>
+            <a:r>
+              <a:rPr lang="en-US"/>
+              <a:t>pháp 1:</a:t>
+            </a:r>
+          </a:p>
+          <a:p>
+            <a:pPr lvl="1"/>
+            <a:r>
+              <a:rPr lang="en-US"/>
+              <a:t>Sử dụng javascript để kiểm tra các ràng buộc.</a:t>
+            </a:r>
+          </a:p>
+          <a:p>
+            <a:pPr lvl="1"/>
+            <a:r>
+              <a:rPr lang="en-US"/>
+              <a:t>Số người: 1-2 người.</a:t>
+            </a:r>
+          </a:p>
+          <a:p>
+            <a:pPr lvl="1"/>
+            <a:r>
+              <a:rPr lang="en-US"/>
+              <a:t>Thời gian: 1-2 tuần.</a:t>
+            </a:r>
+          </a:p>
+          <a:p>
+            <a:pPr lvl="1"/>
+            <a:r>
+              <a:rPr lang="en-US"/>
+              <a:t>Kỹ năng: hiểu rõ và sử dụng được javascript.</a:t>
+            </a:r>
+          </a:p>
+          <a:p>
+            <a:r>
+              <a:rPr lang="en-US"/>
+              <a:t>Giải pháp 2:</a:t>
+            </a:r>
+          </a:p>
+          <a:p>
+            <a:pPr lvl="1"/>
+            <a:r>
+              <a:rPr lang="en-US"/>
+              <a:t>Sử dụng form_validation của codeIgniter hỗ trợ và kết hợp với javascript. </a:t>
+            </a:r>
+          </a:p>
+          <a:p>
+            <a:pPr lvl="1"/>
+            <a:r>
+              <a:rPr lang="en-US"/>
+              <a:t>Số người: 1 người.</a:t>
+            </a:r>
+          </a:p>
+          <a:p>
+            <a:pPr lvl="1"/>
+            <a:r>
+              <a:rPr lang="en-US"/>
+              <a:t>Thời gian: 1 tuần.</a:t>
+            </a:r>
+          </a:p>
+          <a:p>
+            <a:pPr lvl="1"/>
+            <a:r>
+              <a:rPr lang="en-US"/>
+              <a:t>Kỹ năng: hiểu rõ được cơ chế hoạt động codeIgniter và javascript.</a:t>
+            </a:r>
+          </a:p>
+          <a:p>
+            <a:pPr marL="0" indent="0">
+              <a:buNone/>
+            </a:pPr>
+            <a:r>
+              <a:rPr lang="en-US" sz="2000" b="1"/>
+              <a:t>Đề xuất giải pháp </a:t>
+            </a:r>
+            <a:r>
+              <a:rPr lang="en-US" sz="2000" b="1"/>
+              <a:t>tốt </a:t>
+            </a:r>
+            <a:r>
+              <a:rPr lang="en-US" sz="2000" b="1" smtClean="0"/>
+              <a:t>nhất</a:t>
+            </a:r>
+            <a:r>
+              <a:rPr lang="en-US" sz="2000" smtClean="0"/>
+              <a:t>: Đề </a:t>
+            </a:r>
+            <a:r>
+              <a:rPr lang="en-US" sz="2000"/>
+              <a:t>xuất giải pháp 2 vì codeIgniter hỗ trợ sẵn sử dụng nhanh chóng và dễ dàng. Cũng như tiện dụng của </a:t>
+            </a:r>
+            <a:r>
+              <a:rPr lang="en-US" sz="2000"/>
+              <a:t>javascript</a:t>
+            </a:r>
+            <a:r>
+              <a:rPr lang="en-US" sz="2000" smtClean="0"/>
+              <a:t>.</a:t>
+            </a:r>
+          </a:p>
+          <a:p>
+            <a:pPr marL="0" indent="0">
+              <a:buNone/>
+            </a:pPr>
+            <a:r>
+              <a:rPr lang="en-US" b="1" smtClean="0"/>
+              <a:t>Quyết </a:t>
+            </a:r>
+            <a:r>
+              <a:rPr lang="en-US" b="1"/>
+              <a:t>định</a:t>
+            </a:r>
+            <a:r>
+              <a:rPr lang="en-US"/>
+              <a:t> </a:t>
+            </a:r>
+            <a:r>
+              <a:rPr lang="en-US">
+                <a:solidFill>
+                  <a:srgbClr val="00B050"/>
+                </a:solidFill>
+              </a:rPr>
+              <a:t>Chấp </a:t>
+            </a:r>
+            <a:r>
+              <a:rPr lang="en-US" smtClean="0">
+                <a:solidFill>
+                  <a:srgbClr val="00B050"/>
+                </a:solidFill>
+              </a:rPr>
+              <a:t>nhận</a:t>
+            </a:r>
+            <a:endParaRPr lang="en-US"/>
+          </a:p>
+        </p:txBody>
+      </p:sp>
+    </p:spTree>
+    <p:extLst>
+      <p:ext uri="{BB962C8B-B14F-4D97-AF65-F5344CB8AC3E}">
+        <p14:creationId xmlns:p14="http://schemas.microsoft.com/office/powerpoint/2010/main" val="14137095"/>
+      </p:ext>
+    </p:extLst>
+  </p:cSld>
+  <p:clrMapOvr>
+    <a:masterClrMapping/>
+  </p:clrMapOvr>
+  <mc:AlternateContent xmlns:mc="http://schemas.openxmlformats.org/markup-compatibility/2006" xmlns:p14="http://schemas.microsoft.com/office/powerpoint/2010/main">
+    <mc:Choice Requires="p14">
+      <p:transition spd="med" p14:dur="700">
+        <p:fade/>
+      </p:transition>
+    </mc:Choice>
+    <mc:Fallback xmlns="">
+      <p:transition spd="med">
+        <p:fade/>
+      </p:transition>
+    </mc:Fallback>
+  </mc:AlternateContent>
+  <p:timing>
+    <p:tnLst>
+      <p:par>
+        <p:cTn id="1" dur="indefinite" restart="never" nodeType="tmRoot"/>
+      </p:par>
+    </p:tnLst>
+  </p:timing>
+</p:sld>
+</file>
+
+<file path=ppt/slides/slide43.xml><?xml version="1.0" encoding="utf-8"?>
+<p:sld xmlns:a="http://schemas.openxmlformats.org/drawingml/2006/main" xmlns:r="http://schemas.openxmlformats.org/officeDocument/2006/relationships" xmlns:p="http://schemas.openxmlformats.org/presentationml/2006/main">
+  <p:cSld>
+    <p:spTree>
+      <p:nvGrpSpPr>
+        <p:cNvPr id="1" name=""/>
+        <p:cNvGrpSpPr/>
+        <p:nvPr/>
+      </p:nvGrpSpPr>
+      <p:grpSpPr>
+        <a:xfrm>
+          <a:off x="0" y="0"/>
+          <a:ext cx="0" cy="0"/>
+          <a:chOff x="0" y="0"/>
+          <a:chExt cx="0" cy="0"/>
+        </a:xfrm>
+      </p:grpSpPr>
+      <p:sp>
+        <p:nvSpPr>
+          <p:cNvPr id="2" name="Title 1"/>
+          <p:cNvSpPr>
+            <a:spLocks noGrp="1"/>
+          </p:cNvSpPr>
+          <p:nvPr>
+            <p:ph type="title"/>
+          </p:nvPr>
+        </p:nvSpPr>
+        <p:spPr/>
+        <p:txBody>
+          <a:bodyPr/>
+          <a:lstStyle/>
+          <a:p>
+            <a:r>
+              <a:rPr lang="en-US" smtClean="0"/>
+              <a:t>Yêu cầu 13</a:t>
+            </a:r>
+            <a:endParaRPr lang="en-US"/>
+          </a:p>
+        </p:txBody>
+      </p:sp>
+      <p:sp>
+        <p:nvSpPr>
+          <p:cNvPr id="4" name="Content Placeholder 3"/>
+          <p:cNvSpPr>
+            <a:spLocks noGrp="1"/>
+          </p:cNvSpPr>
+          <p:nvPr>
+            <p:ph idx="1"/>
+          </p:nvPr>
+        </p:nvSpPr>
+        <p:spPr>
+          <a:xfrm>
+            <a:off x="628650" y="1872168"/>
+            <a:ext cx="7886700" cy="947232"/>
+          </a:xfrm>
+        </p:spPr>
+        <p:txBody>
+          <a:bodyPr>
+            <a:normAutofit lnSpcReduction="10000"/>
+          </a:bodyPr>
+          <a:lstStyle/>
+          <a:p>
+            <a:pPr marL="0" indent="0">
+              <a:buNone/>
+            </a:pPr>
+            <a:r>
+              <a:rPr lang="en-US" b="1"/>
+              <a:t>Hiện trạng</a:t>
+            </a:r>
+            <a:r>
+              <a:rPr lang="en-US"/>
+              <a:t>: chức năng quản lý tình trạng máy biến áp vẫn còn bị lỗi bên phia database. Khi cập nhật tình trang máy biến áp 2 lần trong 1 ngày.</a:t>
+            </a:r>
+            <a:endParaRPr lang="en-US"/>
+          </a:p>
+        </p:txBody>
+      </p:sp>
+      <p:pic>
+        <p:nvPicPr>
+          <p:cNvPr id="5" name="Picture 4"/>
+          <p:cNvPicPr/>
+          <p:nvPr/>
+        </p:nvPicPr>
+        <p:blipFill rotWithShape="1">
+          <a:blip r:embed="rId2">
+            <a:extLst>
+              <a:ext uri="{28A0092B-C50C-407E-A947-70E740481C1C}">
+                <a14:useLocalDpi xmlns:a14="http://schemas.microsoft.com/office/drawing/2010/main" val="0"/>
+              </a:ext>
+            </a:extLst>
+          </a:blip>
+          <a:srcRect r="14916"/>
+          <a:stretch/>
+        </p:blipFill>
+        <p:spPr bwMode="auto">
+          <a:xfrm>
+            <a:off x="628650" y="2816156"/>
+            <a:ext cx="7511578" cy="1527243"/>
+          </a:xfrm>
+          <a:prstGeom prst="rect">
+            <a:avLst/>
+          </a:prstGeom>
+          <a:ln>
+            <a:noFill/>
+          </a:ln>
+          <a:extLst>
+            <a:ext uri="{53640926-AAD7-44D8-BBD7-CCE9431645EC}">
+              <a14:shadowObscured xmlns:a14="http://schemas.microsoft.com/office/drawing/2010/main"/>
+            </a:ext>
+          </a:extLst>
+        </p:spPr>
+      </p:pic>
+      <p:sp>
+        <p:nvSpPr>
+          <p:cNvPr id="6" name="Content Placeholder 3"/>
+          <p:cNvSpPr txBox="1">
+            <a:spLocks/>
+          </p:cNvSpPr>
+          <p:nvPr/>
+        </p:nvSpPr>
+        <p:spPr>
+          <a:xfrm>
+            <a:off x="533400" y="4419600"/>
+            <a:ext cx="7848600" cy="2209800"/>
+          </a:xfrm>
+          <a:prstGeom prst="rect">
+            <a:avLst/>
+          </a:prstGeom>
+        </p:spPr>
+        <p:txBody>
+          <a:bodyPr vert="horz" lIns="91440" tIns="45720" rIns="91440" bIns="45720" rtlCol="0">
+            <a:normAutofit lnSpcReduction="10000"/>
+          </a:bodyPr>
+          <a:lstStyle>
+            <a:lvl1pPr marL="171450" indent="-171450" algn="l" defTabSz="685800" rtl="0" eaLnBrk="1" latinLnBrk="0" hangingPunct="1">
+              <a:lnSpc>
+                <a:spcPct val="90000"/>
+              </a:lnSpc>
+              <a:spcBef>
+                <a:spcPts val="750"/>
+              </a:spcBef>
+              <a:buFont typeface="Arial" panose="020B0604020202020204" pitchFamily="34" charset="0"/>
+              <a:buChar char="•"/>
+              <a:defRPr sz="2100" kern="1200">
+                <a:solidFill>
+                  <a:schemeClr val="tx1"/>
+                </a:solidFill>
+                <a:latin typeface="+mn-lt"/>
+                <a:ea typeface="+mn-ea"/>
+                <a:cs typeface="+mn-cs"/>
+              </a:defRPr>
+            </a:lvl1pPr>
+            <a:lvl2pPr marL="514350" indent="-171450" algn="l" defTabSz="685800" rtl="0" eaLnBrk="1" latinLnBrk="0" hangingPunct="1">
+              <a:lnSpc>
+                <a:spcPct val="90000"/>
+              </a:lnSpc>
+              <a:spcBef>
+                <a:spcPts val="375"/>
+              </a:spcBef>
+              <a:buFont typeface="Arial" panose="020B0604020202020204" pitchFamily="34" charset="0"/>
+              <a:buChar char="•"/>
+              <a:defRPr sz="1800" kern="1200">
+                <a:solidFill>
+                  <a:schemeClr val="tx1"/>
+                </a:solidFill>
+                <a:latin typeface="+mn-lt"/>
+                <a:ea typeface="+mn-ea"/>
+                <a:cs typeface="+mn-cs"/>
+              </a:defRPr>
+            </a:lvl2pPr>
+            <a:lvl3pPr marL="857250" indent="-171450" algn="l" defTabSz="685800" rtl="0" eaLnBrk="1" latinLnBrk="0" hangingPunct="1">
+              <a:lnSpc>
+                <a:spcPct val="90000"/>
+              </a:lnSpc>
+              <a:spcBef>
+                <a:spcPts val="375"/>
+              </a:spcBef>
+              <a:buFont typeface="Arial" panose="020B0604020202020204" pitchFamily="34" charset="0"/>
+              <a:buChar char="•"/>
+              <a:defRPr sz="1500" kern="1200">
+                <a:solidFill>
+                  <a:schemeClr val="tx1"/>
+                </a:solidFill>
+                <a:latin typeface="+mn-lt"/>
+                <a:ea typeface="+mn-ea"/>
+                <a:cs typeface="+mn-cs"/>
+              </a:defRPr>
+            </a:lvl3pPr>
+            <a:lvl4pPr marL="1200150" indent="-171450" algn="l" defTabSz="685800" rtl="0" eaLnBrk="1" latinLnBrk="0" hangingPunct="1">
+              <a:lnSpc>
+                <a:spcPct val="90000"/>
+              </a:lnSpc>
+              <a:spcBef>
+                <a:spcPts val="375"/>
+              </a:spcBef>
+              <a:buFont typeface="Arial" panose="020B0604020202020204" pitchFamily="34" charset="0"/>
+              <a:buChar char="•"/>
+              <a:defRPr sz="1350" kern="1200">
+                <a:solidFill>
+                  <a:schemeClr val="tx1"/>
+                </a:solidFill>
+                <a:latin typeface="+mn-lt"/>
+                <a:ea typeface="+mn-ea"/>
+                <a:cs typeface="+mn-cs"/>
+              </a:defRPr>
+            </a:lvl4pPr>
+            <a:lvl5pPr marL="1543050" indent="-171450" algn="l" defTabSz="685800" rtl="0" eaLnBrk="1" latinLnBrk="0" hangingPunct="1">
+              <a:lnSpc>
+                <a:spcPct val="90000"/>
+              </a:lnSpc>
+              <a:spcBef>
+                <a:spcPts val="375"/>
+              </a:spcBef>
+              <a:buFont typeface="Arial" panose="020B0604020202020204" pitchFamily="34" charset="0"/>
+              <a:buChar char="•"/>
+              <a:defRPr sz="1350" kern="1200">
+                <a:solidFill>
+                  <a:schemeClr val="tx1"/>
+                </a:solidFill>
+                <a:latin typeface="+mn-lt"/>
+                <a:ea typeface="+mn-ea"/>
+                <a:cs typeface="+mn-cs"/>
+              </a:defRPr>
+            </a:lvl5pPr>
+            <a:lvl6pPr marL="1885950" indent="-171450" algn="l" defTabSz="685800" rtl="0" eaLnBrk="1" latinLnBrk="0" hangingPunct="1">
+              <a:lnSpc>
+                <a:spcPct val="90000"/>
+              </a:lnSpc>
+              <a:spcBef>
+                <a:spcPts val="375"/>
+              </a:spcBef>
+              <a:buFont typeface="Arial" panose="020B0604020202020204" pitchFamily="34" charset="0"/>
+              <a:buChar char="•"/>
+              <a:defRPr sz="1350" kern="1200">
+                <a:solidFill>
+                  <a:schemeClr val="tx1"/>
+                </a:solidFill>
+                <a:latin typeface="+mn-lt"/>
+                <a:ea typeface="+mn-ea"/>
+                <a:cs typeface="+mn-cs"/>
+              </a:defRPr>
+            </a:lvl6pPr>
+            <a:lvl7pPr marL="2228850" indent="-171450" algn="l" defTabSz="685800" rtl="0" eaLnBrk="1" latinLnBrk="0" hangingPunct="1">
+              <a:lnSpc>
+                <a:spcPct val="90000"/>
+              </a:lnSpc>
+              <a:spcBef>
+                <a:spcPts val="375"/>
+              </a:spcBef>
+              <a:buFont typeface="Arial" panose="020B0604020202020204" pitchFamily="34" charset="0"/>
+              <a:buChar char="•"/>
+              <a:defRPr sz="1350" kern="1200">
+                <a:solidFill>
+                  <a:schemeClr val="tx1"/>
+                </a:solidFill>
+                <a:latin typeface="+mn-lt"/>
+                <a:ea typeface="+mn-ea"/>
+                <a:cs typeface="+mn-cs"/>
+              </a:defRPr>
+            </a:lvl7pPr>
+            <a:lvl8pPr marL="2571750" indent="-171450" algn="l" defTabSz="685800" rtl="0" eaLnBrk="1" latinLnBrk="0" hangingPunct="1">
+              <a:lnSpc>
+                <a:spcPct val="90000"/>
+              </a:lnSpc>
+              <a:spcBef>
+                <a:spcPts val="375"/>
+              </a:spcBef>
+              <a:buFont typeface="Arial" panose="020B0604020202020204" pitchFamily="34" charset="0"/>
+              <a:buChar char="•"/>
+              <a:defRPr sz="1350" kern="1200">
+                <a:solidFill>
+                  <a:schemeClr val="tx1"/>
+                </a:solidFill>
+                <a:latin typeface="+mn-lt"/>
+                <a:ea typeface="+mn-ea"/>
+                <a:cs typeface="+mn-cs"/>
+              </a:defRPr>
+            </a:lvl8pPr>
+            <a:lvl9pPr marL="2914650" indent="-171450" algn="l" defTabSz="685800" rtl="0" eaLnBrk="1" latinLnBrk="0" hangingPunct="1">
+              <a:lnSpc>
+                <a:spcPct val="90000"/>
+              </a:lnSpc>
+              <a:spcBef>
+                <a:spcPts val="375"/>
+              </a:spcBef>
+              <a:buFont typeface="Arial" panose="020B0604020202020204" pitchFamily="34" charset="0"/>
+              <a:buChar char="•"/>
+              <a:defRPr sz="1350" kern="1200">
+                <a:solidFill>
+                  <a:schemeClr val="tx1"/>
+                </a:solidFill>
+                <a:latin typeface="+mn-lt"/>
+                <a:ea typeface="+mn-ea"/>
+                <a:cs typeface="+mn-cs"/>
+              </a:defRPr>
+            </a:lvl9pPr>
+          </a:lstStyle>
+          <a:p>
+            <a:pPr marL="0" indent="0">
+              <a:buNone/>
+            </a:pPr>
+            <a:r>
+              <a:rPr lang="en-US" b="1"/>
+              <a:t>Yêu cầu thay đổi</a:t>
+            </a:r>
+            <a:r>
+              <a:rPr lang="en-US"/>
+              <a:t>:  Khắc phục tình trạng lỗi database (nếu có lỗi thì hiện thông báo cho người dùng biết chứ không hiện thông báo như trên.)</a:t>
+            </a:r>
+          </a:p>
+          <a:p>
+            <a:pPr marL="0" indent="0">
+              <a:buNone/>
+            </a:pPr>
+            <a:r>
+              <a:rPr lang="en-US" b="1"/>
+              <a:t>Loại yêu cầu thay đổi</a:t>
+            </a:r>
+            <a:r>
+              <a:rPr lang="en-US"/>
+              <a:t>: Bảo trì hiệu chỉnh. Do chức năng cập nhật tình trạng máy biến áp vẫn còn hiện lỗi thao tác database, cần kiểm tra các ràng buộc</a:t>
+            </a:r>
+            <a:r>
+              <a:rPr lang="en-US"/>
+              <a:t>. </a:t>
+            </a:r>
+            <a:endParaRPr lang="en-US" smtClean="0"/>
+          </a:p>
+          <a:p>
+            <a:pPr marL="0" indent="0">
+              <a:buNone/>
+            </a:pPr>
+            <a:r>
+              <a:rPr lang="en-US" b="1"/>
+              <a:t>Mức ưu tiên</a:t>
+            </a:r>
+            <a:r>
+              <a:rPr lang="en-US"/>
+              <a:t>: Cao.</a:t>
+            </a:r>
+            <a:endParaRPr lang="en-US"/>
+          </a:p>
+        </p:txBody>
+      </p:sp>
+    </p:spTree>
+    <p:extLst>
+      <p:ext uri="{BB962C8B-B14F-4D97-AF65-F5344CB8AC3E}">
+        <p14:creationId xmlns:p14="http://schemas.microsoft.com/office/powerpoint/2010/main" val="1389427352"/>
+      </p:ext>
+    </p:extLst>
+  </p:cSld>
+  <p:clrMapOvr>
+    <a:masterClrMapping/>
+  </p:clrMapOvr>
+  <mc:AlternateContent xmlns:mc="http://schemas.openxmlformats.org/markup-compatibility/2006" xmlns:p14="http://schemas.microsoft.com/office/powerpoint/2010/main">
+    <mc:Choice Requires="p14">
+      <p:transition spd="med" p14:dur="700">
+        <p:fade/>
+      </p:transition>
+    </mc:Choice>
+    <mc:Fallback xmlns="">
+      <p:transition spd="med">
+        <p:fade/>
+      </p:transition>
+    </mc:Fallback>
+  </mc:AlternateContent>
+  <p:timing>
+    <p:tnLst>
+      <p:par>
+        <p:cTn id="1" dur="indefinite" restart="never" nodeType="tmRoot"/>
+      </p:par>
+    </p:tnLst>
+  </p:timing>
+</p:sld>
+</file>
+
+<file path=ppt/slides/slide44.xml><?xml version="1.0" encoding="utf-8"?>
+<p:sld xmlns:a="http://schemas.openxmlformats.org/drawingml/2006/main" xmlns:r="http://schemas.openxmlformats.org/officeDocument/2006/relationships" xmlns:p="http://schemas.openxmlformats.org/presentationml/2006/main">
+  <p:cSld>
+    <p:spTree>
+      <p:nvGrpSpPr>
+        <p:cNvPr id="1" name=""/>
+        <p:cNvGrpSpPr/>
+        <p:nvPr/>
+      </p:nvGrpSpPr>
+      <p:grpSpPr>
+        <a:xfrm>
+          <a:off x="0" y="0"/>
+          <a:ext cx="0" cy="0"/>
+          <a:chOff x="0" y="0"/>
+          <a:chExt cx="0" cy="0"/>
+        </a:xfrm>
+      </p:grpSpPr>
+      <p:sp>
+        <p:nvSpPr>
+          <p:cNvPr id="2" name="Title 1"/>
+          <p:cNvSpPr>
+            <a:spLocks noGrp="1"/>
+          </p:cNvSpPr>
+          <p:nvPr>
+            <p:ph type="title"/>
+          </p:nvPr>
+        </p:nvSpPr>
+        <p:spPr/>
+        <p:txBody>
+          <a:bodyPr/>
+          <a:lstStyle/>
+          <a:p>
+            <a:r>
+              <a:rPr lang="en-US" smtClean="0"/>
+              <a:t>Yêu cầu 13</a:t>
+            </a:r>
+            <a:endParaRPr lang="en-US"/>
+          </a:p>
+        </p:txBody>
+      </p:sp>
+      <p:sp>
+        <p:nvSpPr>
+          <p:cNvPr id="4" name="Content Placeholder 3"/>
+          <p:cNvSpPr>
+            <a:spLocks noGrp="1"/>
+          </p:cNvSpPr>
+          <p:nvPr>
+            <p:ph idx="1"/>
+          </p:nvPr>
+        </p:nvSpPr>
+        <p:spPr/>
+        <p:txBody>
+          <a:bodyPr>
+            <a:normAutofit fontScale="85000" lnSpcReduction="20000"/>
+          </a:bodyPr>
+          <a:lstStyle/>
+          <a:p>
+            <a:pPr marL="0" indent="0">
+              <a:buNone/>
+            </a:pPr>
+            <a:r>
+              <a:rPr lang="en-US" b="1"/>
+              <a:t>Các thành phần bị ảnh hưởng:</a:t>
+            </a:r>
+          </a:p>
+          <a:p>
+            <a:r>
+              <a:rPr lang="en-US"/>
+              <a:t>Chương trình: cập nhật lại file controller, model, view  của chức năng cập nhật tình trạng </a:t>
+            </a:r>
+            <a:r>
+              <a:rPr lang="en-US"/>
+              <a:t>máy </a:t>
+            </a:r>
+            <a:r>
+              <a:rPr lang="en-US" smtClean="0"/>
+              <a:t>biến </a:t>
+            </a:r>
+            <a:r>
+              <a:rPr lang="en-US"/>
+              <a:t>áp</a:t>
+            </a:r>
+            <a:r>
+              <a:rPr lang="en-US" smtClean="0"/>
+              <a:t>.</a:t>
+            </a:r>
+          </a:p>
+          <a:p>
+            <a:pPr marL="0" indent="0">
+              <a:buNone/>
+            </a:pPr>
+            <a:r>
+              <a:rPr lang="en-US" b="1"/>
+              <a:t>Các giải pháp:</a:t>
+            </a:r>
+          </a:p>
+          <a:p>
+            <a:r>
+              <a:rPr lang="en-US"/>
+              <a:t>Giải pháp 1:</a:t>
+            </a:r>
+          </a:p>
+          <a:p>
+            <a:pPr lvl="1"/>
+            <a:r>
+              <a:rPr lang="en-US"/>
+              <a:t>Sử dụng javascript để kiểm tra các ràng buộc.</a:t>
+            </a:r>
+          </a:p>
+          <a:p>
+            <a:pPr lvl="1"/>
+            <a:r>
+              <a:rPr lang="en-US"/>
+              <a:t>Số người: 1-2 người.</a:t>
+            </a:r>
+          </a:p>
+          <a:p>
+            <a:pPr lvl="1"/>
+            <a:r>
+              <a:rPr lang="en-US"/>
+              <a:t>Thời gian: 1-2 tuần.</a:t>
+            </a:r>
+          </a:p>
+          <a:p>
+            <a:pPr lvl="1"/>
+            <a:r>
+              <a:rPr lang="en-US"/>
+              <a:t>Kỹ năng: hiểu rõ và sử dụng được javascript.</a:t>
+            </a:r>
+          </a:p>
+          <a:p>
+            <a:r>
+              <a:rPr lang="en-US"/>
+              <a:t>Giải pháp 2:</a:t>
+            </a:r>
+          </a:p>
+          <a:p>
+            <a:pPr lvl="1"/>
+            <a:r>
+              <a:rPr lang="en-US"/>
+              <a:t>Sử dụng form_validation của codeIgniter hỗ trợ và kết hợp với javascript. </a:t>
+            </a:r>
+          </a:p>
+          <a:p>
+            <a:pPr lvl="1"/>
+            <a:r>
+              <a:rPr lang="en-US"/>
+              <a:t>Số người: 1 người.</a:t>
+            </a:r>
+          </a:p>
+          <a:p>
+            <a:pPr lvl="1"/>
+            <a:r>
+              <a:rPr lang="en-US"/>
+              <a:t>Thời gian: 1 tuần.</a:t>
+            </a:r>
+          </a:p>
+          <a:p>
+            <a:pPr lvl="1"/>
+            <a:r>
+              <a:rPr lang="en-US"/>
+              <a:t>Kỹ năng: hiểu rõ được cơ chế hoạt động codeIgniter và </a:t>
+            </a:r>
+            <a:r>
+              <a:rPr lang="en-US"/>
+              <a:t>javascript</a:t>
+            </a:r>
+            <a:r>
+              <a:rPr lang="en-US" smtClean="0"/>
+              <a:t>.</a:t>
+            </a:r>
+            <a:endParaRPr lang="en-US"/>
+          </a:p>
+          <a:p>
+            <a:pPr marL="0" indent="0">
+              <a:buNone/>
+            </a:pPr>
+            <a:r>
+              <a:rPr lang="en-US" sz="2400" b="1"/>
+              <a:t>Đề xuất giải pháp </a:t>
+            </a:r>
+            <a:r>
+              <a:rPr lang="en-US" sz="2400" b="1"/>
+              <a:t>tốt </a:t>
+            </a:r>
+            <a:r>
+              <a:rPr lang="en-US" sz="2400" b="1" smtClean="0"/>
+              <a:t>nhất:</a:t>
+            </a:r>
+            <a:r>
+              <a:rPr lang="en-US" sz="2800" b="1"/>
+              <a:t> </a:t>
+            </a:r>
+            <a:r>
+              <a:rPr lang="en-US" sz="2400" smtClean="0"/>
+              <a:t>Đề </a:t>
+            </a:r>
+            <a:r>
+              <a:rPr lang="en-US" sz="2400"/>
+              <a:t>xuất giải pháp 2 vì codeIgniter hỗ trợ sẵn sử dụng nhanh chóng và dễ dàng. Cũng như tiện dụng của </a:t>
+            </a:r>
+            <a:r>
+              <a:rPr lang="en-US" sz="2400"/>
+              <a:t>javascript</a:t>
+            </a:r>
+            <a:r>
+              <a:rPr lang="en-US" sz="2400" smtClean="0"/>
+              <a:t>.</a:t>
+            </a:r>
+          </a:p>
+          <a:p>
+            <a:pPr marL="0" indent="0">
+              <a:buNone/>
+            </a:pPr>
+            <a:r>
+              <a:rPr lang="en-US" b="1"/>
+              <a:t>Quyết định</a:t>
+            </a:r>
+            <a:r>
+              <a:rPr lang="en-US"/>
+              <a:t> </a:t>
+            </a:r>
+            <a:r>
+              <a:rPr lang="en-US">
+                <a:solidFill>
+                  <a:srgbClr val="00B050"/>
+                </a:solidFill>
+              </a:rPr>
+              <a:t>Chấp </a:t>
+            </a:r>
+            <a:r>
+              <a:rPr lang="en-US" smtClean="0">
+                <a:solidFill>
+                  <a:srgbClr val="00B050"/>
+                </a:solidFill>
+              </a:rPr>
+              <a:t>nhận</a:t>
+            </a:r>
+            <a:endParaRPr lang="en-US"/>
+          </a:p>
+        </p:txBody>
+      </p:sp>
+    </p:spTree>
+    <p:extLst>
+      <p:ext uri="{BB962C8B-B14F-4D97-AF65-F5344CB8AC3E}">
+        <p14:creationId xmlns:p14="http://schemas.microsoft.com/office/powerpoint/2010/main" val="1592301045"/>
+      </p:ext>
+    </p:extLst>
+  </p:cSld>
+  <p:clrMapOvr>
+    <a:masterClrMapping/>
+  </p:clrMapOvr>
+  <mc:AlternateContent xmlns:mc="http://schemas.openxmlformats.org/markup-compatibility/2006" xmlns:p14="http://schemas.microsoft.com/office/powerpoint/2010/main">
+    <mc:Choice Requires="p14">
+      <p:transition spd="med" p14:dur="700">
+        <p:fade/>
+      </p:transition>
+    </mc:Choice>
+    <mc:Fallback xmlns="">
+      <p:transition spd="med">
+        <p:fade/>
+      </p:transition>
+    </mc:Fallback>
+  </mc:AlternateContent>
+  <p:timing>
+    <p:tnLst>
+      <p:par>
+        <p:cTn id="1" dur="indefinite" restart="never" nodeType="tmRoot"/>
+      </p:par>
+    </p:tnLst>
+  </p:timing>
+</p:sld>
+</file>
+
+<file path=ppt/slides/slide45.xml><?xml version="1.0" encoding="utf-8"?>
+<p:sld xmlns:a="http://schemas.openxmlformats.org/drawingml/2006/main" xmlns:r="http://schemas.openxmlformats.org/officeDocument/2006/relationships" xmlns:p="http://schemas.openxmlformats.org/presentationml/2006/main">
+  <p:cSld>
+    <p:spTree>
+      <p:nvGrpSpPr>
+        <p:cNvPr id="1" name=""/>
+        <p:cNvGrpSpPr/>
+        <p:nvPr/>
+      </p:nvGrpSpPr>
+      <p:grpSpPr>
+        <a:xfrm>
+          <a:off x="0" y="0"/>
+          <a:ext cx="0" cy="0"/>
+          <a:chOff x="0" y="0"/>
+          <a:chExt cx="0" cy="0"/>
+        </a:xfrm>
+      </p:grpSpPr>
+      <p:sp>
+        <p:nvSpPr>
+          <p:cNvPr id="5" name="Title 4"/>
+          <p:cNvSpPr>
+            <a:spLocks noGrp="1"/>
+          </p:cNvSpPr>
+          <p:nvPr>
+            <p:ph type="ctrTitle"/>
+          </p:nvPr>
+        </p:nvSpPr>
+        <p:spPr/>
+        <p:txBody>
+          <a:bodyPr/>
+          <a:lstStyle/>
+          <a:p>
+            <a:r>
+              <a:rPr lang="en-US" smtClean="0"/>
+              <a:t>Cám ơn!</a:t>
+            </a:r>
+            <a:endParaRPr lang="en-US"/>
+          </a:p>
+        </p:txBody>
+      </p:sp>
+      <p:sp>
+        <p:nvSpPr>
+          <p:cNvPr id="6" name="Subtitle 5"/>
+          <p:cNvSpPr>
+            <a:spLocks noGrp="1"/>
+          </p:cNvSpPr>
+          <p:nvPr>
+            <p:ph type="subTitle" idx="1"/>
+          </p:nvPr>
+        </p:nvSpPr>
+        <p:spPr/>
+        <p:txBody>
+          <a:bodyPr/>
+          <a:lstStyle/>
+          <a:p>
+            <a:endParaRPr lang="en-US"/>
+          </a:p>
+        </p:txBody>
+      </p:sp>
+    </p:spTree>
+    <p:extLst>
+      <p:ext uri="{BB962C8B-B14F-4D97-AF65-F5344CB8AC3E}">
+        <p14:creationId xmlns:p14="http://schemas.microsoft.com/office/powerpoint/2010/main" val="773050870"/>
       </p:ext>
     </p:extLst>
   </p:cSld>

</xml_diff>

<commit_message>
update bao_cao_nop_co va PTSTD va slide bao cao
dien ten va chinh sua thong tin
</commit_message>
<xml_diff>
--- a/BaiTap2/BT01_BT2_Slide.pptx
+++ b/BaiTap2/BT01_BT2_Slide.pptx
@@ -156,7 +156,7 @@
   </p:defaultTextStyle>
   <p:extLst>
     <p:ext uri="{EFAFB233-063F-42B5-8137-9DF3F51BA10A}">
-      <p15:sldGuideLst xmlns:p15="http://schemas.microsoft.com/office/powerpoint/2012/main">
+      <p15:sldGuideLst xmlns:p15="http://schemas.microsoft.com/office/powerpoint/2012/main" xmlns="">
         <p15:guide id="1" orient="horz" pos="2160">
           <p15:clr>
             <a:srgbClr val="A4A3A4"/>
@@ -170,7 +170,7 @@
       </p15:sldGuideLst>
     </p:ext>
     <p:ext uri="{2D200454-40CA-4A62-9FC3-DE9A4176ACB9}">
-      <p15:notesGuideLst xmlns:p15="http://schemas.microsoft.com/office/powerpoint/2012/main"/>
+      <p15:notesGuideLst xmlns:p15="http://schemas.microsoft.com/office/powerpoint/2012/main" xmlns=""/>
     </p:ext>
   </p:extLst>
 </p:presentation>
@@ -315,11 +315,11 @@
           <c:showPercent val="0"/>
           <c:showBubbleSize val="0"/>
         </c:dLbls>
-        <c:axId val="272243128"/>
-        <c:axId val="272247440"/>
+        <c:axId val="35967744"/>
+        <c:axId val="94853376"/>
       </c:radarChart>
       <c:catAx>
-        <c:axId val="272243128"/>
+        <c:axId val="35967744"/>
         <c:scaling>
           <c:orientation val="minMax"/>
         </c:scaling>
@@ -362,7 +362,7 @@
             <a:endParaRPr lang="en-US"/>
           </a:p>
         </c:txPr>
-        <c:crossAx val="272247440"/>
+        <c:crossAx val="94853376"/>
         <c:crosses val="autoZero"/>
         <c:auto val="1"/>
         <c:lblAlgn val="ctr"/>
@@ -370,7 +370,7 @@
         <c:noMultiLvlLbl val="0"/>
       </c:catAx>
       <c:valAx>
-        <c:axId val="272247440"/>
+        <c:axId val="94853376"/>
         <c:scaling>
           <c:orientation val="minMax"/>
         </c:scaling>
@@ -421,7 +421,7 @@
             <a:endParaRPr lang="en-US"/>
           </a:p>
         </c:txPr>
-        <c:crossAx val="272243128"/>
+        <c:crossAx val="35967744"/>
         <c:crosses val="autoZero"/>
         <c:crossBetween val="between"/>
       </c:valAx>
@@ -454,7 +454,7 @@
       <a:endParaRPr lang="en-US"/>
     </a:p>
   </c:txPr>
-  <c:externalData r:id="rId3">
+  <c:externalData r:id="rId1">
     <c:autoUpdate val="0"/>
   </c:externalData>
 </c:chartSpace>
@@ -599,11 +599,11 @@
           <c:showPercent val="0"/>
           <c:showBubbleSize val="0"/>
         </c:dLbls>
-        <c:axId val="272243520"/>
-        <c:axId val="272249792"/>
+        <c:axId val="98581120"/>
+        <c:axId val="98607488"/>
       </c:radarChart>
       <c:catAx>
-        <c:axId val="272243520"/>
+        <c:axId val="98581120"/>
         <c:scaling>
           <c:orientation val="minMax"/>
         </c:scaling>
@@ -646,7 +646,7 @@
             <a:endParaRPr lang="en-US"/>
           </a:p>
         </c:txPr>
-        <c:crossAx val="272249792"/>
+        <c:crossAx val="98607488"/>
         <c:crosses val="autoZero"/>
         <c:auto val="1"/>
         <c:lblAlgn val="ctr"/>
@@ -654,7 +654,7 @@
         <c:noMultiLvlLbl val="0"/>
       </c:catAx>
       <c:valAx>
-        <c:axId val="272249792"/>
+        <c:axId val="98607488"/>
         <c:scaling>
           <c:orientation val="minMax"/>
         </c:scaling>
@@ -705,7 +705,7 @@
             <a:endParaRPr lang="en-US"/>
           </a:p>
         </c:txPr>
-        <c:crossAx val="272243520"/>
+        <c:crossAx val="98581120"/>
         <c:crosses val="autoZero"/>
         <c:crossBetween val="between"/>
       </c:valAx>
@@ -738,7 +738,7 @@
       <a:endParaRPr lang="en-US"/>
     </a:p>
   </c:txPr>
-  <c:externalData r:id="rId3">
+  <c:externalData r:id="rId1">
     <c:autoUpdate val="0"/>
   </c:externalData>
 </c:chartSpace>
@@ -883,11 +883,11 @@
           <c:showPercent val="0"/>
           <c:showBubbleSize val="0"/>
         </c:dLbls>
-        <c:axId val="272250184"/>
-        <c:axId val="272243912"/>
+        <c:axId val="110151552"/>
+        <c:axId val="110153088"/>
       </c:radarChart>
       <c:catAx>
-        <c:axId val="272250184"/>
+        <c:axId val="110151552"/>
         <c:scaling>
           <c:orientation val="minMax"/>
         </c:scaling>
@@ -930,7 +930,7 @@
             <a:endParaRPr lang="en-US"/>
           </a:p>
         </c:txPr>
-        <c:crossAx val="272243912"/>
+        <c:crossAx val="110153088"/>
         <c:crosses val="autoZero"/>
         <c:auto val="1"/>
         <c:lblAlgn val="ctr"/>
@@ -938,7 +938,7 @@
         <c:noMultiLvlLbl val="0"/>
       </c:catAx>
       <c:valAx>
-        <c:axId val="272243912"/>
+        <c:axId val="110153088"/>
         <c:scaling>
           <c:orientation val="minMax"/>
         </c:scaling>
@@ -989,7 +989,7 @@
             <a:endParaRPr lang="en-US"/>
           </a:p>
         </c:txPr>
-        <c:crossAx val="272250184"/>
+        <c:crossAx val="110151552"/>
         <c:crosses val="autoZero"/>
         <c:crossBetween val="between"/>
       </c:valAx>
@@ -1022,7 +1022,7 @@
       <a:endParaRPr lang="en-US"/>
     </a:p>
   </c:txPr>
-  <c:externalData r:id="rId3">
+  <c:externalData r:id="rId1">
     <c:autoUpdate val="0"/>
   </c:externalData>
 </c:chartSpace>
@@ -1167,11 +1167,11 @@
           <c:showPercent val="0"/>
           <c:showBubbleSize val="0"/>
         </c:dLbls>
-        <c:axId val="272244696"/>
-        <c:axId val="272245872"/>
+        <c:axId val="109313024"/>
+        <c:axId val="109671168"/>
       </c:radarChart>
       <c:catAx>
-        <c:axId val="272244696"/>
+        <c:axId val="109313024"/>
         <c:scaling>
           <c:orientation val="minMax"/>
         </c:scaling>
@@ -1214,7 +1214,7 @@
             <a:endParaRPr lang="en-US"/>
           </a:p>
         </c:txPr>
-        <c:crossAx val="272245872"/>
+        <c:crossAx val="109671168"/>
         <c:crosses val="autoZero"/>
         <c:auto val="1"/>
         <c:lblAlgn val="ctr"/>
@@ -1222,7 +1222,7 @@
         <c:noMultiLvlLbl val="0"/>
       </c:catAx>
       <c:valAx>
-        <c:axId val="272245872"/>
+        <c:axId val="109671168"/>
         <c:scaling>
           <c:orientation val="minMax"/>
         </c:scaling>
@@ -1273,7 +1273,7 @@
             <a:endParaRPr lang="en-US"/>
           </a:p>
         </c:txPr>
-        <c:crossAx val="272244696"/>
+        <c:crossAx val="109313024"/>
         <c:crosses val="autoZero"/>
         <c:crossBetween val="between"/>
       </c:valAx>
@@ -1306,7 +1306,7 @@
       <a:endParaRPr lang="en-US"/>
     </a:p>
   </c:txPr>
-  <c:externalData r:id="rId3">
+  <c:externalData r:id="rId1">
     <c:autoUpdate val="0"/>
   </c:externalData>
 </c:chartSpace>
@@ -27852,15 +27852,155 @@
               <a:buNone/>
             </a:pPr>
             <a:r>
-              <a:rPr lang="en-US" b="1"/>
-              <a:t>Hiện trạng</a:t>
-            </a:r>
-            <a:r>
-              <a:rPr lang="en-US"/>
-              <a:t>:  Các thông báo chưa được chuyển qua tiếng việt 100%, vẫn còn một số thông  báo là tiếng anh</a:t>
-            </a:r>
-            <a:r>
-              <a:rPr lang="en-US" smtClean="0"/>
+              <a:rPr lang="en-US" b="1" dirty="0" err="1"/>
+              <a:t>Hiện</a:t>
+            </a:r>
+            <a:r>
+              <a:rPr lang="en-US" b="1" dirty="0"/>
+              <a:t> </a:t>
+            </a:r>
+            <a:r>
+              <a:rPr lang="en-US" b="1" dirty="0" err="1"/>
+              <a:t>trạng</a:t>
+            </a:r>
+            <a:r>
+              <a:rPr lang="en-US" dirty="0"/>
+              <a:t>:  </a:t>
+            </a:r>
+            <a:r>
+              <a:rPr lang="en-US" dirty="0" err="1"/>
+              <a:t>Các</a:t>
+            </a:r>
+            <a:r>
+              <a:rPr lang="en-US" dirty="0"/>
+              <a:t> </a:t>
+            </a:r>
+            <a:r>
+              <a:rPr lang="en-US" dirty="0" err="1"/>
+              <a:t>thông</a:t>
+            </a:r>
+            <a:r>
+              <a:rPr lang="en-US" dirty="0"/>
+              <a:t> </a:t>
+            </a:r>
+            <a:r>
+              <a:rPr lang="en-US" dirty="0" err="1"/>
+              <a:t>báo</a:t>
+            </a:r>
+            <a:r>
+              <a:rPr lang="en-US" dirty="0"/>
+              <a:t> </a:t>
+            </a:r>
+            <a:r>
+              <a:rPr lang="en-US" dirty="0" err="1"/>
+              <a:t>chưa</a:t>
+            </a:r>
+            <a:r>
+              <a:rPr lang="en-US" dirty="0"/>
+              <a:t> </a:t>
+            </a:r>
+            <a:r>
+              <a:rPr lang="en-US" dirty="0" err="1"/>
+              <a:t>được</a:t>
+            </a:r>
+            <a:r>
+              <a:rPr lang="en-US" dirty="0"/>
+              <a:t> </a:t>
+            </a:r>
+            <a:r>
+              <a:rPr lang="en-US" dirty="0" err="1"/>
+              <a:t>chuyển</a:t>
+            </a:r>
+            <a:r>
+              <a:rPr lang="en-US" dirty="0"/>
+              <a:t> qua </a:t>
+            </a:r>
+            <a:r>
+              <a:rPr lang="en-US" dirty="0" err="1"/>
+              <a:t>tiếng</a:t>
+            </a:r>
+            <a:r>
+              <a:rPr lang="en-US" dirty="0"/>
+              <a:t> </a:t>
+            </a:r>
+            <a:r>
+              <a:rPr lang="en-US" dirty="0" err="1"/>
+              <a:t>việt</a:t>
+            </a:r>
+            <a:r>
+              <a:rPr lang="en-US" dirty="0"/>
+              <a:t> 100%, </a:t>
+            </a:r>
+            <a:r>
+              <a:rPr lang="en-US" dirty="0" err="1"/>
+              <a:t>vẫn</a:t>
+            </a:r>
+            <a:r>
+              <a:rPr lang="en-US" dirty="0"/>
+              <a:t> </a:t>
+            </a:r>
+            <a:r>
+              <a:rPr lang="en-US" dirty="0" err="1"/>
+              <a:t>còn</a:t>
+            </a:r>
+            <a:r>
+              <a:rPr lang="en-US" dirty="0"/>
+              <a:t> </a:t>
+            </a:r>
+            <a:r>
+              <a:rPr lang="en-US" dirty="0" err="1"/>
+              <a:t>một</a:t>
+            </a:r>
+            <a:r>
+              <a:rPr lang="en-US" dirty="0"/>
+              <a:t> </a:t>
+            </a:r>
+            <a:r>
+              <a:rPr lang="en-US" dirty="0" err="1"/>
+              <a:t>số</a:t>
+            </a:r>
+            <a:r>
+              <a:rPr lang="en-US" dirty="0"/>
+              <a:t> </a:t>
+            </a:r>
+            <a:r>
+              <a:rPr lang="en-US" dirty="0" err="1"/>
+              <a:t>thông</a:t>
+            </a:r>
+            <a:r>
+              <a:rPr lang="en-US" dirty="0"/>
+              <a:t>  </a:t>
+            </a:r>
+            <a:r>
+              <a:rPr lang="en-US" dirty="0" err="1"/>
+              <a:t>báo</a:t>
+            </a:r>
+            <a:r>
+              <a:rPr lang="en-US" dirty="0"/>
+              <a:t> </a:t>
+            </a:r>
+            <a:r>
+              <a:rPr lang="en-US" dirty="0" err="1"/>
+              <a:t>là</a:t>
+            </a:r>
+            <a:r>
+              <a:rPr lang="en-US" dirty="0"/>
+              <a:t> </a:t>
+            </a:r>
+            <a:r>
+              <a:rPr lang="en-US" dirty="0" err="1"/>
+              <a:t>tiếng</a:t>
+            </a:r>
+            <a:r>
+              <a:rPr lang="en-US" dirty="0"/>
+              <a:t> </a:t>
+            </a:r>
+            <a:r>
+              <a:rPr lang="en-US" dirty="0" err="1"/>
+              <a:t>anh</a:t>
+            </a:r>
+            <a:r>
+              <a:rPr lang="en-US" dirty="0" smtClean="0"/>
               <a:t>.</a:t>
             </a:r>
           </a:p>
@@ -27868,54 +28008,351 @@
             <a:pPr marL="0" indent="0">
               <a:buNone/>
             </a:pPr>
-            <a:endParaRPr lang="en-US"/>
+            <a:endParaRPr lang="en-US" dirty="0"/>
           </a:p>
           <a:p>
             <a:pPr marL="0" indent="0">
               <a:buNone/>
             </a:pPr>
-            <a:endParaRPr lang="en-US" smtClean="0"/>
+            <a:endParaRPr lang="en-US" dirty="0" smtClean="0"/>
           </a:p>
           <a:p>
             <a:pPr marL="0" indent="0">
               <a:buNone/>
             </a:pPr>
-            <a:endParaRPr lang="en-US"/>
-          </a:p>
-          <a:p>
-            <a:endParaRPr lang="en-US" smtClean="0"/>
+            <a:endParaRPr lang="en-US" dirty="0"/>
+          </a:p>
+          <a:p>
+            <a:endParaRPr lang="en-US" dirty="0" smtClean="0"/>
           </a:p>
           <a:p>
             <a:pPr marL="0" indent="0">
               <a:buNone/>
             </a:pPr>
             <a:r>
-              <a:rPr lang="en-US" b="1" smtClean="0"/>
-              <a:t>Yêu </a:t>
-            </a:r>
-            <a:r>
-              <a:rPr lang="en-US" b="1"/>
-              <a:t>cầu thay đổi</a:t>
-            </a:r>
-            <a:r>
-              <a:rPr lang="en-US"/>
-              <a:t>:  Chuyển các thông báo sang tiếng việt. Để cho thống nhất ngôn ngữ</a:t>
-            </a:r>
+              <a:rPr lang="en-US" b="1" dirty="0" err="1" smtClean="0"/>
+              <a:t>Yêu</a:t>
+            </a:r>
+            <a:r>
+              <a:rPr lang="en-US" b="1" dirty="0" smtClean="0"/>
+              <a:t> </a:t>
+            </a:r>
+            <a:r>
+              <a:rPr lang="en-US" b="1" dirty="0" err="1"/>
+              <a:t>cầu</a:t>
+            </a:r>
+            <a:r>
+              <a:rPr lang="en-US" b="1" dirty="0"/>
+              <a:t> </a:t>
+            </a:r>
+            <a:r>
+              <a:rPr lang="en-US" b="1" dirty="0" err="1"/>
+              <a:t>thay</a:t>
+            </a:r>
+            <a:r>
+              <a:rPr lang="en-US" b="1" dirty="0"/>
+              <a:t> </a:t>
+            </a:r>
+            <a:r>
+              <a:rPr lang="en-US" b="1" dirty="0" err="1"/>
+              <a:t>đổi</a:t>
+            </a:r>
+            <a:r>
+              <a:rPr lang="en-US" dirty="0"/>
+              <a:t>:  </a:t>
+            </a:r>
+            <a:r>
+              <a:rPr lang="en-US" dirty="0" err="1"/>
+              <a:t>Chuyển</a:t>
+            </a:r>
+            <a:r>
+              <a:rPr lang="en-US" dirty="0"/>
+              <a:t> </a:t>
+            </a:r>
+            <a:r>
+              <a:rPr lang="en-US" dirty="0" err="1"/>
+              <a:t>các</a:t>
+            </a:r>
+            <a:r>
+              <a:rPr lang="en-US" dirty="0"/>
+              <a:t> </a:t>
+            </a:r>
+            <a:r>
+              <a:rPr lang="en-US" dirty="0" err="1"/>
+              <a:t>thông</a:t>
+            </a:r>
+            <a:r>
+              <a:rPr lang="en-US" dirty="0"/>
+              <a:t> </a:t>
+            </a:r>
+            <a:r>
+              <a:rPr lang="en-US" dirty="0" err="1"/>
+              <a:t>báo</a:t>
+            </a:r>
+            <a:r>
+              <a:rPr lang="en-US" dirty="0"/>
+              <a:t> sang </a:t>
+            </a:r>
+            <a:r>
+              <a:rPr lang="en-US" dirty="0" err="1"/>
+              <a:t>tiếng</a:t>
+            </a:r>
+            <a:r>
+              <a:rPr lang="en-US" dirty="0"/>
+              <a:t> </a:t>
+            </a:r>
+            <a:r>
+              <a:rPr lang="en-US" dirty="0" err="1"/>
+              <a:t>việt</a:t>
+            </a:r>
+            <a:r>
+              <a:rPr lang="en-US" dirty="0"/>
+              <a:t>. </a:t>
+            </a:r>
+            <a:r>
+              <a:rPr lang="en-US" dirty="0" err="1"/>
+              <a:t>Để</a:t>
+            </a:r>
+            <a:r>
+              <a:rPr lang="en-US" dirty="0"/>
+              <a:t> </a:t>
+            </a:r>
+            <a:r>
+              <a:rPr lang="en-US" dirty="0" err="1"/>
+              <a:t>cho</a:t>
+            </a:r>
+            <a:r>
+              <a:rPr lang="en-US" dirty="0"/>
+              <a:t> </a:t>
+            </a:r>
+            <a:r>
+              <a:rPr lang="en-US" dirty="0" err="1"/>
+              <a:t>thống</a:t>
+            </a:r>
+            <a:r>
+              <a:rPr lang="en-US" dirty="0"/>
+              <a:t> </a:t>
+            </a:r>
+            <a:r>
+              <a:rPr lang="en-US" dirty="0" err="1"/>
+              <a:t>nhất</a:t>
+            </a:r>
+            <a:r>
+              <a:rPr lang="en-US" dirty="0"/>
+              <a:t> </a:t>
+            </a:r>
+            <a:r>
+              <a:rPr lang="en-US" dirty="0" err="1"/>
+              <a:t>ngôn</a:t>
+            </a:r>
+            <a:r>
+              <a:rPr lang="en-US" dirty="0"/>
+              <a:t> </a:t>
+            </a:r>
+            <a:r>
+              <a:rPr lang="en-US" dirty="0" err="1"/>
+              <a:t>ngữ</a:t>
+            </a:r>
+            <a:endParaRPr lang="en-US" dirty="0"/>
           </a:p>
           <a:p>
             <a:pPr marL="0" indent="0">
               <a:buNone/>
             </a:pPr>
             <a:r>
-              <a:rPr lang="en-US" b="1"/>
-              <a:t>Loại yêu cầu thay đổi</a:t>
-            </a:r>
-            <a:r>
-              <a:rPr lang="en-US"/>
-              <a:t>: Bảo trì hiệu chỉnh. Do các thông báo vẫn còn là tiếng Anh chưa thuần Việt đồng nhất ngôn ngữ</a:t>
-            </a:r>
-            <a:r>
-              <a:rPr lang="en-US" smtClean="0"/>
+              <a:rPr lang="en-US" b="1" dirty="0" err="1"/>
+              <a:t>Loại</a:t>
+            </a:r>
+            <a:r>
+              <a:rPr lang="en-US" b="1" dirty="0"/>
+              <a:t> </a:t>
+            </a:r>
+            <a:r>
+              <a:rPr lang="en-US" b="1" dirty="0" err="1"/>
+              <a:t>yêu</a:t>
+            </a:r>
+            <a:r>
+              <a:rPr lang="en-US" b="1" dirty="0"/>
+              <a:t> </a:t>
+            </a:r>
+            <a:r>
+              <a:rPr lang="en-US" b="1" dirty="0" err="1"/>
+              <a:t>cầu</a:t>
+            </a:r>
+            <a:r>
+              <a:rPr lang="en-US" b="1" dirty="0"/>
+              <a:t> </a:t>
+            </a:r>
+            <a:r>
+              <a:rPr lang="en-US" b="1" dirty="0" err="1"/>
+              <a:t>thay</a:t>
+            </a:r>
+            <a:r>
+              <a:rPr lang="en-US" b="1" dirty="0"/>
+              <a:t> </a:t>
+            </a:r>
+            <a:r>
+              <a:rPr lang="en-US" b="1" dirty="0" err="1"/>
+              <a:t>đổi</a:t>
+            </a:r>
+            <a:r>
+              <a:rPr lang="en-US" dirty="0"/>
+              <a:t>: </a:t>
+            </a:r>
+            <a:r>
+              <a:rPr lang="en-US" dirty="0" err="1"/>
+              <a:t>Bảo</a:t>
+            </a:r>
+            <a:r>
+              <a:rPr lang="en-US" dirty="0"/>
+              <a:t> </a:t>
+            </a:r>
+            <a:r>
+              <a:rPr lang="en-US" dirty="0" err="1"/>
+              <a:t>trì</a:t>
+            </a:r>
+            <a:r>
+              <a:rPr lang="en-US" dirty="0"/>
+              <a:t> </a:t>
+            </a:r>
+            <a:r>
+              <a:rPr lang="en-US" dirty="0" err="1" smtClean="0"/>
+              <a:t>hoàn</a:t>
+            </a:r>
+            <a:r>
+              <a:rPr lang="en-US" dirty="0" smtClean="0"/>
+              <a:t> </a:t>
+            </a:r>
+            <a:r>
+              <a:rPr lang="en-US" dirty="0" err="1" smtClean="0"/>
+              <a:t>thiện</a:t>
+            </a:r>
+            <a:r>
+              <a:rPr lang="en-US" dirty="0" smtClean="0"/>
+              <a:t>. </a:t>
+            </a:r>
+            <a:r>
+              <a:rPr lang="en-US" dirty="0"/>
+              <a:t>Do </a:t>
+            </a:r>
+            <a:r>
+              <a:rPr lang="en-US" dirty="0" err="1"/>
+              <a:t>các</a:t>
+            </a:r>
+            <a:r>
+              <a:rPr lang="en-US" dirty="0"/>
+              <a:t> </a:t>
+            </a:r>
+            <a:r>
+              <a:rPr lang="en-US" dirty="0" err="1"/>
+              <a:t>thông</a:t>
+            </a:r>
+            <a:r>
+              <a:rPr lang="en-US" dirty="0"/>
+              <a:t> </a:t>
+            </a:r>
+            <a:r>
+              <a:rPr lang="en-US" dirty="0" err="1"/>
+              <a:t>báo</a:t>
+            </a:r>
+            <a:r>
+              <a:rPr lang="en-US" dirty="0"/>
+              <a:t> </a:t>
+            </a:r>
+            <a:r>
+              <a:rPr lang="en-US" dirty="0" err="1"/>
+              <a:t>vẫn</a:t>
+            </a:r>
+            <a:r>
+              <a:rPr lang="en-US" dirty="0"/>
+              <a:t> </a:t>
+            </a:r>
+            <a:r>
+              <a:rPr lang="en-US" dirty="0" err="1"/>
+              <a:t>còn</a:t>
+            </a:r>
+            <a:r>
+              <a:rPr lang="en-US" dirty="0"/>
+              <a:t> </a:t>
+            </a:r>
+            <a:r>
+              <a:rPr lang="en-US" dirty="0" err="1"/>
+              <a:t>là</a:t>
+            </a:r>
+            <a:r>
+              <a:rPr lang="en-US" dirty="0"/>
+              <a:t> </a:t>
+            </a:r>
+            <a:r>
+              <a:rPr lang="en-US" dirty="0" err="1"/>
+              <a:t>tiếng</a:t>
+            </a:r>
+            <a:r>
+              <a:rPr lang="en-US" dirty="0"/>
+              <a:t> </a:t>
+            </a:r>
+            <a:r>
+              <a:rPr lang="en-US" dirty="0" err="1"/>
+              <a:t>Anh</a:t>
+            </a:r>
+            <a:r>
+              <a:rPr lang="en-US" dirty="0"/>
+              <a:t> </a:t>
+            </a:r>
+            <a:r>
+              <a:rPr lang="en-US" dirty="0" err="1"/>
+              <a:t>chưa</a:t>
+            </a:r>
+            <a:r>
+              <a:rPr lang="en-US" dirty="0"/>
+              <a:t> </a:t>
+            </a:r>
+            <a:r>
+              <a:rPr lang="en-US" dirty="0" err="1"/>
+              <a:t>thuần</a:t>
+            </a:r>
+            <a:r>
+              <a:rPr lang="en-US" dirty="0"/>
+              <a:t> </a:t>
+            </a:r>
+            <a:r>
+              <a:rPr lang="en-US" dirty="0" err="1"/>
+              <a:t>Việt</a:t>
+            </a:r>
+            <a:r>
+              <a:rPr lang="en-US" dirty="0"/>
+              <a:t> </a:t>
+            </a:r>
+            <a:r>
+              <a:rPr lang="en-US" dirty="0" err="1"/>
+              <a:t>đồng</a:t>
+            </a:r>
+            <a:r>
+              <a:rPr lang="en-US" dirty="0"/>
+              <a:t> </a:t>
+            </a:r>
+            <a:r>
+              <a:rPr lang="en-US" dirty="0" err="1"/>
+              <a:t>nhất</a:t>
+            </a:r>
+            <a:r>
+              <a:rPr lang="en-US" dirty="0"/>
+              <a:t> </a:t>
+            </a:r>
+            <a:r>
+              <a:rPr lang="en-US" dirty="0" err="1"/>
+              <a:t>ngôn</a:t>
+            </a:r>
+            <a:r>
+              <a:rPr lang="en-US" dirty="0"/>
+              <a:t> </a:t>
+            </a:r>
+            <a:r>
+              <a:rPr lang="en-US" dirty="0" err="1"/>
+              <a:t>ngữ</a:t>
+            </a:r>
+            <a:r>
+              <a:rPr lang="en-US" dirty="0" smtClean="0"/>
               <a:t>.</a:t>
             </a:r>
           </a:p>
@@ -27924,11 +28361,27 @@
               <a:buNone/>
             </a:pPr>
             <a:r>
-              <a:rPr lang="en-US" b="1"/>
-              <a:t>Mức ưu tiên</a:t>
-            </a:r>
-            <a:r>
-              <a:rPr lang="en-US"/>
+              <a:rPr lang="en-US" b="1" dirty="0" err="1"/>
+              <a:t>Mức</a:t>
+            </a:r>
+            <a:r>
+              <a:rPr lang="en-US" b="1" dirty="0"/>
+              <a:t> </a:t>
+            </a:r>
+            <a:r>
+              <a:rPr lang="en-US" b="1" dirty="0" err="1"/>
+              <a:t>ưu</a:t>
+            </a:r>
+            <a:r>
+              <a:rPr lang="en-US" b="1" dirty="0"/>
+              <a:t> </a:t>
+            </a:r>
+            <a:r>
+              <a:rPr lang="en-US" b="1" dirty="0" err="1"/>
+              <a:t>tiên</a:t>
+            </a:r>
+            <a:r>
+              <a:rPr lang="en-US" dirty="0"/>
               <a:t>: Cao.</a:t>
             </a:r>
           </a:p>
@@ -32676,7 +33129,7 @@
     </a:clrScheme>
     <a:fontScheme name="Office">
       <a:majorFont>
-        <a:latin typeface="Calibri Light" panose="020F0302020204030204"/>
+        <a:latin typeface="Calibri Light"/>
         <a:ea typeface=""/>
         <a:cs typeface=""/>
         <a:font script="Jpan" typeface="ＭＳ Ｐゴシック"/>
@@ -32711,7 +33164,7 @@
         <a:font script="Geor" typeface="Sylfaen"/>
       </a:majorFont>
       <a:minorFont>
-        <a:latin typeface="Calibri" panose="020F0502020204030204"/>
+        <a:latin typeface="Calibri"/>
         <a:ea typeface=""/>
         <a:cs typeface=""/>
         <a:font script="Jpan" typeface="ＭＳ Ｐゴシック"/>
@@ -32857,7 +33310,7 @@
   <a:extraClrSchemeLst/>
   <a:extLst>
     <a:ext uri="{05A4C25C-085E-4340-85A3-A5531E510DB2}">
-      <thm15:themeFamily xmlns:thm15="http://schemas.microsoft.com/office/thememl/2012/main" name="Office Theme" id="{62F939B6-93AF-4DB8-9C6B-D6C7DFDC589F}" vid="{4A3C46E8-61CC-4603-A589-7422A47A8E4A}"/>
+      <thm15:themeFamily xmlns:thm15="http://schemas.microsoft.com/office/thememl/2012/main" xmlns="" name="Office Theme" id="{62F939B6-93AF-4DB8-9C6B-D6C7DFDC589F}" vid="{4A3C46E8-61CC-4603-A589-7422A47A8E4A}"/>
     </a:ext>
   </a:extLst>
 </a:theme>
@@ -32906,7 +33359,7 @@
     </a:clrScheme>
     <a:fontScheme name="Office">
       <a:majorFont>
-        <a:latin typeface="Calibri Light" panose="020F0302020204030204"/>
+        <a:latin typeface="Calibri Light"/>
         <a:ea typeface=""/>
         <a:cs typeface=""/>
         <a:font script="Jpan" typeface="ＭＳ Ｐゴシック"/>
@@ -32941,7 +33394,7 @@
         <a:font script="Geor" typeface="Sylfaen"/>
       </a:majorFont>
       <a:minorFont>
-        <a:latin typeface="Calibri" panose="020F0502020204030204"/>
+        <a:latin typeface="Calibri"/>
         <a:ea typeface=""/>
         <a:cs typeface=""/>
         <a:font script="Jpan" typeface="ＭＳ Ｐゴシック"/>
@@ -33118,7 +33571,7 @@
   <a:extraClrSchemeLst/>
   <a:extLst>
     <a:ext uri="{05A4C25C-085E-4340-85A3-A5531E510DB2}">
-      <thm15:themeFamily xmlns:thm15="http://schemas.microsoft.com/office/thememl/2012/main" name="Office Theme" id="{62F939B6-93AF-4DB8-9C6B-D6C7DFDC589F}" vid="{4A3C46E8-61CC-4603-A589-7422A47A8E4A}"/>
+      <thm15:themeFamily xmlns:thm15="http://schemas.microsoft.com/office/thememl/2012/main" xmlns="" name="Office Theme" id="{62F939B6-93AF-4DB8-9C6B-D6C7DFDC589F}" vid="{4A3C46E8-61CC-4603-A589-7422A47A8E4A}"/>
     </a:ext>
   </a:extLst>
 </a:theme>
@@ -33167,7 +33620,7 @@
     </a:clrScheme>
     <a:fontScheme name="Office">
       <a:majorFont>
-        <a:latin typeface="Calibri Light" panose="020F0302020204030204"/>
+        <a:latin typeface="Calibri Light"/>
         <a:ea typeface=""/>
         <a:cs typeface=""/>
         <a:font script="Jpan" typeface="ＭＳ Ｐゴシック"/>
@@ -33202,7 +33655,7 @@
         <a:font script="Geor" typeface="Sylfaen"/>
       </a:majorFont>
       <a:minorFont>
-        <a:latin typeface="Calibri" panose="020F0502020204030204"/>
+        <a:latin typeface="Calibri"/>
         <a:ea typeface=""/>
         <a:cs typeface=""/>
         <a:font script="Jpan" typeface="ＭＳ Ｐゴシック"/>
@@ -33379,7 +33832,7 @@
   <a:extraClrSchemeLst/>
   <a:extLst>
     <a:ext uri="{05A4C25C-085E-4340-85A3-A5531E510DB2}">
-      <thm15:themeFamily xmlns:thm15="http://schemas.microsoft.com/office/thememl/2012/main" name="Office Theme" id="{62F939B6-93AF-4DB8-9C6B-D6C7DFDC589F}" vid="{4A3C46E8-61CC-4603-A589-7422A47A8E4A}"/>
+      <thm15:themeFamily xmlns:thm15="http://schemas.microsoft.com/office/thememl/2012/main" xmlns="" name="Office Theme" id="{62F939B6-93AF-4DB8-9C6B-D6C7DFDC589F}" vid="{4A3C46E8-61CC-4603-A589-7422A47A8E4A}"/>
     </a:ext>
   </a:extLst>
 </a:theme>

</xml_diff>